<commit_message>
Addl content for Demo 2 of Docker presentation
</commit_message>
<xml_diff>
--- a/Developing for SQL Server with Docker.pptx
+++ b/Developing for SQL Server with Docker.pptx
@@ -5,7 +5,7 @@
     <p:sldMasterId id="2147483648" r:id="rId1"/>
   </p:sldMasterIdLst>
   <p:notesMasterIdLst>
-    <p:notesMasterId r:id="rId16"/>
+    <p:notesMasterId r:id="rId18"/>
   </p:notesMasterIdLst>
   <p:sldIdLst>
     <p:sldId id="256" r:id="rId2"/>
@@ -17,11 +17,13 @@
     <p:sldId id="264" r:id="rId8"/>
     <p:sldId id="265" r:id="rId9"/>
     <p:sldId id="261" r:id="rId10"/>
-    <p:sldId id="270" r:id="rId11"/>
-    <p:sldId id="263" r:id="rId12"/>
-    <p:sldId id="267" r:id="rId13"/>
-    <p:sldId id="268" r:id="rId14"/>
-    <p:sldId id="269" r:id="rId15"/>
+    <p:sldId id="271" r:id="rId11"/>
+    <p:sldId id="272" r:id="rId12"/>
+    <p:sldId id="270" r:id="rId13"/>
+    <p:sldId id="263" r:id="rId14"/>
+    <p:sldId id="267" r:id="rId15"/>
+    <p:sldId id="268" r:id="rId16"/>
+    <p:sldId id="269" r:id="rId17"/>
   </p:sldIdLst>
   <p:sldSz cx="12192000" cy="6858000"/>
   <p:notesSz cx="6858000" cy="9144000"/>
@@ -579,7 +581,7 @@
               <a:rPr lang="en-US" smtClean="0"/>
               <a:t>3</a:t>
             </a:fld>
-            <a:endParaRPr lang="en-US"/>
+            <a:endParaRPr lang="en-US" dirty="0"/>
           </a:p>
         </p:txBody>
       </p:sp>
@@ -759,7 +761,7 @@
             </a:pPr>
             <a:r>
               <a:rPr lang="en-US" dirty="0"/>
-              <a:t>-v is either mounting a named volume or using a bind mount. Be clear that it gets a little advanced, but that topic is the key to persisting data with Containers</a:t>
+              <a:t>-v is either mounting a named volume or using a bind mount. Be clear that we’ll cover in a bit, but that topic is the key to persisting data with Containers</a:t>
             </a:r>
           </a:p>
           <a:p>
@@ -769,6 +771,23 @@
             <a:r>
               <a:rPr lang="en-US" dirty="0"/>
               <a:t>Go over the tag after the colon and that those are important. Demo leaving the tag off and the Docker engine doesn’t know what to do with it</a:t>
+            </a:r>
+          </a:p>
+          <a:p>
+            <a:pPr marL="228600" indent="-228600">
+              <a:buAutoNum type="arabicPeriod"/>
+            </a:pPr>
+            <a:r>
+              <a:rPr lang="en-US" dirty="0"/>
+              <a:t>Also bring up Andrew </a:t>
+            </a:r>
+            <a:r>
+              <a:rPr lang="en-US" dirty="0" err="1"/>
+              <a:t>Pruski’s</a:t>
+            </a:r>
+            <a:r>
+              <a:rPr lang="en-US" dirty="0"/>
+              <a:t> blog series on containers and how none of this is possible without that series</a:t>
             </a:r>
           </a:p>
         </p:txBody>
@@ -792,7 +811,7 @@
               <a:rPr lang="en-US" smtClean="0"/>
               <a:t>7</a:t>
             </a:fld>
-            <a:endParaRPr lang="en-US"/>
+            <a:endParaRPr lang="en-US" dirty="0"/>
           </a:p>
         </p:txBody>
       </p:sp>
@@ -800,6 +819,90 @@
     <p:extLst>
       <p:ext uri="{BB962C8B-B14F-4D97-AF65-F5344CB8AC3E}">
         <p14:creationId xmlns:p14="http://schemas.microsoft.com/office/powerpoint/2010/main" val="3561112940"/>
+      </p:ext>
+    </p:extLst>
+  </p:cSld>
+  <p:clrMapOvr>
+    <a:masterClrMapping/>
+  </p:clrMapOvr>
+</p:notes>
+</file>
+
+<file path=ppt/notesSlides/notesSlide4.xml><?xml version="1.0" encoding="utf-8"?>
+<p:notes xmlns:a="http://schemas.openxmlformats.org/drawingml/2006/main" xmlns:r="http://schemas.openxmlformats.org/officeDocument/2006/relationships" xmlns:p="http://schemas.openxmlformats.org/presentationml/2006/main">
+  <p:cSld>
+    <p:spTree>
+      <p:nvGrpSpPr>
+        <p:cNvPr id="1" name=""/>
+        <p:cNvGrpSpPr/>
+        <p:nvPr/>
+      </p:nvGrpSpPr>
+      <p:grpSpPr>
+        <a:xfrm>
+          <a:off x="0" y="0"/>
+          <a:ext cx="0" cy="0"/>
+          <a:chOff x="0" y="0"/>
+          <a:chExt cx="0" cy="0"/>
+        </a:xfrm>
+      </p:grpSpPr>
+      <p:sp>
+        <p:nvSpPr>
+          <p:cNvPr id="2" name="Slide Image Placeholder 1"/>
+          <p:cNvSpPr>
+            <a:spLocks noGrp="1" noRot="1" noChangeAspect="1"/>
+          </p:cNvSpPr>
+          <p:nvPr>
+            <p:ph type="sldImg"/>
+          </p:nvPr>
+        </p:nvSpPr>
+        <p:spPr/>
+      </p:sp>
+      <p:sp>
+        <p:nvSpPr>
+          <p:cNvPr id="3" name="Notes Placeholder 2"/>
+          <p:cNvSpPr>
+            <a:spLocks noGrp="1"/>
+          </p:cNvSpPr>
+          <p:nvPr>
+            <p:ph type="body" idx="1"/>
+          </p:nvPr>
+        </p:nvSpPr>
+        <p:spPr/>
+        <p:txBody>
+          <a:bodyPr/>
+          <a:lstStyle/>
+          <a:p>
+            <a:endParaRPr lang="en-US" dirty="0"/>
+          </a:p>
+        </p:txBody>
+      </p:sp>
+      <p:sp>
+        <p:nvSpPr>
+          <p:cNvPr id="4" name="Slide Number Placeholder 3"/>
+          <p:cNvSpPr>
+            <a:spLocks noGrp="1"/>
+          </p:cNvSpPr>
+          <p:nvPr>
+            <p:ph type="sldNum" sz="quarter" idx="5"/>
+          </p:nvPr>
+        </p:nvSpPr>
+        <p:spPr/>
+        <p:txBody>
+          <a:bodyPr/>
+          <a:lstStyle/>
+          <a:p>
+            <a:fld id="{B07B5B4F-0F75-48F2-BFB2-73D5ADCDF733}" type="slidenum">
+              <a:rPr lang="en-US" smtClean="0"/>
+              <a:t>13</a:t>
+            </a:fld>
+            <a:endParaRPr lang="en-US"/>
+          </a:p>
+        </p:txBody>
+      </p:sp>
+    </p:spTree>
+    <p:extLst>
+      <p:ext uri="{BB962C8B-B14F-4D97-AF65-F5344CB8AC3E}">
+        <p14:creationId xmlns:p14="http://schemas.microsoft.com/office/powerpoint/2010/main" val="1130096044"/>
       </p:ext>
     </p:extLst>
   </p:cSld>
@@ -14644,7 +14747,7 @@
           <a:bodyPr/>
           <a:lstStyle/>
           <a:p>
-            <a:endParaRPr lang="en-US"/>
+            <a:endParaRPr lang="en-US" dirty="0"/>
           </a:p>
         </p:txBody>
       </p:sp>
@@ -14695,7 +14798,7 @@
           <p:cNvPr id="2" name="Title 1">
             <a:extLst>
               <a:ext uri="{FF2B5EF4-FFF2-40B4-BE49-F238E27FC236}">
-                <a16:creationId xmlns:a16="http://schemas.microsoft.com/office/drawing/2014/main" id="{5B880FCE-0B07-4665-8193-9DDBAB707A92}"/>
+                <a16:creationId xmlns:a16="http://schemas.microsoft.com/office/drawing/2014/main" id="{92037D1F-DD76-4C31-BCC9-0BE7FC5FAA95}"/>
               </a:ext>
             </a:extLst>
           </p:cNvPr>
@@ -14713,7 +14816,7 @@
           <a:p>
             <a:r>
               <a:rPr lang="en-US" dirty="0"/>
-              <a:t>Demo #2 – Mounting a Volume</a:t>
+              <a:t>Bind Mounts and Named Volumes</a:t>
             </a:r>
           </a:p>
         </p:txBody>
@@ -14723,7 +14826,7 @@
           <p:cNvPr id="3" name="Content Placeholder 2">
             <a:extLst>
               <a:ext uri="{FF2B5EF4-FFF2-40B4-BE49-F238E27FC236}">
-                <a16:creationId xmlns:a16="http://schemas.microsoft.com/office/drawing/2014/main" id="{5FEEF222-F33C-4818-8009-8420D7E45C3B}"/>
+                <a16:creationId xmlns:a16="http://schemas.microsoft.com/office/drawing/2014/main" id="{9DEC0141-1575-40DE-9A70-7F4E1B9768B4}"/>
               </a:ext>
             </a:extLst>
           </p:cNvPr>
@@ -14739,14 +14842,50 @@
           <a:bodyPr/>
           <a:lstStyle/>
           <a:p>
-            <a:endParaRPr lang="en-US"/>
+            <a:r>
+              <a:rPr lang="en-US" dirty="0"/>
+              <a:t>In order to start mounting a volume into our Containers, we need to “Right-Click -&gt; Settings” the Docker Desktop app tray icon:</a:t>
+            </a:r>
+          </a:p>
+          <a:p>
+            <a:endParaRPr lang="en-US" dirty="0"/>
           </a:p>
         </p:txBody>
       </p:sp>
+      <p:pic>
+        <p:nvPicPr>
+          <p:cNvPr id="5" name="Picture 4" descr="A screenshot of a cell phone&#10;&#10;Description automatically generated">
+            <a:extLst>
+              <a:ext uri="{FF2B5EF4-FFF2-40B4-BE49-F238E27FC236}">
+                <a16:creationId xmlns:a16="http://schemas.microsoft.com/office/drawing/2014/main" id="{43B7FC3C-C45E-4453-B743-0BE3DB3A5100}"/>
+              </a:ext>
+            </a:extLst>
+          </p:cNvPr>
+          <p:cNvPicPr>
+            <a:picLocks noChangeAspect="1"/>
+          </p:cNvPicPr>
+          <p:nvPr/>
+        </p:nvPicPr>
+        <p:blipFill>
+          <a:blip r:embed="rId2"/>
+          <a:stretch>
+            <a:fillRect/>
+          </a:stretch>
+        </p:blipFill>
+        <p:spPr>
+          <a:xfrm>
+            <a:off x="1546659" y="3429000"/>
+            <a:ext cx="7177378" cy="2578675"/>
+          </a:xfrm>
+          <a:prstGeom prst="rect">
+            <a:avLst/>
+          </a:prstGeom>
+        </p:spPr>
+      </p:pic>
     </p:spTree>
     <p:extLst>
       <p:ext uri="{BB962C8B-B14F-4D97-AF65-F5344CB8AC3E}">
-        <p14:creationId xmlns:p14="http://schemas.microsoft.com/office/powerpoint/2010/main" val="2896387629"/>
+        <p14:creationId xmlns:p14="http://schemas.microsoft.com/office/powerpoint/2010/main" val="4009053355"/>
       </p:ext>
     </p:extLst>
   </p:cSld>
@@ -14790,7 +14929,7 @@
           <p:cNvPr id="2" name="Title 1">
             <a:extLst>
               <a:ext uri="{FF2B5EF4-FFF2-40B4-BE49-F238E27FC236}">
-                <a16:creationId xmlns:a16="http://schemas.microsoft.com/office/drawing/2014/main" id="{9078C7A0-2DF8-4AD9-AB0C-B88FD31DE200}"/>
+                <a16:creationId xmlns:a16="http://schemas.microsoft.com/office/drawing/2014/main" id="{CF611510-59AA-424B-BE27-86AB8C743884}"/>
               </a:ext>
             </a:extLst>
           </p:cNvPr>
@@ -14808,7 +14947,7 @@
           <a:p>
             <a:r>
               <a:rPr lang="en-US" dirty="0"/>
-              <a:t>How do I customize a Docker Container?</a:t>
+              <a:t>Bind Mounts and Named Volumes</a:t>
             </a:r>
           </a:p>
         </p:txBody>
@@ -14818,7 +14957,7 @@
           <p:cNvPr id="3" name="Content Placeholder 2">
             <a:extLst>
               <a:ext uri="{FF2B5EF4-FFF2-40B4-BE49-F238E27FC236}">
-                <a16:creationId xmlns:a16="http://schemas.microsoft.com/office/drawing/2014/main" id="{5A8032B9-A811-4787-BE9A-333C3484892F}"/>
+                <a16:creationId xmlns:a16="http://schemas.microsoft.com/office/drawing/2014/main" id="{AA1AEFE1-E8CF-44CA-9AB0-50498512DE75}"/>
               </a:ext>
             </a:extLst>
           </p:cNvPr>
@@ -14836,82 +14975,107 @@
           <a:p>
             <a:r>
               <a:rPr lang="en-US" dirty="0"/>
-              <a:t>A couple of different ways: </a:t>
-            </a:r>
-          </a:p>
-          <a:p>
-            <a:pPr marL="800100" lvl="1" indent="-342900">
-              <a:buFont typeface="+mj-lt"/>
-              <a:buAutoNum type="arabicPeriod"/>
-            </a:pPr>
+              <a:t>Guidelines</a:t>
+            </a:r>
+          </a:p>
+          <a:p>
+            <a:pPr lvl="1"/>
             <a:r>
               <a:rPr lang="en-US" dirty="0"/>
-              <a:t>Create a post-deployment script (.ps1/.bat/.</a:t>
-            </a:r>
-            <a:r>
-              <a:rPr lang="en-US" dirty="0" err="1"/>
-              <a:t>py</a:t>
-            </a:r>
+              <a:t>Linux Containers on Docker for Windows - use a Bind Mount</a:t>
+            </a:r>
+          </a:p>
+          <a:p>
+            <a:pPr lvl="1"/>
             <a:r>
               <a:rPr lang="en-US" dirty="0"/>
-              <a:t>)</a:t>
-            </a:r>
-          </a:p>
-          <a:p>
-            <a:pPr marL="800100" lvl="1" indent="-342900">
-              <a:buFont typeface="+mj-lt"/>
-              <a:buAutoNum type="arabicPeriod"/>
-            </a:pPr>
-            <a:endParaRPr lang="en-US" dirty="0"/>
-          </a:p>
-          <a:p>
-            <a:pPr marL="800100" lvl="1" indent="-342900">
-              <a:buFont typeface="+mj-lt"/>
-              <a:buAutoNum type="arabicPeriod"/>
-            </a:pPr>
-            <a:r>
-              <a:rPr lang="en-US" u="sng" dirty="0"/>
-              <a:t>Much more common and recommended</a:t>
-            </a:r>
+              <a:t>Windows Containers on Docker for Windows - use Bind Mounts or Named Volumes</a:t>
+            </a:r>
+          </a:p>
+          <a:p>
             <a:r>
               <a:rPr lang="en-US" dirty="0"/>
-              <a:t>: create an Image and </a:t>
-            </a:r>
-            <a:r>
-              <a:rPr lang="en-US" dirty="0" err="1"/>
-              <a:t>Dockerfile</a:t>
-            </a:r>
-            <a:endParaRPr lang="en-US" dirty="0"/>
-          </a:p>
-          <a:p>
-            <a:pPr marL="1200150" lvl="2" indent="-342900"/>
-            <a:r>
+              <a:t>Create a named volume:</a:t>
+            </a:r>
+            <a:br>
               <a:rPr lang="en-US" dirty="0"/>
-              <a:t>You’ll specify a parent image in a </a:t>
-            </a:r>
-            <a:r>
-              <a:rPr lang="en-US" dirty="0" err="1"/>
-              <a:t>Dockerfile</a:t>
-            </a:r>
+            </a:br>
+            <a:r>
+              <a:rPr lang="en-US" dirty="0">
+                <a:solidFill>
+                  <a:schemeClr val="accent4">
+                    <a:lumMod val="50000"/>
+                  </a:schemeClr>
+                </a:solidFill>
+                <a:latin typeface="Consolas" panose="020B0609020204030204" pitchFamily="49" charset="0"/>
+              </a:rPr>
+              <a:t>docker volume create </a:t>
+            </a:r>
+            <a:r>
+              <a:rPr lang="en-US" dirty="0" err="1">
+                <a:solidFill>
+                  <a:schemeClr val="accent4">
+                    <a:lumMod val="50000"/>
+                  </a:schemeClr>
+                </a:solidFill>
+                <a:latin typeface="Consolas" panose="020B0609020204030204" pitchFamily="49" charset="0"/>
+              </a:rPr>
+              <a:t>test_volume</a:t>
+            </a:r>
+            <a:endParaRPr lang="en-US" dirty="0">
+              <a:solidFill>
+                <a:schemeClr val="accent4">
+                  <a:lumMod val="50000"/>
+                </a:schemeClr>
+              </a:solidFill>
+              <a:latin typeface="Consolas" panose="020B0609020204030204" pitchFamily="49" charset="0"/>
+            </a:endParaRPr>
+          </a:p>
+          <a:p>
             <a:r>
               <a:rPr lang="en-US" dirty="0"/>
-              <a:t> as the source, </a:t>
-            </a:r>
-            <a:r>
-              <a:rPr lang="en-US" u="sng" dirty="0"/>
-              <a:t>very</a:t>
-            </a:r>
-            <a:r>
+              <a:t>See where the named volume lives on your OS:</a:t>
+            </a:r>
+            <a:br>
               <a:rPr lang="en-US" dirty="0"/>
-              <a:t> similar to a dependency in a Linux package</a:t>
-            </a:r>
+            </a:br>
+            <a:r>
+              <a:rPr lang="en-US" dirty="0">
+                <a:solidFill>
+                  <a:schemeClr val="accent4">
+                    <a:lumMod val="50000"/>
+                  </a:schemeClr>
+                </a:solidFill>
+                <a:latin typeface="Consolas" panose="020B0609020204030204" pitchFamily="49" charset="0"/>
+              </a:rPr>
+              <a:t>docker volume inspect </a:t>
+            </a:r>
+            <a:r>
+              <a:rPr lang="en-US" dirty="0" err="1">
+                <a:solidFill>
+                  <a:schemeClr val="accent4">
+                    <a:lumMod val="50000"/>
+                  </a:schemeClr>
+                </a:solidFill>
+                <a:latin typeface="Consolas" panose="020B0609020204030204" pitchFamily="49" charset="0"/>
+              </a:rPr>
+              <a:t>test_volume</a:t>
+            </a:r>
+            <a:endParaRPr lang="en-US" dirty="0">
+              <a:solidFill>
+                <a:schemeClr val="accent4">
+                  <a:lumMod val="50000"/>
+                </a:schemeClr>
+              </a:solidFill>
+              <a:latin typeface="Consolas" panose="020B0609020204030204" pitchFamily="49" charset="0"/>
+            </a:endParaRPr>
           </a:p>
         </p:txBody>
       </p:sp>
     </p:spTree>
     <p:extLst>
       <p:ext uri="{BB962C8B-B14F-4D97-AF65-F5344CB8AC3E}">
-        <p14:creationId xmlns:p14="http://schemas.microsoft.com/office/powerpoint/2010/main" val="431772287"/>
+        <p14:creationId xmlns:p14="http://schemas.microsoft.com/office/powerpoint/2010/main" val="760946740"/>
       </p:ext>
     </p:extLst>
   </p:cSld>
@@ -14955,7 +15119,7 @@
           <p:cNvPr id="2" name="Title 1">
             <a:extLst>
               <a:ext uri="{FF2B5EF4-FFF2-40B4-BE49-F238E27FC236}">
-                <a16:creationId xmlns:a16="http://schemas.microsoft.com/office/drawing/2014/main" id="{0BB0E5CC-A8D4-431F-9C70-07009634F72E}"/>
+                <a16:creationId xmlns:a16="http://schemas.microsoft.com/office/drawing/2014/main" id="{5B880FCE-0B07-4665-8193-9DDBAB707A92}"/>
               </a:ext>
             </a:extLst>
           </p:cNvPr>
@@ -14973,7 +15137,7 @@
           <a:p>
             <a:r>
               <a:rPr lang="en-US" dirty="0"/>
-              <a:t>What is a Docker Image?</a:t>
+              <a:t>Demo #2 – Mounting a Volume</a:t>
             </a:r>
           </a:p>
         </p:txBody>
@@ -14983,7 +15147,7 @@
           <p:cNvPr id="3" name="Content Placeholder 2">
             <a:extLst>
               <a:ext uri="{FF2B5EF4-FFF2-40B4-BE49-F238E27FC236}">
-                <a16:creationId xmlns:a16="http://schemas.microsoft.com/office/drawing/2014/main" id="{45A80E1F-CB88-4380-8540-2A5A4E596B05}"/>
+                <a16:creationId xmlns:a16="http://schemas.microsoft.com/office/drawing/2014/main" id="{5FEEF222-F33C-4818-8009-8420D7E45C3B}"/>
               </a:ext>
             </a:extLst>
           </p:cNvPr>
@@ -14996,97 +15160,24 @@
         </p:nvSpPr>
         <p:spPr/>
         <p:txBody>
-          <a:bodyPr>
-            <a:normAutofit fontScale="92500" lnSpcReduction="20000"/>
-          </a:bodyPr>
+          <a:bodyPr/>
           <a:lstStyle/>
           <a:p>
             <a:r>
               <a:rPr lang="en-US" dirty="0"/>
-              <a:t>Docker Images:</a:t>
-            </a:r>
-          </a:p>
-          <a:p>
-            <a:pPr lvl="1"/>
+              <a:t>Check our local path for the bind mount</a:t>
+            </a:r>
+          </a:p>
+          <a:p>
             <a:r>
               <a:rPr lang="en-US" dirty="0"/>
-              <a:t>Are the basis or source of running a Container (sort-of similar to a DVD ISO)</a:t>
-            </a:r>
-          </a:p>
-          <a:p>
-            <a:pPr lvl="1"/>
+              <a:t>Copy files to there</a:t>
+            </a:r>
+          </a:p>
+          <a:p>
             <a:r>
               <a:rPr lang="en-US" dirty="0"/>
-              <a:t>Consist of an ordered collection of root filesystem changes</a:t>
-            </a:r>
-          </a:p>
-          <a:p>
-            <a:pPr lvl="1"/>
-            <a:r>
-              <a:rPr lang="en-US" dirty="0"/>
-              <a:t>Have execution parameters that are run on first creation of a Container</a:t>
-            </a:r>
-          </a:p>
-          <a:p>
-            <a:pPr lvl="1"/>
-            <a:r>
-              <a:rPr lang="en-US" dirty="0"/>
-              <a:t>Do </a:t>
-            </a:r>
-            <a:r>
-              <a:rPr lang="en-US" u="sng" dirty="0"/>
-              <a:t>not</a:t>
-            </a:r>
-            <a:r>
-              <a:rPr lang="en-US" dirty="0"/>
-              <a:t> have state</a:t>
-            </a:r>
-          </a:p>
-          <a:p>
-            <a:pPr lvl="1"/>
-            <a:r>
-              <a:rPr lang="en-US" dirty="0"/>
-              <a:t>Never change</a:t>
-            </a:r>
-          </a:p>
-          <a:p>
-            <a:pPr lvl="1"/>
-            <a:r>
-              <a:rPr lang="en-US" dirty="0"/>
-              <a:t>Are usually downloaded from Docker Hub (but not always)</a:t>
-            </a:r>
-          </a:p>
-          <a:p>
-            <a:pPr lvl="1"/>
-            <a:r>
-              <a:rPr lang="en-US" dirty="0"/>
-              <a:t>Source: </a:t>
-            </a:r>
-            <a:r>
-              <a:rPr lang="en-US" dirty="0">
-                <a:solidFill>
-                  <a:srgbClr val="00B0F0"/>
-                </a:solidFill>
-                <a:hlinkClick r:id="rId2">
-                  <a:extLst>
-                    <a:ext uri="{A12FA001-AC4F-418D-AE19-62706E023703}">
-                      <ahyp:hlinkClr xmlns:ahyp="http://schemas.microsoft.com/office/drawing/2018/hyperlinkcolor" val="tx"/>
-                    </a:ext>
-                  </a:extLst>
-                </a:hlinkClick>
-              </a:rPr>
-              <a:t>https://docs.docker.com/glossary/</a:t>
-            </a:r>
-            <a:endParaRPr lang="en-US" dirty="0"/>
-          </a:p>
-          <a:p>
-            <a:pPr lvl="1"/>
-            <a:endParaRPr lang="en-US" dirty="0"/>
-          </a:p>
-          <a:p>
-            <a:r>
-              <a:rPr lang="en-US" dirty="0"/>
-              <a:t>If you want to customize a Docker Image, you would use another Image and add your customizations on top by building another Image</a:t>
+              <a:t>See the changes in the container process</a:t>
             </a:r>
           </a:p>
         </p:txBody>
@@ -15094,7 +15185,7 @@
     </p:spTree>
     <p:extLst>
       <p:ext uri="{BB962C8B-B14F-4D97-AF65-F5344CB8AC3E}">
-        <p14:creationId xmlns:p14="http://schemas.microsoft.com/office/powerpoint/2010/main" val="1500381221"/>
+        <p14:creationId xmlns:p14="http://schemas.microsoft.com/office/powerpoint/2010/main" val="2896387629"/>
       </p:ext>
     </p:extLst>
   </p:cSld>
@@ -15138,7 +15229,7 @@
           <p:cNvPr id="2" name="Title 1">
             <a:extLst>
               <a:ext uri="{FF2B5EF4-FFF2-40B4-BE49-F238E27FC236}">
-                <a16:creationId xmlns:a16="http://schemas.microsoft.com/office/drawing/2014/main" id="{5808EFFC-C8DD-41AC-B234-B11E7903D761}"/>
+                <a16:creationId xmlns:a16="http://schemas.microsoft.com/office/drawing/2014/main" id="{9078C7A0-2DF8-4AD9-AB0C-B88FD31DE200}"/>
               </a:ext>
             </a:extLst>
           </p:cNvPr>
@@ -15156,7 +15247,7 @@
           <a:p>
             <a:r>
               <a:rPr lang="en-US" dirty="0"/>
-              <a:t>Container Details</a:t>
+              <a:t>How do I customize a Docker Container?</a:t>
             </a:r>
           </a:p>
         </p:txBody>
@@ -15166,7 +15257,7 @@
           <p:cNvPr id="3" name="Content Placeholder 2">
             <a:extLst>
               <a:ext uri="{FF2B5EF4-FFF2-40B4-BE49-F238E27FC236}">
-                <a16:creationId xmlns:a16="http://schemas.microsoft.com/office/drawing/2014/main" id="{FF33AE55-1497-4AF1-BBC4-685B8F077D14}"/>
+                <a16:creationId xmlns:a16="http://schemas.microsoft.com/office/drawing/2014/main" id="{5A8032B9-A811-4787-BE9A-333C3484892F}"/>
               </a:ext>
             </a:extLst>
           </p:cNvPr>
@@ -15184,73 +15275,90 @@
           <a:p>
             <a:r>
               <a:rPr lang="en-US" dirty="0"/>
-              <a:t>A way to isolate processes on a host OS</a:t>
-            </a:r>
-          </a:p>
-          <a:p>
+              <a:t>A couple of different ways: </a:t>
+            </a:r>
+          </a:p>
+          <a:p>
+            <a:pPr marL="800100" lvl="1" indent="-342900">
+              <a:buFont typeface="+mj-lt"/>
+              <a:buAutoNum type="arabicPeriod"/>
+            </a:pPr>
             <a:r>
               <a:rPr lang="en-US" dirty="0"/>
-              <a:t>Examples include Docker, BSD Jails, Solaris Zones, and Linux LXC</a:t>
-            </a:r>
-            <a:r>
-              <a:rPr lang="en-US" baseline="40000" dirty="0">
-                <a:solidFill>
-                  <a:srgbClr val="ACD433"/>
-                </a:solidFill>
-              </a:rPr>
-              <a:t>2</a:t>
-            </a:r>
+              <a:t>Create a post-deployment script (.ps1/.bat/.</a:t>
+            </a:r>
+            <a:r>
+              <a:rPr lang="en-US" dirty="0" err="1"/>
+              <a:t>sh</a:t>
+            </a:r>
+            <a:r>
+              <a:rPr lang="en-US" dirty="0"/>
+              <a:t>/.</a:t>
+            </a:r>
+            <a:r>
+              <a:rPr lang="en-US" dirty="0" err="1"/>
+              <a:t>py</a:t>
+            </a:r>
+            <a:r>
+              <a:rPr lang="en-US" dirty="0"/>
+              <a:t>)</a:t>
+            </a:r>
+          </a:p>
+          <a:p>
+            <a:pPr marL="800100" lvl="1" indent="-342900">
+              <a:buFont typeface="+mj-lt"/>
+              <a:buAutoNum type="arabicPeriod"/>
+            </a:pPr>
             <a:endParaRPr lang="en-US" dirty="0"/>
           </a:p>
           <a:p>
+            <a:pPr marL="800100" lvl="1" indent="-342900">
+              <a:buFont typeface="+mj-lt"/>
+              <a:buAutoNum type="arabicPeriod"/>
+            </a:pPr>
+            <a:r>
+              <a:rPr lang="en-US" u="sng" dirty="0"/>
+              <a:t>Much more common and recommended</a:t>
+            </a:r>
             <a:r>
               <a:rPr lang="en-US" dirty="0"/>
-              <a:t>Early versions of Docker ran on LXC</a:t>
-            </a:r>
-            <a:endParaRPr lang="en-US" baseline="40000" dirty="0">
-              <a:solidFill>
-                <a:srgbClr val="ACD433"/>
-              </a:solidFill>
-            </a:endParaRPr>
-          </a:p>
-          <a:p>
+              <a:t>: create an Image and </a:t>
+            </a:r>
+            <a:r>
+              <a:rPr lang="en-US" dirty="0" err="1"/>
+              <a:t>Dockerfile</a:t>
+            </a:r>
             <a:endParaRPr lang="en-US" dirty="0"/>
           </a:p>
-        </p:txBody>
-      </p:sp>
-      <p:sp>
-        <p:nvSpPr>
-          <p:cNvPr id="5" name="Footer Placeholder 4">
-            <a:extLst>
-              <a:ext uri="{FF2B5EF4-FFF2-40B4-BE49-F238E27FC236}">
-                <a16:creationId xmlns:a16="http://schemas.microsoft.com/office/drawing/2014/main" id="{95AE2E4C-5C8D-445E-808A-002CC4F8412F}"/>
-              </a:ext>
-            </a:extLst>
-          </p:cNvPr>
-          <p:cNvSpPr>
-            <a:spLocks noGrp="1"/>
-          </p:cNvSpPr>
-          <p:nvPr>
-            <p:ph type="ftr" sz="quarter" idx="11"/>
-          </p:nvPr>
-        </p:nvSpPr>
-        <p:spPr/>
-        <p:txBody>
-          <a:bodyPr/>
-          <a:lstStyle/>
-          <a:p>
-            <a:r>
-              <a:rPr lang="en-US"/>
-              <a:t>https://en.wikipedia.org/wiki/OS-level_virtualization</a:t>
-            </a:r>
-            <a:endParaRPr lang="en-US" dirty="0"/>
+          <a:p>
+            <a:pPr marL="1200150" lvl="2" indent="-342900"/>
+            <a:r>
+              <a:rPr lang="en-US" dirty="0"/>
+              <a:t>You’ll specify a parent image in a </a:t>
+            </a:r>
+            <a:r>
+              <a:rPr lang="en-US" dirty="0" err="1"/>
+              <a:t>Dockerfile</a:t>
+            </a:r>
+            <a:r>
+              <a:rPr lang="en-US" dirty="0"/>
+              <a:t> as the source, </a:t>
+            </a:r>
+            <a:r>
+              <a:rPr lang="en-US" u="sng" dirty="0"/>
+              <a:t>very</a:t>
+            </a:r>
+            <a:r>
+              <a:rPr lang="en-US" dirty="0"/>
+              <a:t> similar to a dependency in a Linux package</a:t>
+            </a:r>
           </a:p>
         </p:txBody>
       </p:sp>
     </p:spTree>
     <p:extLst>
       <p:ext uri="{BB962C8B-B14F-4D97-AF65-F5344CB8AC3E}">
-        <p14:creationId xmlns:p14="http://schemas.microsoft.com/office/powerpoint/2010/main" val="1964079524"/>
+        <p14:creationId xmlns:p14="http://schemas.microsoft.com/office/powerpoint/2010/main" val="431772287"/>
       </p:ext>
     </p:extLst>
   </p:cSld>
@@ -15294,6 +15402,345 @@
           <p:cNvPr id="2" name="Title 1">
             <a:extLst>
               <a:ext uri="{FF2B5EF4-FFF2-40B4-BE49-F238E27FC236}">
+                <a16:creationId xmlns:a16="http://schemas.microsoft.com/office/drawing/2014/main" id="{0BB0E5CC-A8D4-431F-9C70-07009634F72E}"/>
+              </a:ext>
+            </a:extLst>
+          </p:cNvPr>
+          <p:cNvSpPr>
+            <a:spLocks noGrp="1"/>
+          </p:cNvSpPr>
+          <p:nvPr>
+            <p:ph type="title"/>
+          </p:nvPr>
+        </p:nvSpPr>
+        <p:spPr/>
+        <p:txBody>
+          <a:bodyPr/>
+          <a:lstStyle/>
+          <a:p>
+            <a:r>
+              <a:rPr lang="en-US" dirty="0"/>
+              <a:t>What is a Docker Image?</a:t>
+            </a:r>
+          </a:p>
+        </p:txBody>
+      </p:sp>
+      <p:sp>
+        <p:nvSpPr>
+          <p:cNvPr id="3" name="Content Placeholder 2">
+            <a:extLst>
+              <a:ext uri="{FF2B5EF4-FFF2-40B4-BE49-F238E27FC236}">
+                <a16:creationId xmlns:a16="http://schemas.microsoft.com/office/drawing/2014/main" id="{45A80E1F-CB88-4380-8540-2A5A4E596B05}"/>
+              </a:ext>
+            </a:extLst>
+          </p:cNvPr>
+          <p:cNvSpPr>
+            <a:spLocks noGrp="1"/>
+          </p:cNvSpPr>
+          <p:nvPr>
+            <p:ph idx="1"/>
+          </p:nvPr>
+        </p:nvSpPr>
+        <p:spPr/>
+        <p:txBody>
+          <a:bodyPr>
+            <a:normAutofit fontScale="92500" lnSpcReduction="20000"/>
+          </a:bodyPr>
+          <a:lstStyle/>
+          <a:p>
+            <a:r>
+              <a:rPr lang="en-US" dirty="0"/>
+              <a:t>Docker Images:</a:t>
+            </a:r>
+          </a:p>
+          <a:p>
+            <a:pPr lvl="1"/>
+            <a:r>
+              <a:rPr lang="en-US" dirty="0"/>
+              <a:t>Are the basis or source of running a Container (sort-of similar to a DVD ISO)</a:t>
+            </a:r>
+          </a:p>
+          <a:p>
+            <a:pPr lvl="1"/>
+            <a:r>
+              <a:rPr lang="en-US" dirty="0"/>
+              <a:t>Consist of an ordered collection of root filesystem changes</a:t>
+            </a:r>
+          </a:p>
+          <a:p>
+            <a:pPr lvl="1"/>
+            <a:r>
+              <a:rPr lang="en-US" dirty="0"/>
+              <a:t>Have execution parameters that are run on first creation of a Container</a:t>
+            </a:r>
+          </a:p>
+          <a:p>
+            <a:pPr lvl="1"/>
+            <a:r>
+              <a:rPr lang="en-US" dirty="0"/>
+              <a:t>Do </a:t>
+            </a:r>
+            <a:r>
+              <a:rPr lang="en-US" u="sng" dirty="0"/>
+              <a:t>not</a:t>
+            </a:r>
+            <a:r>
+              <a:rPr lang="en-US" dirty="0"/>
+              <a:t> have state</a:t>
+            </a:r>
+          </a:p>
+          <a:p>
+            <a:pPr lvl="1"/>
+            <a:r>
+              <a:rPr lang="en-US" dirty="0"/>
+              <a:t>Never change</a:t>
+            </a:r>
+          </a:p>
+          <a:p>
+            <a:pPr lvl="1"/>
+            <a:r>
+              <a:rPr lang="en-US" dirty="0"/>
+              <a:t>Are usually downloaded from Docker Hub (but not always)</a:t>
+            </a:r>
+          </a:p>
+          <a:p>
+            <a:pPr lvl="1"/>
+            <a:r>
+              <a:rPr lang="en-US" dirty="0"/>
+              <a:t>Source: </a:t>
+            </a:r>
+            <a:r>
+              <a:rPr lang="en-US" dirty="0">
+                <a:solidFill>
+                  <a:srgbClr val="00B0F0"/>
+                </a:solidFill>
+                <a:hlinkClick r:id="rId2">
+                  <a:extLst>
+                    <a:ext uri="{A12FA001-AC4F-418D-AE19-62706E023703}">
+                      <ahyp:hlinkClr xmlns:ahyp="http://schemas.microsoft.com/office/drawing/2018/hyperlinkcolor" val="tx"/>
+                    </a:ext>
+                  </a:extLst>
+                </a:hlinkClick>
+              </a:rPr>
+              <a:t>https://docs.docker.com/glossary/</a:t>
+            </a:r>
+            <a:endParaRPr lang="en-US" dirty="0"/>
+          </a:p>
+          <a:p>
+            <a:pPr lvl="1"/>
+            <a:endParaRPr lang="en-US" dirty="0"/>
+          </a:p>
+          <a:p>
+            <a:r>
+              <a:rPr lang="en-US" dirty="0"/>
+              <a:t>If you want to customize a Docker Image, you would use another Image and add your customizations on top by building another Image</a:t>
+            </a:r>
+          </a:p>
+        </p:txBody>
+      </p:sp>
+    </p:spTree>
+    <p:extLst>
+      <p:ext uri="{BB962C8B-B14F-4D97-AF65-F5344CB8AC3E}">
+        <p14:creationId xmlns:p14="http://schemas.microsoft.com/office/powerpoint/2010/main" val="1500381221"/>
+      </p:ext>
+    </p:extLst>
+  </p:cSld>
+  <p:clrMapOvr>
+    <a:masterClrMapping/>
+  </p:clrMapOvr>
+  <mc:AlternateContent xmlns:mc="http://schemas.openxmlformats.org/markup-compatibility/2006" xmlns:p14="http://schemas.microsoft.com/office/powerpoint/2010/main">
+    <mc:Choice Requires="p14">
+      <p:transition p14:dur="400">
+        <p14:reveal/>
+      </p:transition>
+    </mc:Choice>
+    <mc:Fallback xmlns="">
+      <p:transition>
+        <p:fade/>
+      </p:transition>
+    </mc:Fallback>
+  </mc:AlternateContent>
+</p:sld>
+</file>
+
+<file path=ppt/slides/slide15.xml><?xml version="1.0" encoding="utf-8"?>
+<p:sld xmlns:a="http://schemas.openxmlformats.org/drawingml/2006/main" xmlns:r="http://schemas.openxmlformats.org/officeDocument/2006/relationships" xmlns:p="http://schemas.openxmlformats.org/presentationml/2006/main">
+  <p:cSld>
+    <p:spTree>
+      <p:nvGrpSpPr>
+        <p:cNvPr id="1" name=""/>
+        <p:cNvGrpSpPr/>
+        <p:nvPr/>
+      </p:nvGrpSpPr>
+      <p:grpSpPr>
+        <a:xfrm>
+          <a:off x="0" y="0"/>
+          <a:ext cx="0" cy="0"/>
+          <a:chOff x="0" y="0"/>
+          <a:chExt cx="0" cy="0"/>
+        </a:xfrm>
+      </p:grpSpPr>
+      <p:sp>
+        <p:nvSpPr>
+          <p:cNvPr id="2" name="Title 1">
+            <a:extLst>
+              <a:ext uri="{FF2B5EF4-FFF2-40B4-BE49-F238E27FC236}">
+                <a16:creationId xmlns:a16="http://schemas.microsoft.com/office/drawing/2014/main" id="{5808EFFC-C8DD-41AC-B234-B11E7903D761}"/>
+              </a:ext>
+            </a:extLst>
+          </p:cNvPr>
+          <p:cNvSpPr>
+            <a:spLocks noGrp="1"/>
+          </p:cNvSpPr>
+          <p:nvPr>
+            <p:ph type="title"/>
+          </p:nvPr>
+        </p:nvSpPr>
+        <p:spPr/>
+        <p:txBody>
+          <a:bodyPr/>
+          <a:lstStyle/>
+          <a:p>
+            <a:r>
+              <a:rPr lang="en-US" dirty="0"/>
+              <a:t>Container Details</a:t>
+            </a:r>
+          </a:p>
+        </p:txBody>
+      </p:sp>
+      <p:sp>
+        <p:nvSpPr>
+          <p:cNvPr id="3" name="Content Placeholder 2">
+            <a:extLst>
+              <a:ext uri="{FF2B5EF4-FFF2-40B4-BE49-F238E27FC236}">
+                <a16:creationId xmlns:a16="http://schemas.microsoft.com/office/drawing/2014/main" id="{FF33AE55-1497-4AF1-BBC4-685B8F077D14}"/>
+              </a:ext>
+            </a:extLst>
+          </p:cNvPr>
+          <p:cNvSpPr>
+            <a:spLocks noGrp="1"/>
+          </p:cNvSpPr>
+          <p:nvPr>
+            <p:ph idx="1"/>
+          </p:nvPr>
+        </p:nvSpPr>
+        <p:spPr/>
+        <p:txBody>
+          <a:bodyPr/>
+          <a:lstStyle/>
+          <a:p>
+            <a:r>
+              <a:rPr lang="en-US" dirty="0"/>
+              <a:t>A way to isolate processes on a host OS</a:t>
+            </a:r>
+          </a:p>
+          <a:p>
+            <a:r>
+              <a:rPr lang="en-US" dirty="0"/>
+              <a:t>Examples include Docker, BSD Jails, Solaris Zones, and Linux LXC</a:t>
+            </a:r>
+            <a:r>
+              <a:rPr lang="en-US" baseline="40000" dirty="0">
+                <a:solidFill>
+                  <a:srgbClr val="ACD433"/>
+                </a:solidFill>
+              </a:rPr>
+              <a:t>2</a:t>
+            </a:r>
+            <a:endParaRPr lang="en-US" dirty="0"/>
+          </a:p>
+          <a:p>
+            <a:r>
+              <a:rPr lang="en-US" dirty="0"/>
+              <a:t>Early versions of Docker ran on LXC</a:t>
+            </a:r>
+            <a:endParaRPr lang="en-US" baseline="40000" dirty="0">
+              <a:solidFill>
+                <a:srgbClr val="ACD433"/>
+              </a:solidFill>
+            </a:endParaRPr>
+          </a:p>
+          <a:p>
+            <a:endParaRPr lang="en-US" dirty="0"/>
+          </a:p>
+        </p:txBody>
+      </p:sp>
+      <p:sp>
+        <p:nvSpPr>
+          <p:cNvPr id="5" name="Footer Placeholder 4">
+            <a:extLst>
+              <a:ext uri="{FF2B5EF4-FFF2-40B4-BE49-F238E27FC236}">
+                <a16:creationId xmlns:a16="http://schemas.microsoft.com/office/drawing/2014/main" id="{95AE2E4C-5C8D-445E-808A-002CC4F8412F}"/>
+              </a:ext>
+            </a:extLst>
+          </p:cNvPr>
+          <p:cNvSpPr>
+            <a:spLocks noGrp="1"/>
+          </p:cNvSpPr>
+          <p:nvPr>
+            <p:ph type="ftr" sz="quarter" idx="11"/>
+          </p:nvPr>
+        </p:nvSpPr>
+        <p:spPr/>
+        <p:txBody>
+          <a:bodyPr/>
+          <a:lstStyle/>
+          <a:p>
+            <a:r>
+              <a:rPr lang="en-US"/>
+              <a:t>https://en.wikipedia.org/wiki/OS-level_virtualization</a:t>
+            </a:r>
+            <a:endParaRPr lang="en-US" dirty="0"/>
+          </a:p>
+        </p:txBody>
+      </p:sp>
+    </p:spTree>
+    <p:extLst>
+      <p:ext uri="{BB962C8B-B14F-4D97-AF65-F5344CB8AC3E}">
+        <p14:creationId xmlns:p14="http://schemas.microsoft.com/office/powerpoint/2010/main" val="1964079524"/>
+      </p:ext>
+    </p:extLst>
+  </p:cSld>
+  <p:clrMapOvr>
+    <a:masterClrMapping/>
+  </p:clrMapOvr>
+  <mc:AlternateContent xmlns:mc="http://schemas.openxmlformats.org/markup-compatibility/2006" xmlns:p14="http://schemas.microsoft.com/office/powerpoint/2010/main">
+    <mc:Choice Requires="p14">
+      <p:transition p14:dur="400">
+        <p14:reveal/>
+      </p:transition>
+    </mc:Choice>
+    <mc:Fallback xmlns="">
+      <p:transition>
+        <p:fade/>
+      </p:transition>
+    </mc:Fallback>
+  </mc:AlternateContent>
+</p:sld>
+</file>
+
+<file path=ppt/slides/slide16.xml><?xml version="1.0" encoding="utf-8"?>
+<p:sld xmlns:a="http://schemas.openxmlformats.org/drawingml/2006/main" xmlns:r="http://schemas.openxmlformats.org/officeDocument/2006/relationships" xmlns:p="http://schemas.openxmlformats.org/presentationml/2006/main">
+  <p:cSld>
+    <p:spTree>
+      <p:nvGrpSpPr>
+        <p:cNvPr id="1" name=""/>
+        <p:cNvGrpSpPr/>
+        <p:nvPr/>
+      </p:nvGrpSpPr>
+      <p:grpSpPr>
+        <a:xfrm>
+          <a:off x="0" y="0"/>
+          <a:ext cx="0" cy="0"/>
+          <a:chOff x="0" y="0"/>
+          <a:chExt cx="0" cy="0"/>
+        </a:xfrm>
+      </p:grpSpPr>
+      <p:sp>
+        <p:nvSpPr>
+          <p:cNvPr id="2" name="Title 1">
+            <a:extLst>
+              <a:ext uri="{FF2B5EF4-FFF2-40B4-BE49-F238E27FC236}">
                 <a16:creationId xmlns:a16="http://schemas.microsoft.com/office/drawing/2014/main" id="{13E6CBA8-911E-4136-91A5-63371D4405EE}"/>
               </a:ext>
             </a:extLst>
@@ -15362,6 +15809,44 @@
             </a:r>
           </a:p>
           <a:p>
+            <a:pPr lvl="1"/>
+            <a:r>
+              <a:rPr lang="en-US" dirty="0"/>
+              <a:t>Her article on Docker is a great way to get started in a short amount of time</a:t>
+            </a:r>
+            <a:br>
+              <a:rPr lang="en-US" dirty="0"/>
+            </a:br>
+            <a:r>
+              <a:rPr lang="en-US" dirty="0">
+                <a:solidFill>
+                  <a:schemeClr val="accent4">
+                    <a:lumMod val="75000"/>
+                  </a:schemeClr>
+                </a:solidFill>
+                <a:hlinkClick r:id="rId2">
+                  <a:extLst>
+                    <a:ext uri="{A12FA001-AC4F-418D-AE19-62706E023703}">
+                      <ahyp:hlinkClr xmlns:ahyp="http://schemas.microsoft.com/office/drawing/2018/hyperlinkcolor" val="tx"/>
+                    </a:ext>
+                  </a:extLst>
+                </a:hlinkClick>
+              </a:rPr>
+              <a:t>https://www.cathrinewilhelmsen.net/2018/12/02/sql-server-2019-docker-container/</a:t>
+            </a:r>
+            <a:endParaRPr lang="en-US" dirty="0">
+              <a:solidFill>
+                <a:schemeClr val="accent4">
+                  <a:lumMod val="75000"/>
+                </a:schemeClr>
+              </a:solidFill>
+            </a:endParaRPr>
+          </a:p>
+          <a:p>
+            <a:pPr lvl="1"/>
+            <a:endParaRPr lang="en-US" dirty="0"/>
+          </a:p>
+          <a:p>
             <a:pPr>
               <a:buFont typeface="+mj-lt"/>
               <a:buAutoNum type="arabicPeriod"/>
@@ -15386,6 +15871,46 @@
               <a:rPr lang="en-US" dirty="0"/>
               <a:t>)</a:t>
             </a:r>
+          </a:p>
+          <a:p>
+            <a:pPr lvl="1"/>
+            <a:r>
+              <a:rPr lang="en-US" dirty="0"/>
+              <a:t>His container series is phenomenal</a:t>
+            </a:r>
+            <a:br>
+              <a:rPr lang="en-US" dirty="0"/>
+            </a:br>
+            <a:r>
+              <a:rPr lang="en-US" dirty="0">
+                <a:solidFill>
+                  <a:schemeClr val="accent4">
+                    <a:lumMod val="75000"/>
+                  </a:schemeClr>
+                </a:solidFill>
+                <a:hlinkClick r:id="rId3">
+                  <a:extLst>
+                    <a:ext uri="{A12FA001-AC4F-418D-AE19-62706E023703}">
+                      <ahyp:hlinkClr xmlns:ahyp="http://schemas.microsoft.com/office/drawing/2018/hyperlinkcolor" val="tx"/>
+                    </a:ext>
+                  </a:extLst>
+                </a:hlinkClick>
+              </a:rPr>
+              <a:t>https://dbafromthecold.com/2017/03/15/summary-of-my-container-series/</a:t>
+            </a:r>
+            <a:endParaRPr lang="en-US" dirty="0">
+              <a:solidFill>
+                <a:schemeClr val="accent4">
+                  <a:lumMod val="75000"/>
+                </a:schemeClr>
+              </a:solidFill>
+            </a:endParaRPr>
+          </a:p>
+          <a:p>
+            <a:pPr marL="457200" lvl="1" indent="0">
+              <a:buNone/>
+            </a:pPr>
+            <a:endParaRPr lang="en-US" dirty="0"/>
           </a:p>
         </p:txBody>
       </p:sp>
@@ -15531,10 +16056,9 @@
           <a:lstStyle/>
           <a:p>
             <a:r>
-              <a:rPr lang="en-US"/>
+              <a:rPr lang="en-US" dirty="0"/>
               <a:t>https://en.wikipedia.org/wiki/Docker_(software)</a:t>
             </a:r>
-            <a:endParaRPr lang="en-US" dirty="0"/>
           </a:p>
         </p:txBody>
       </p:sp>
@@ -15630,9 +16154,6 @@
             <a:normAutofit/>
           </a:bodyPr>
           <a:lstStyle/>
-          <a:p>
-            <a:endParaRPr lang="en-US" sz="2400" dirty="0"/>
-          </a:p>
           <a:p>
             <a:r>
               <a:rPr lang="en-US" sz="2400" dirty="0"/>
@@ -18570,7 +19091,12 @@
             <p:ph idx="1"/>
           </p:nvPr>
         </p:nvSpPr>
-        <p:spPr/>
+        <p:spPr>
+          <a:xfrm>
+            <a:off x="1154954" y="2640260"/>
+            <a:ext cx="8761412" cy="3416300"/>
+          </a:xfrm>
+        </p:spPr>
         <p:txBody>
           <a:bodyPr/>
           <a:lstStyle/>
@@ -18579,6 +19105,9 @@
               <a:rPr lang="en-US" dirty="0"/>
               <a:t>Start our container (SQL14)</a:t>
             </a:r>
+          </a:p>
+          <a:p>
+            <a:endParaRPr lang="en-US" dirty="0"/>
           </a:p>
           <a:p>
             <a:endParaRPr lang="en-US" dirty="0"/>
@@ -18716,7 +19245,7 @@
             </a:pPr>
             <a:r>
               <a:rPr lang="en-US" dirty="0"/>
-              <a:t>Bind Mounts</a:t>
+              <a:t>Bind Mounts (we used this in Demo #1 with the run command)</a:t>
             </a:r>
           </a:p>
           <a:p>

</xml_diff>

<commit_message>
Added slides for dockerfiles and volumes
</commit_message>
<xml_diff>
--- a/Developing for SQL Server with Docker.pptx
+++ b/Developing for SQL Server with Docker.pptx
@@ -5,7 +5,7 @@
     <p:sldMasterId id="2147483648" r:id="rId1"/>
   </p:sldMasterIdLst>
   <p:notesMasterIdLst>
-    <p:notesMasterId r:id="rId18"/>
+    <p:notesMasterId r:id="rId21"/>
   </p:notesMasterIdLst>
   <p:sldIdLst>
     <p:sldId id="256" r:id="rId2"/>
@@ -18,12 +18,15 @@
     <p:sldId id="265" r:id="rId9"/>
     <p:sldId id="261" r:id="rId10"/>
     <p:sldId id="271" r:id="rId11"/>
-    <p:sldId id="272" r:id="rId12"/>
-    <p:sldId id="270" r:id="rId13"/>
-    <p:sldId id="263" r:id="rId14"/>
-    <p:sldId id="267" r:id="rId15"/>
-    <p:sldId id="268" r:id="rId16"/>
-    <p:sldId id="269" r:id="rId17"/>
+    <p:sldId id="273" r:id="rId12"/>
+    <p:sldId id="272" r:id="rId13"/>
+    <p:sldId id="270" r:id="rId14"/>
+    <p:sldId id="263" r:id="rId15"/>
+    <p:sldId id="267" r:id="rId16"/>
+    <p:sldId id="274" r:id="rId17"/>
+    <p:sldId id="275" r:id="rId18"/>
+    <p:sldId id="268" r:id="rId19"/>
+    <p:sldId id="269" r:id="rId20"/>
   </p:sldIdLst>
   <p:sldSz cx="12192000" cy="6858000"/>
   <p:notesSz cx="6858000" cy="9144000"/>
@@ -223,7 +226,7 @@
           <a:p>
             <a:fld id="{1C146976-FE24-468C-9E36-42E55C1289BE}" type="datetimeFigureOut">
               <a:rPr lang="en-US" smtClean="0"/>
-              <a:t>2/26/2020</a:t>
+              <a:t>2/27/2020</a:t>
             </a:fld>
             <a:endParaRPr lang="en-US"/>
           </a:p>
@@ -893,7 +896,91 @@
           <a:p>
             <a:fld id="{B07B5B4F-0F75-48F2-BFB2-73D5ADCDF733}" type="slidenum">
               <a:rPr lang="en-US" smtClean="0"/>
-              <a:t>13</a:t>
+              <a:t>12</a:t>
+            </a:fld>
+            <a:endParaRPr lang="en-US"/>
+          </a:p>
+        </p:txBody>
+      </p:sp>
+    </p:spTree>
+    <p:extLst>
+      <p:ext uri="{BB962C8B-B14F-4D97-AF65-F5344CB8AC3E}">
+        <p14:creationId xmlns:p14="http://schemas.microsoft.com/office/powerpoint/2010/main" val="3062470410"/>
+      </p:ext>
+    </p:extLst>
+  </p:cSld>
+  <p:clrMapOvr>
+    <a:masterClrMapping/>
+  </p:clrMapOvr>
+</p:notes>
+</file>
+
+<file path=ppt/notesSlides/notesSlide5.xml><?xml version="1.0" encoding="utf-8"?>
+<p:notes xmlns:a="http://schemas.openxmlformats.org/drawingml/2006/main" xmlns:r="http://schemas.openxmlformats.org/officeDocument/2006/relationships" xmlns:p="http://schemas.openxmlformats.org/presentationml/2006/main">
+  <p:cSld>
+    <p:spTree>
+      <p:nvGrpSpPr>
+        <p:cNvPr id="1" name=""/>
+        <p:cNvGrpSpPr/>
+        <p:nvPr/>
+      </p:nvGrpSpPr>
+      <p:grpSpPr>
+        <a:xfrm>
+          <a:off x="0" y="0"/>
+          <a:ext cx="0" cy="0"/>
+          <a:chOff x="0" y="0"/>
+          <a:chExt cx="0" cy="0"/>
+        </a:xfrm>
+      </p:grpSpPr>
+      <p:sp>
+        <p:nvSpPr>
+          <p:cNvPr id="2" name="Slide Image Placeholder 1"/>
+          <p:cNvSpPr>
+            <a:spLocks noGrp="1" noRot="1" noChangeAspect="1"/>
+          </p:cNvSpPr>
+          <p:nvPr>
+            <p:ph type="sldImg"/>
+          </p:nvPr>
+        </p:nvSpPr>
+        <p:spPr/>
+      </p:sp>
+      <p:sp>
+        <p:nvSpPr>
+          <p:cNvPr id="3" name="Notes Placeholder 2"/>
+          <p:cNvSpPr>
+            <a:spLocks noGrp="1"/>
+          </p:cNvSpPr>
+          <p:nvPr>
+            <p:ph type="body" idx="1"/>
+          </p:nvPr>
+        </p:nvSpPr>
+        <p:spPr/>
+        <p:txBody>
+          <a:bodyPr/>
+          <a:lstStyle/>
+          <a:p>
+            <a:endParaRPr lang="en-US" dirty="0"/>
+          </a:p>
+        </p:txBody>
+      </p:sp>
+      <p:sp>
+        <p:nvSpPr>
+          <p:cNvPr id="4" name="Slide Number Placeholder 3"/>
+          <p:cNvSpPr>
+            <a:spLocks noGrp="1"/>
+          </p:cNvSpPr>
+          <p:nvPr>
+            <p:ph type="sldNum" sz="quarter" idx="5"/>
+          </p:nvPr>
+        </p:nvSpPr>
+        <p:spPr/>
+        <p:txBody>
+          <a:bodyPr/>
+          <a:lstStyle/>
+          <a:p>
+            <a:fld id="{B07B5B4F-0F75-48F2-BFB2-73D5ADCDF733}" type="slidenum">
+              <a:rPr lang="en-US" smtClean="0"/>
+              <a:t>14</a:t>
             </a:fld>
             <a:endParaRPr lang="en-US"/>
           </a:p>
@@ -1559,7 +1646,7 @@
             <a:fld id="{1E700B27-DE4C-4B9E-BB11-B9027034A00F}" type="datetimeFigureOut">
               <a:rPr lang="en-US" smtClean="0"/>
               <a:pPr/>
-              <a:t>2/26/2020</a:t>
+              <a:t>2/27/2020</a:t>
             </a:fld>
             <a:endParaRPr lang="en-US" dirty="0"/>
           </a:p>
@@ -2687,7 +2774,7 @@
           <a:p>
             <a:fld id="{C40F4739-9812-4A9F-890D-2AD6BA5F6EE8}" type="datetimeFigureOut">
               <a:rPr lang="en-US" smtClean="0"/>
-              <a:t>2/26/2020</a:t>
+              <a:t>2/27/2020</a:t>
             </a:fld>
             <a:endParaRPr lang="en-US" dirty="0"/>
           </a:p>
@@ -3706,7 +3793,7 @@
           <a:p>
             <a:fld id="{18845AC5-A3F8-44AA-BA8F-596CDCC976D3}" type="datetimeFigureOut">
               <a:rPr lang="en-US" smtClean="0"/>
-              <a:t>2/26/2020</a:t>
+              <a:t>2/27/2020</a:t>
             </a:fld>
             <a:endParaRPr lang="en-US" dirty="0"/>
           </a:p>
@@ -4884,7 +4971,7 @@
           <a:p>
             <a:fld id="{C873B183-A821-4095-A363-9EC968635539}" type="datetimeFigureOut">
               <a:rPr lang="en-US" smtClean="0"/>
-              <a:t>2/26/2020</a:t>
+              <a:t>2/27/2020</a:t>
             </a:fld>
             <a:endParaRPr lang="en-US" dirty="0"/>
           </a:p>
@@ -5953,7 +6040,7 @@
           <a:p>
             <a:fld id="{174D01B4-0AA5-45E6-B2E6-5FA4078AEBCF}" type="datetimeFigureOut">
               <a:rPr lang="en-US" smtClean="0"/>
-              <a:t>2/26/2020</a:t>
+              <a:t>2/27/2020</a:t>
             </a:fld>
             <a:endParaRPr lang="en-US" dirty="0"/>
           </a:p>
@@ -6607,7 +6694,7 @@
           <a:p>
             <a:fld id="{4147335C-0450-40D7-8612-B3203BED4F28}" type="datetimeFigureOut">
               <a:rPr lang="en-US" smtClean="0"/>
-              <a:t>2/26/2020</a:t>
+              <a:t>2/27/2020</a:t>
             </a:fld>
             <a:endParaRPr lang="en-US" dirty="0"/>
           </a:p>
@@ -7462,7 +7549,7 @@
           <a:p>
             <a:fld id="{D246A105-2A1C-4284-B4EA-07CF89B1A393}" type="datetimeFigureOut">
               <a:rPr lang="en-US" smtClean="0"/>
-              <a:t>2/26/2020</a:t>
+              <a:t>2/27/2020</a:t>
             </a:fld>
             <a:endParaRPr lang="en-US" dirty="0"/>
           </a:p>
@@ -7645,7 +7732,7 @@
           <a:p>
             <a:fld id="{80DBE609-F3F2-45E6-BD6A-E03A8C86C1AE}" type="datetimeFigureOut">
               <a:rPr lang="en-US" smtClean="0"/>
-              <a:t>2/26/2020</a:t>
+              <a:t>2/27/2020</a:t>
             </a:fld>
             <a:endParaRPr lang="en-US" dirty="0"/>
           </a:p>
@@ -8651,7 +8738,7 @@
           <a:p>
             <a:fld id="{7A24AD68-089C-4467-A8F3-EA2BBCA6B44E}" type="datetimeFigureOut">
               <a:rPr lang="en-US" smtClean="0"/>
-              <a:t>2/26/2020</a:t>
+              <a:t>2/27/2020</a:t>
             </a:fld>
             <a:endParaRPr lang="en-US" dirty="0"/>
           </a:p>
@@ -8865,7 +8952,7 @@
           <a:p>
             <a:fld id="{75C51FCE-E4BB-4680-8E50-3C0E348D2609}" type="datetimeFigureOut">
               <a:rPr lang="en-US" smtClean="0"/>
-              <a:t>2/26/2020</a:t>
+              <a:t>2/27/2020</a:t>
             </a:fld>
             <a:endParaRPr lang="en-US" dirty="0"/>
           </a:p>
@@ -9935,7 +10022,7 @@
           <a:p>
             <a:fld id="{8AAA073D-A903-47F8-8D16-77642FB0DF1F}" type="datetimeFigureOut">
               <a:rPr lang="en-US" smtClean="0"/>
-              <a:t>2/26/2020</a:t>
+              <a:t>2/27/2020</a:t>
             </a:fld>
             <a:endParaRPr lang="en-US" dirty="0"/>
           </a:p>
@@ -10215,7 +10302,7 @@
           <a:p>
             <a:fld id="{AB91FA40-626B-4CA1-85D0-7A9016E395BA}" type="datetimeFigureOut">
               <a:rPr lang="en-US" smtClean="0"/>
-              <a:t>2/26/2020</a:t>
+              <a:t>2/27/2020</a:t>
             </a:fld>
             <a:endParaRPr lang="en-US" dirty="0"/>
           </a:p>
@@ -10605,7 +10692,7 @@
           <a:p>
             <a:fld id="{C3F425EA-B9DC-48A7-991E-9A82573B1B21}" type="datetimeFigureOut">
               <a:rPr lang="en-US" smtClean="0"/>
-              <a:t>2/26/2020</a:t>
+              <a:t>2/27/2020</a:t>
             </a:fld>
             <a:endParaRPr lang="en-US" dirty="0"/>
           </a:p>
@@ -10731,7 +10818,7 @@
           <a:p>
             <a:fld id="{66CB97F8-6CEB-469B-AFCC-889F2A2B1D5A}" type="datetimeFigureOut">
               <a:rPr lang="en-US" smtClean="0"/>
-              <a:t>2/26/2020</a:t>
+              <a:t>2/27/2020</a:t>
             </a:fld>
             <a:endParaRPr lang="en-US" dirty="0"/>
           </a:p>
@@ -10834,7 +10921,7 @@
           <a:p>
             <a:fld id="{8FA9179F-009E-4FA5-B091-7EBB82A185BD}" type="datetimeFigureOut">
               <a:rPr lang="en-US" smtClean="0"/>
-              <a:t>2/26/2020</a:t>
+              <a:t>2/27/2020</a:t>
             </a:fld>
             <a:endParaRPr lang="en-US" dirty="0"/>
           </a:p>
@@ -11951,7 +12038,7 @@
           <a:p>
             <a:fld id="{8E665CEB-0076-4E37-B880-BCEA9784DE0A}" type="datetimeFigureOut">
               <a:rPr lang="en-US" smtClean="0"/>
-              <a:t>2/26/2020</a:t>
+              <a:t>2/27/2020</a:t>
             </a:fld>
             <a:endParaRPr lang="en-US" dirty="0"/>
           </a:p>
@@ -13092,7 +13179,7 @@
           <a:p>
             <a:fld id="{A6149E5E-3896-4118-99A7-7B85668F1C5E}" type="datetimeFigureOut">
               <a:rPr lang="en-US" smtClean="0"/>
-              <a:t>2/26/2020</a:t>
+              <a:t>2/27/2020</a:t>
             </a:fld>
             <a:endParaRPr lang="en-US" dirty="0"/>
           </a:p>
@@ -14128,7 +14215,7 @@
           <a:p>
             <a:fld id="{7E0D914D-B099-4142-A885-11F276715148}" type="datetimeFigureOut">
               <a:rPr lang="en-US" smtClean="0"/>
-              <a:t>2/26/2020</a:t>
+              <a:t>2/27/2020</a:t>
             </a:fld>
             <a:endParaRPr lang="en-US" dirty="0"/>
           </a:p>
@@ -14816,7 +14903,7 @@
           <a:p>
             <a:r>
               <a:rPr lang="en-US" dirty="0"/>
-              <a:t>Bind Mounts and Named Volumes</a:t>
+              <a:t>Docker Desktop Settings</a:t>
             </a:r>
           </a:p>
         </p:txBody>
@@ -14929,7 +15016,7 @@
           <p:cNvPr id="2" name="Title 1">
             <a:extLst>
               <a:ext uri="{FF2B5EF4-FFF2-40B4-BE49-F238E27FC236}">
-                <a16:creationId xmlns:a16="http://schemas.microsoft.com/office/drawing/2014/main" id="{CF611510-59AA-424B-BE27-86AB8C743884}"/>
+                <a16:creationId xmlns:a16="http://schemas.microsoft.com/office/drawing/2014/main" id="{0D1F941A-9AE1-4F59-A732-C1699CC7C84C}"/>
               </a:ext>
             </a:extLst>
           </p:cNvPr>
@@ -14947,7 +15034,7 @@
           <a:p>
             <a:r>
               <a:rPr lang="en-US" dirty="0"/>
-              <a:t>Bind Mounts and Named Volumes</a:t>
+              <a:t>Bind Mount vs Named Volume?</a:t>
             </a:r>
           </a:p>
         </p:txBody>
@@ -14957,7 +15044,7 @@
           <p:cNvPr id="3" name="Content Placeholder 2">
             <a:extLst>
               <a:ext uri="{FF2B5EF4-FFF2-40B4-BE49-F238E27FC236}">
-                <a16:creationId xmlns:a16="http://schemas.microsoft.com/office/drawing/2014/main" id="{AA1AEFE1-E8CF-44CA-9AB0-50498512DE75}"/>
+                <a16:creationId xmlns:a16="http://schemas.microsoft.com/office/drawing/2014/main" id="{741C4887-873C-48D9-9808-DF38BEEA79A7}"/>
               </a:ext>
             </a:extLst>
           </p:cNvPr>
@@ -14975,107 +15062,73 @@
           <a:p>
             <a:r>
               <a:rPr lang="en-US" dirty="0"/>
-              <a:t>Guidelines</a:t>
-            </a:r>
-          </a:p>
-          <a:p>
-            <a:pPr lvl="1"/>
+              <a:t>Volumes separate the local filesystem path from the logical name of the storage path</a:t>
+            </a:r>
+          </a:p>
+          <a:p>
             <a:r>
               <a:rPr lang="en-US" dirty="0"/>
-              <a:t>Linux Containers on Docker for Windows - use a Bind Mount</a:t>
-            </a:r>
-          </a:p>
-          <a:p>
-            <a:pPr lvl="1"/>
+              <a:t>Named volumes can use drivers or plugins to go to Azure or S3 storage (to name just a few types)</a:t>
+            </a:r>
+          </a:p>
+          <a:p>
             <a:r>
               <a:rPr lang="en-US" dirty="0"/>
-              <a:t>Windows Containers on Docker for Windows - use Bind Mounts or Named Volumes</a:t>
+              <a:t>Bind Mounts make a 1:1 link from local filesystem to the Container’s paths</a:t>
             </a:r>
           </a:p>
           <a:p>
             <a:r>
               <a:rPr lang="en-US" dirty="0"/>
-              <a:t>Create a named volume:</a:t>
+              <a:t>Using Windows 10 Docker Desktop (at time of presentation)?</a:t>
             </a:r>
             <a:br>
               <a:rPr lang="en-US" dirty="0"/>
             </a:br>
             <a:r>
+              <a:rPr lang="en-US" dirty="0"/>
+              <a:t>	</a:t>
+            </a:r>
+            <a:r>
               <a:rPr lang="en-US" dirty="0">
                 <a:solidFill>
-                  <a:schemeClr val="accent4">
-                    <a:lumMod val="50000"/>
+                  <a:schemeClr val="accent3">
+                    <a:lumMod val="75000"/>
                   </a:schemeClr>
                 </a:solidFill>
-                <a:latin typeface="Consolas" panose="020B0609020204030204" pitchFamily="49" charset="0"/>
               </a:rPr>
-              <a:t>docker volume create </a:t>
-            </a:r>
-            <a:r>
-              <a:rPr lang="en-US" dirty="0" err="1">
-                <a:solidFill>
-                  <a:schemeClr val="accent4">
-                    <a:lumMod val="50000"/>
-                  </a:schemeClr>
-                </a:solidFill>
-                <a:latin typeface="Consolas" panose="020B0609020204030204" pitchFamily="49" charset="0"/>
-              </a:rPr>
-              <a:t>test_volume</a:t>
-            </a:r>
-            <a:endParaRPr lang="en-US" dirty="0">
-              <a:solidFill>
-                <a:schemeClr val="accent4">
-                  <a:lumMod val="50000"/>
-                </a:schemeClr>
-              </a:solidFill>
-              <a:latin typeface="Consolas" panose="020B0609020204030204" pitchFamily="49" charset="0"/>
-            </a:endParaRPr>
+              <a:t>Not a huge difference using either</a:t>
+            </a:r>
           </a:p>
           <a:p>
             <a:r>
               <a:rPr lang="en-US" dirty="0"/>
-              <a:t>See where the named volume lives on your OS:</a:t>
+              <a:t>Using any other platform?</a:t>
             </a:r>
             <a:br>
               <a:rPr lang="en-US" dirty="0"/>
             </a:br>
             <a:r>
+              <a:rPr lang="en-US" dirty="0"/>
+              <a:t>	</a:t>
+            </a:r>
+            <a:r>
               <a:rPr lang="en-US" dirty="0">
                 <a:solidFill>
-                  <a:schemeClr val="accent4">
-                    <a:lumMod val="50000"/>
+                  <a:schemeClr val="accent3">
+                    <a:lumMod val="75000"/>
                   </a:schemeClr>
                 </a:solidFill>
-                <a:latin typeface="Consolas" panose="020B0609020204030204" pitchFamily="49" charset="0"/>
               </a:rPr>
-              <a:t>docker volume inspect </a:t>
-            </a:r>
-            <a:r>
-              <a:rPr lang="en-US" dirty="0" err="1">
-                <a:solidFill>
-                  <a:schemeClr val="accent4">
-                    <a:lumMod val="50000"/>
-                  </a:schemeClr>
-                </a:solidFill>
-                <a:latin typeface="Consolas" panose="020B0609020204030204" pitchFamily="49" charset="0"/>
-              </a:rPr>
-              <a:t>test_volume</a:t>
-            </a:r>
-            <a:endParaRPr lang="en-US" dirty="0">
-              <a:solidFill>
-                <a:schemeClr val="accent4">
-                  <a:lumMod val="50000"/>
-                </a:schemeClr>
-              </a:solidFill>
-              <a:latin typeface="Consolas" panose="020B0609020204030204" pitchFamily="49" charset="0"/>
-            </a:endParaRPr>
+              <a:t>Seriously consider a Named Volume</a:t>
+            </a:r>
           </a:p>
         </p:txBody>
       </p:sp>
     </p:spTree>
     <p:extLst>
       <p:ext uri="{BB962C8B-B14F-4D97-AF65-F5344CB8AC3E}">
-        <p14:creationId xmlns:p14="http://schemas.microsoft.com/office/powerpoint/2010/main" val="760946740"/>
+        <p14:creationId xmlns:p14="http://schemas.microsoft.com/office/powerpoint/2010/main" val="1564863495"/>
       </p:ext>
     </p:extLst>
   </p:cSld>
@@ -15119,7 +15172,7 @@
           <p:cNvPr id="2" name="Title 1">
             <a:extLst>
               <a:ext uri="{FF2B5EF4-FFF2-40B4-BE49-F238E27FC236}">
-                <a16:creationId xmlns:a16="http://schemas.microsoft.com/office/drawing/2014/main" id="{5B880FCE-0B07-4665-8193-9DDBAB707A92}"/>
+                <a16:creationId xmlns:a16="http://schemas.microsoft.com/office/drawing/2014/main" id="{CF611510-59AA-424B-BE27-86AB8C743884}"/>
               </a:ext>
             </a:extLst>
           </p:cNvPr>
@@ -15137,7 +15190,7 @@
           <a:p>
             <a:r>
               <a:rPr lang="en-US" dirty="0"/>
-              <a:t>Demo #2 – Mounting a Volume</a:t>
+              <a:t>Bind Mounts and Named Volumes</a:t>
             </a:r>
           </a:p>
         </p:txBody>
@@ -15147,7 +15200,7 @@
           <p:cNvPr id="3" name="Content Placeholder 2">
             <a:extLst>
               <a:ext uri="{FF2B5EF4-FFF2-40B4-BE49-F238E27FC236}">
-                <a16:creationId xmlns:a16="http://schemas.microsoft.com/office/drawing/2014/main" id="{5FEEF222-F33C-4818-8009-8420D7E45C3B}"/>
+                <a16:creationId xmlns:a16="http://schemas.microsoft.com/office/drawing/2014/main" id="{AA1AEFE1-E8CF-44CA-9AB0-50498512DE75}"/>
               </a:ext>
             </a:extLst>
           </p:cNvPr>
@@ -15165,27 +15218,107 @@
           <a:p>
             <a:r>
               <a:rPr lang="en-US" dirty="0"/>
-              <a:t>Check our local path for the bind mount</a:t>
-            </a:r>
-          </a:p>
-          <a:p>
+              <a:t>Guidelines</a:t>
+            </a:r>
+          </a:p>
+          <a:p>
+            <a:pPr lvl="1"/>
             <a:r>
               <a:rPr lang="en-US" dirty="0"/>
-              <a:t>Copy files to there</a:t>
-            </a:r>
-          </a:p>
-          <a:p>
+              <a:t>Linux Containers on Docker for Windows - use a Bind Mount</a:t>
+            </a:r>
+          </a:p>
+          <a:p>
+            <a:pPr lvl="1"/>
             <a:r>
               <a:rPr lang="en-US" dirty="0"/>
-              <a:t>See the changes in the container process</a:t>
-            </a:r>
+              <a:t>Windows Containers on Docker for Windows - use Bind Mounts or Named Volumes</a:t>
+            </a:r>
+          </a:p>
+          <a:p>
+            <a:r>
+              <a:rPr lang="en-US" dirty="0"/>
+              <a:t>Create a named volume:</a:t>
+            </a:r>
+            <a:br>
+              <a:rPr lang="en-US" dirty="0"/>
+            </a:br>
+            <a:r>
+              <a:rPr lang="en-US" dirty="0">
+                <a:solidFill>
+                  <a:schemeClr val="accent4">
+                    <a:lumMod val="50000"/>
+                  </a:schemeClr>
+                </a:solidFill>
+                <a:latin typeface="Consolas" panose="020B0609020204030204" pitchFamily="49" charset="0"/>
+              </a:rPr>
+              <a:t>docker volume create </a:t>
+            </a:r>
+            <a:r>
+              <a:rPr lang="en-US" dirty="0" err="1">
+                <a:solidFill>
+                  <a:schemeClr val="accent4">
+                    <a:lumMod val="50000"/>
+                  </a:schemeClr>
+                </a:solidFill>
+                <a:latin typeface="Consolas" panose="020B0609020204030204" pitchFamily="49" charset="0"/>
+              </a:rPr>
+              <a:t>test_volume</a:t>
+            </a:r>
+            <a:endParaRPr lang="en-US" dirty="0">
+              <a:solidFill>
+                <a:schemeClr val="accent4">
+                  <a:lumMod val="50000"/>
+                </a:schemeClr>
+              </a:solidFill>
+              <a:latin typeface="Consolas" panose="020B0609020204030204" pitchFamily="49" charset="0"/>
+            </a:endParaRPr>
+          </a:p>
+          <a:p>
+            <a:r>
+              <a:rPr lang="en-US" dirty="0"/>
+              <a:t>See where the named volume lives on your OS:</a:t>
+            </a:r>
+            <a:br>
+              <a:rPr lang="en-US" dirty="0"/>
+            </a:br>
+            <a:r>
+              <a:rPr lang="en-US" dirty="0">
+                <a:solidFill>
+                  <a:schemeClr val="accent4">
+                    <a:lumMod val="50000"/>
+                  </a:schemeClr>
+                </a:solidFill>
+                <a:latin typeface="Consolas" panose="020B0609020204030204" pitchFamily="49" charset="0"/>
+              </a:rPr>
+              <a:t>docker volume inspect </a:t>
+            </a:r>
+            <a:r>
+              <a:rPr lang="en-US" dirty="0" err="1">
+                <a:solidFill>
+                  <a:schemeClr val="accent4">
+                    <a:lumMod val="50000"/>
+                  </a:schemeClr>
+                </a:solidFill>
+                <a:latin typeface="Consolas" panose="020B0609020204030204" pitchFamily="49" charset="0"/>
+              </a:rPr>
+              <a:t>test_volume</a:t>
+            </a:r>
+            <a:endParaRPr lang="en-US" dirty="0">
+              <a:solidFill>
+                <a:schemeClr val="accent4">
+                  <a:lumMod val="50000"/>
+                </a:schemeClr>
+              </a:solidFill>
+              <a:latin typeface="Consolas" panose="020B0609020204030204" pitchFamily="49" charset="0"/>
+            </a:endParaRPr>
           </a:p>
         </p:txBody>
       </p:sp>
     </p:spTree>
     <p:extLst>
       <p:ext uri="{BB962C8B-B14F-4D97-AF65-F5344CB8AC3E}">
-        <p14:creationId xmlns:p14="http://schemas.microsoft.com/office/powerpoint/2010/main" val="2896387629"/>
+        <p14:creationId xmlns:p14="http://schemas.microsoft.com/office/powerpoint/2010/main" val="760946740"/>
       </p:ext>
     </p:extLst>
   </p:cSld>
@@ -15229,7 +15362,7 @@
           <p:cNvPr id="2" name="Title 1">
             <a:extLst>
               <a:ext uri="{FF2B5EF4-FFF2-40B4-BE49-F238E27FC236}">
-                <a16:creationId xmlns:a16="http://schemas.microsoft.com/office/drawing/2014/main" id="{9078C7A0-2DF8-4AD9-AB0C-B88FD31DE200}"/>
+                <a16:creationId xmlns:a16="http://schemas.microsoft.com/office/drawing/2014/main" id="{5B880FCE-0B07-4665-8193-9DDBAB707A92}"/>
               </a:ext>
             </a:extLst>
           </p:cNvPr>
@@ -15247,7 +15380,7 @@
           <a:p>
             <a:r>
               <a:rPr lang="en-US" dirty="0"/>
-              <a:t>How do I customize a Docker Container?</a:t>
+              <a:t>Demo #2 – Mounting a Volume</a:t>
             </a:r>
           </a:p>
         </p:txBody>
@@ -15257,7 +15390,7 @@
           <p:cNvPr id="3" name="Content Placeholder 2">
             <a:extLst>
               <a:ext uri="{FF2B5EF4-FFF2-40B4-BE49-F238E27FC236}">
-                <a16:creationId xmlns:a16="http://schemas.microsoft.com/office/drawing/2014/main" id="{5A8032B9-A811-4787-BE9A-333C3484892F}"/>
+                <a16:creationId xmlns:a16="http://schemas.microsoft.com/office/drawing/2014/main" id="{5FEEF222-F33C-4818-8009-8420D7E45C3B}"/>
               </a:ext>
             </a:extLst>
           </p:cNvPr>
@@ -15275,82 +15408,19 @@
           <a:p>
             <a:r>
               <a:rPr lang="en-US" dirty="0"/>
-              <a:t>A couple of different ways: </a:t>
-            </a:r>
-          </a:p>
-          <a:p>
-            <a:pPr marL="800100" lvl="1" indent="-342900">
-              <a:buFont typeface="+mj-lt"/>
-              <a:buAutoNum type="arabicPeriod"/>
-            </a:pPr>
+              <a:t>Check our local path for the bind mount</a:t>
+            </a:r>
+          </a:p>
+          <a:p>
             <a:r>
               <a:rPr lang="en-US" dirty="0"/>
-              <a:t>Create a post-deployment script (.ps1/.bat/.</a:t>
-            </a:r>
-            <a:r>
-              <a:rPr lang="en-US" dirty="0" err="1"/>
-              <a:t>sh</a:t>
-            </a:r>
+              <a:t>Copy files to there</a:t>
+            </a:r>
+          </a:p>
+          <a:p>
             <a:r>
               <a:rPr lang="en-US" dirty="0"/>
-              <a:t>/.</a:t>
-            </a:r>
-            <a:r>
-              <a:rPr lang="en-US" dirty="0" err="1"/>
-              <a:t>py</a:t>
-            </a:r>
-            <a:r>
-              <a:rPr lang="en-US" dirty="0"/>
-              <a:t>)</a:t>
-            </a:r>
-          </a:p>
-          <a:p>
-            <a:pPr marL="800100" lvl="1" indent="-342900">
-              <a:buFont typeface="+mj-lt"/>
-              <a:buAutoNum type="arabicPeriod"/>
-            </a:pPr>
-            <a:endParaRPr lang="en-US" dirty="0"/>
-          </a:p>
-          <a:p>
-            <a:pPr marL="800100" lvl="1" indent="-342900">
-              <a:buFont typeface="+mj-lt"/>
-              <a:buAutoNum type="arabicPeriod"/>
-            </a:pPr>
-            <a:r>
-              <a:rPr lang="en-US" u="sng" dirty="0"/>
-              <a:t>Much more common and recommended</a:t>
-            </a:r>
-            <a:r>
-              <a:rPr lang="en-US" dirty="0"/>
-              <a:t>: create an Image and </a:t>
-            </a:r>
-            <a:r>
-              <a:rPr lang="en-US" dirty="0" err="1"/>
-              <a:t>Dockerfile</a:t>
-            </a:r>
-            <a:endParaRPr lang="en-US" dirty="0"/>
-          </a:p>
-          <a:p>
-            <a:pPr marL="1200150" lvl="2" indent="-342900"/>
-            <a:r>
-              <a:rPr lang="en-US" dirty="0"/>
-              <a:t>You’ll specify a parent image in a </a:t>
-            </a:r>
-            <a:r>
-              <a:rPr lang="en-US" dirty="0" err="1"/>
-              <a:t>Dockerfile</a:t>
-            </a:r>
-            <a:r>
-              <a:rPr lang="en-US" dirty="0"/>
-              <a:t> as the source, </a:t>
-            </a:r>
-            <a:r>
-              <a:rPr lang="en-US" u="sng" dirty="0"/>
-              <a:t>very</a:t>
-            </a:r>
-            <a:r>
-              <a:rPr lang="en-US" dirty="0"/>
-              <a:t> similar to a dependency in a Linux package</a:t>
+              <a:t>See the changes in the container process</a:t>
             </a:r>
           </a:p>
         </p:txBody>
@@ -15358,7 +15428,7 @@
     </p:spTree>
     <p:extLst>
       <p:ext uri="{BB962C8B-B14F-4D97-AF65-F5344CB8AC3E}">
-        <p14:creationId xmlns:p14="http://schemas.microsoft.com/office/powerpoint/2010/main" val="431772287"/>
+        <p14:creationId xmlns:p14="http://schemas.microsoft.com/office/powerpoint/2010/main" val="2896387629"/>
       </p:ext>
     </p:extLst>
   </p:cSld>
@@ -15402,7 +15472,7 @@
           <p:cNvPr id="2" name="Title 1">
             <a:extLst>
               <a:ext uri="{FF2B5EF4-FFF2-40B4-BE49-F238E27FC236}">
-                <a16:creationId xmlns:a16="http://schemas.microsoft.com/office/drawing/2014/main" id="{0BB0E5CC-A8D4-431F-9C70-07009634F72E}"/>
+                <a16:creationId xmlns:a16="http://schemas.microsoft.com/office/drawing/2014/main" id="{9078C7A0-2DF8-4AD9-AB0C-B88FD31DE200}"/>
               </a:ext>
             </a:extLst>
           </p:cNvPr>
@@ -15420,7 +15490,7 @@
           <a:p>
             <a:r>
               <a:rPr lang="en-US" dirty="0"/>
-              <a:t>What is a Docker Image?</a:t>
+              <a:t>How do I customize a Docker Container?</a:t>
             </a:r>
           </a:p>
         </p:txBody>
@@ -15430,7 +15500,7 @@
           <p:cNvPr id="3" name="Content Placeholder 2">
             <a:extLst>
               <a:ext uri="{FF2B5EF4-FFF2-40B4-BE49-F238E27FC236}">
-                <a16:creationId xmlns:a16="http://schemas.microsoft.com/office/drawing/2014/main" id="{45A80E1F-CB88-4380-8540-2A5A4E596B05}"/>
+                <a16:creationId xmlns:a16="http://schemas.microsoft.com/office/drawing/2014/main" id="{5A8032B9-A811-4787-BE9A-333C3484892F}"/>
               </a:ext>
             </a:extLst>
           </p:cNvPr>
@@ -15443,97 +15513,87 @@
         </p:nvSpPr>
         <p:spPr/>
         <p:txBody>
-          <a:bodyPr>
-            <a:normAutofit fontScale="92500" lnSpcReduction="20000"/>
-          </a:bodyPr>
+          <a:bodyPr/>
           <a:lstStyle/>
           <a:p>
             <a:r>
               <a:rPr lang="en-US" dirty="0"/>
-              <a:t>Docker Images:</a:t>
-            </a:r>
-          </a:p>
-          <a:p>
-            <a:pPr lvl="1"/>
+              <a:t>A couple of different ways: </a:t>
+            </a:r>
+          </a:p>
+          <a:p>
+            <a:pPr marL="800100" lvl="1" indent="-342900">
+              <a:buFont typeface="+mj-lt"/>
+              <a:buAutoNum type="arabicPeriod"/>
+            </a:pPr>
             <a:r>
               <a:rPr lang="en-US" dirty="0"/>
-              <a:t>Are the basis or source of running a Container (sort-of similar to a DVD ISO)</a:t>
-            </a:r>
-          </a:p>
-          <a:p>
-            <a:pPr lvl="1"/>
+              <a:t>Create a post-deployment script (.ps1/.bat/.</a:t>
+            </a:r>
+            <a:r>
+              <a:rPr lang="en-US" dirty="0" err="1"/>
+              <a:t>sh</a:t>
+            </a:r>
             <a:r>
               <a:rPr lang="en-US" dirty="0"/>
-              <a:t>Consist of an ordered collection of root filesystem changes</a:t>
-            </a:r>
-          </a:p>
-          <a:p>
-            <a:pPr lvl="1"/>
+              <a:t>/.</a:t>
+            </a:r>
+            <a:r>
+              <a:rPr lang="en-US" dirty="0" err="1"/>
+              <a:t>py</a:t>
+            </a:r>
             <a:r>
               <a:rPr lang="en-US" dirty="0"/>
-              <a:t>Have execution parameters that are run on first creation of a Container</a:t>
-            </a:r>
-          </a:p>
-          <a:p>
-            <a:pPr lvl="1"/>
+              <a:t>)</a:t>
+            </a:r>
+          </a:p>
+          <a:p>
+            <a:pPr marL="800100" lvl="1" indent="-342900">
+              <a:buFont typeface="+mj-lt"/>
+              <a:buAutoNum type="arabicPeriod"/>
+            </a:pPr>
+            <a:endParaRPr lang="en-US" dirty="0"/>
+          </a:p>
+          <a:p>
+            <a:pPr marL="800100" lvl="1" indent="-342900">
+              <a:buFont typeface="+mj-lt"/>
+              <a:buAutoNum type="arabicPeriod"/>
+            </a:pPr>
+            <a:r>
+              <a:rPr lang="en-US" u="sng" dirty="0"/>
+              <a:t>Much more common and recommended</a:t>
+            </a:r>
             <a:r>
               <a:rPr lang="en-US" dirty="0"/>
-              <a:t>Do </a:t>
+              <a:t>: create an Image using a </a:t>
+            </a:r>
+            <a:r>
+              <a:rPr lang="en-US" dirty="0" err="1"/>
+              <a:t>Dockerfile</a:t>
+            </a:r>
+            <a:endParaRPr lang="en-US" dirty="0"/>
+          </a:p>
+          <a:p>
+            <a:pPr marL="1200150" lvl="2" indent="-342900"/>
+            <a:r>
+              <a:rPr lang="en-US" dirty="0"/>
+              <a:t>You’ll specify a parent image in a </a:t>
+            </a:r>
+            <a:r>
+              <a:rPr lang="en-US" dirty="0" err="1"/>
+              <a:t>Dockerfile</a:t>
+            </a:r>
+            <a:r>
+              <a:rPr lang="en-US" dirty="0"/>
+              <a:t> as the source, </a:t>
             </a:r>
             <a:r>
               <a:rPr lang="en-US" u="sng" dirty="0"/>
-              <a:t>not</a:t>
+              <a:t>very</a:t>
             </a:r>
             <a:r>
               <a:rPr lang="en-US" dirty="0"/>
-              <a:t> have state</a:t>
-            </a:r>
-          </a:p>
-          <a:p>
-            <a:pPr lvl="1"/>
-            <a:r>
-              <a:rPr lang="en-US" dirty="0"/>
-              <a:t>Never change</a:t>
-            </a:r>
-          </a:p>
-          <a:p>
-            <a:pPr lvl="1"/>
-            <a:r>
-              <a:rPr lang="en-US" dirty="0"/>
-              <a:t>Are usually downloaded from Docker Hub (but not always)</a:t>
-            </a:r>
-          </a:p>
-          <a:p>
-            <a:pPr lvl="1"/>
-            <a:r>
-              <a:rPr lang="en-US" dirty="0"/>
-              <a:t>Source: </a:t>
-            </a:r>
-            <a:r>
-              <a:rPr lang="en-US" dirty="0">
-                <a:solidFill>
-                  <a:srgbClr val="00B0F0"/>
-                </a:solidFill>
-                <a:hlinkClick r:id="rId2">
-                  <a:extLst>
-                    <a:ext uri="{A12FA001-AC4F-418D-AE19-62706E023703}">
-                      <ahyp:hlinkClr xmlns:ahyp="http://schemas.microsoft.com/office/drawing/2018/hyperlinkcolor" val="tx"/>
-                    </a:ext>
-                  </a:extLst>
-                </a:hlinkClick>
-              </a:rPr>
-              <a:t>https://docs.docker.com/glossary/</a:t>
-            </a:r>
-            <a:endParaRPr lang="en-US" dirty="0"/>
-          </a:p>
-          <a:p>
-            <a:pPr lvl="1"/>
-            <a:endParaRPr lang="en-US" dirty="0"/>
-          </a:p>
-          <a:p>
-            <a:r>
-              <a:rPr lang="en-US" dirty="0"/>
-              <a:t>If you want to customize a Docker Image, you would use another Image and add your customizations on top by building another Image</a:t>
+              <a:t> similar to a dependency in a Linux package</a:t>
             </a:r>
           </a:p>
         </p:txBody>
@@ -15541,7 +15601,7 @@
     </p:spTree>
     <p:extLst>
       <p:ext uri="{BB962C8B-B14F-4D97-AF65-F5344CB8AC3E}">
-        <p14:creationId xmlns:p14="http://schemas.microsoft.com/office/powerpoint/2010/main" val="1500381221"/>
+        <p14:creationId xmlns:p14="http://schemas.microsoft.com/office/powerpoint/2010/main" val="431772287"/>
       </p:ext>
     </p:extLst>
   </p:cSld>
@@ -15585,6 +15645,497 @@
           <p:cNvPr id="2" name="Title 1">
             <a:extLst>
               <a:ext uri="{FF2B5EF4-FFF2-40B4-BE49-F238E27FC236}">
+                <a16:creationId xmlns:a16="http://schemas.microsoft.com/office/drawing/2014/main" id="{0BB0E5CC-A8D4-431F-9C70-07009634F72E}"/>
+              </a:ext>
+            </a:extLst>
+          </p:cNvPr>
+          <p:cNvSpPr>
+            <a:spLocks noGrp="1"/>
+          </p:cNvSpPr>
+          <p:nvPr>
+            <p:ph type="title"/>
+          </p:nvPr>
+        </p:nvSpPr>
+        <p:spPr/>
+        <p:txBody>
+          <a:bodyPr/>
+          <a:lstStyle/>
+          <a:p>
+            <a:r>
+              <a:rPr lang="en-US" dirty="0"/>
+              <a:t>What is a Docker Image?</a:t>
+            </a:r>
+          </a:p>
+        </p:txBody>
+      </p:sp>
+      <p:sp>
+        <p:nvSpPr>
+          <p:cNvPr id="3" name="Content Placeholder 2">
+            <a:extLst>
+              <a:ext uri="{FF2B5EF4-FFF2-40B4-BE49-F238E27FC236}">
+                <a16:creationId xmlns:a16="http://schemas.microsoft.com/office/drawing/2014/main" id="{45A80E1F-CB88-4380-8540-2A5A4E596B05}"/>
+              </a:ext>
+            </a:extLst>
+          </p:cNvPr>
+          <p:cNvSpPr>
+            <a:spLocks noGrp="1"/>
+          </p:cNvSpPr>
+          <p:nvPr>
+            <p:ph idx="1"/>
+          </p:nvPr>
+        </p:nvSpPr>
+        <p:spPr/>
+        <p:txBody>
+          <a:bodyPr>
+            <a:normAutofit fontScale="92500" lnSpcReduction="20000"/>
+          </a:bodyPr>
+          <a:lstStyle/>
+          <a:p>
+            <a:r>
+              <a:rPr lang="en-US" dirty="0"/>
+              <a:t>Docker Images:</a:t>
+            </a:r>
+          </a:p>
+          <a:p>
+            <a:pPr lvl="1"/>
+            <a:r>
+              <a:rPr lang="en-US" dirty="0"/>
+              <a:t>Are the basis or source of running a Container (sort-of similar to a DVD ISO)</a:t>
+            </a:r>
+          </a:p>
+          <a:p>
+            <a:pPr lvl="1"/>
+            <a:r>
+              <a:rPr lang="en-US" dirty="0"/>
+              <a:t>Consist of an ordered collection of root filesystem changes</a:t>
+            </a:r>
+          </a:p>
+          <a:p>
+            <a:pPr lvl="1"/>
+            <a:r>
+              <a:rPr lang="en-US" dirty="0"/>
+              <a:t>Have execution parameters that are run on first creation of a Container</a:t>
+            </a:r>
+          </a:p>
+          <a:p>
+            <a:pPr lvl="1"/>
+            <a:r>
+              <a:rPr lang="en-US" dirty="0"/>
+              <a:t>Do </a:t>
+            </a:r>
+            <a:r>
+              <a:rPr lang="en-US" u="sng" dirty="0"/>
+              <a:t>not</a:t>
+            </a:r>
+            <a:r>
+              <a:rPr lang="en-US" dirty="0"/>
+              <a:t> have state</a:t>
+            </a:r>
+          </a:p>
+          <a:p>
+            <a:pPr lvl="1"/>
+            <a:r>
+              <a:rPr lang="en-US" dirty="0"/>
+              <a:t>Never change</a:t>
+            </a:r>
+          </a:p>
+          <a:p>
+            <a:pPr lvl="1"/>
+            <a:r>
+              <a:rPr lang="en-US" dirty="0"/>
+              <a:t>Are usually downloaded from Docker Hub (but not always)</a:t>
+            </a:r>
+          </a:p>
+          <a:p>
+            <a:pPr lvl="1"/>
+            <a:r>
+              <a:rPr lang="en-US" dirty="0"/>
+              <a:t>Source: </a:t>
+            </a:r>
+            <a:r>
+              <a:rPr lang="en-US" dirty="0">
+                <a:solidFill>
+                  <a:srgbClr val="00B0F0"/>
+                </a:solidFill>
+                <a:hlinkClick r:id="rId2">
+                  <a:extLst>
+                    <a:ext uri="{A12FA001-AC4F-418D-AE19-62706E023703}">
+                      <ahyp:hlinkClr xmlns:ahyp="http://schemas.microsoft.com/office/drawing/2018/hyperlinkcolor" val="tx"/>
+                    </a:ext>
+                  </a:extLst>
+                </a:hlinkClick>
+              </a:rPr>
+              <a:t>https://docs.docker.com/glossary/</a:t>
+            </a:r>
+            <a:endParaRPr lang="en-US" dirty="0"/>
+          </a:p>
+          <a:p>
+            <a:pPr lvl="1"/>
+            <a:endParaRPr lang="en-US" dirty="0"/>
+          </a:p>
+          <a:p>
+            <a:r>
+              <a:rPr lang="en-US" dirty="0"/>
+              <a:t>If you want to customize a Docker Image, you would use another Image and add your customizations on top by building another Image</a:t>
+            </a:r>
+          </a:p>
+        </p:txBody>
+      </p:sp>
+    </p:spTree>
+    <p:extLst>
+      <p:ext uri="{BB962C8B-B14F-4D97-AF65-F5344CB8AC3E}">
+        <p14:creationId xmlns:p14="http://schemas.microsoft.com/office/powerpoint/2010/main" val="1500381221"/>
+      </p:ext>
+    </p:extLst>
+  </p:cSld>
+  <p:clrMapOvr>
+    <a:masterClrMapping/>
+  </p:clrMapOvr>
+  <mc:AlternateContent xmlns:mc="http://schemas.openxmlformats.org/markup-compatibility/2006" xmlns:p14="http://schemas.microsoft.com/office/powerpoint/2010/main">
+    <mc:Choice Requires="p14">
+      <p:transition p14:dur="400">
+        <p14:reveal/>
+      </p:transition>
+    </mc:Choice>
+    <mc:Fallback xmlns="">
+      <p:transition>
+        <p:fade/>
+      </p:transition>
+    </mc:Fallback>
+  </mc:AlternateContent>
+</p:sld>
+</file>
+
+<file path=ppt/slides/slide16.xml><?xml version="1.0" encoding="utf-8"?>
+<p:sld xmlns:a="http://schemas.openxmlformats.org/drawingml/2006/main" xmlns:r="http://schemas.openxmlformats.org/officeDocument/2006/relationships" xmlns:p="http://schemas.openxmlformats.org/presentationml/2006/main">
+  <p:cSld>
+    <p:spTree>
+      <p:nvGrpSpPr>
+        <p:cNvPr id="1" name=""/>
+        <p:cNvGrpSpPr/>
+        <p:nvPr/>
+      </p:nvGrpSpPr>
+      <p:grpSpPr>
+        <a:xfrm>
+          <a:off x="0" y="0"/>
+          <a:ext cx="0" cy="0"/>
+          <a:chOff x="0" y="0"/>
+          <a:chExt cx="0" cy="0"/>
+        </a:xfrm>
+      </p:grpSpPr>
+      <p:sp>
+        <p:nvSpPr>
+          <p:cNvPr id="2" name="Title 1">
+            <a:extLst>
+              <a:ext uri="{FF2B5EF4-FFF2-40B4-BE49-F238E27FC236}">
+                <a16:creationId xmlns:a16="http://schemas.microsoft.com/office/drawing/2014/main" id="{2B2322D6-70A6-4880-A603-FF57F8317A93}"/>
+              </a:ext>
+            </a:extLst>
+          </p:cNvPr>
+          <p:cNvSpPr>
+            <a:spLocks noGrp="1"/>
+          </p:cNvSpPr>
+          <p:nvPr>
+            <p:ph type="title"/>
+          </p:nvPr>
+        </p:nvSpPr>
+        <p:spPr/>
+        <p:txBody>
+          <a:bodyPr/>
+          <a:lstStyle/>
+          <a:p>
+            <a:r>
+              <a:rPr lang="en-US" dirty="0"/>
+              <a:t>How do we build a Docker Image?</a:t>
+            </a:r>
+          </a:p>
+        </p:txBody>
+      </p:sp>
+      <p:sp>
+        <p:nvSpPr>
+          <p:cNvPr id="3" name="Content Placeholder 2">
+            <a:extLst>
+              <a:ext uri="{FF2B5EF4-FFF2-40B4-BE49-F238E27FC236}">
+                <a16:creationId xmlns:a16="http://schemas.microsoft.com/office/drawing/2014/main" id="{1F524F3D-E434-43B0-827A-941A9B876B96}"/>
+              </a:ext>
+            </a:extLst>
+          </p:cNvPr>
+          <p:cNvSpPr>
+            <a:spLocks noGrp="1"/>
+          </p:cNvSpPr>
+          <p:nvPr>
+            <p:ph idx="1"/>
+          </p:nvPr>
+        </p:nvSpPr>
+        <p:spPr/>
+        <p:txBody>
+          <a:bodyPr/>
+          <a:lstStyle/>
+          <a:p>
+            <a:r>
+              <a:rPr lang="en-US" dirty="0"/>
+              <a:t>We use a </a:t>
+            </a:r>
+            <a:r>
+              <a:rPr lang="en-US" dirty="0" err="1"/>
+              <a:t>Dockerfile</a:t>
+            </a:r>
+            <a:endParaRPr lang="en-US" dirty="0"/>
+          </a:p>
+          <a:p>
+            <a:endParaRPr lang="en-US" dirty="0"/>
+          </a:p>
+          <a:p>
+            <a:r>
+              <a:rPr lang="en-US" dirty="0"/>
+              <a:t>Instead of writing our own from scratch…</a:t>
+            </a:r>
+          </a:p>
+          <a:p>
+            <a:endParaRPr lang="en-US" dirty="0"/>
+          </a:p>
+          <a:p>
+            <a:r>
+              <a:rPr lang="en-US" dirty="0"/>
+              <a:t>We’ve been using Andrew </a:t>
+            </a:r>
+            <a:r>
+              <a:rPr lang="en-US" dirty="0" err="1"/>
+              <a:t>Pruski’s</a:t>
+            </a:r>
+            <a:r>
+              <a:rPr lang="en-US" dirty="0"/>
+              <a:t> (</a:t>
+            </a:r>
+            <a:r>
+              <a:rPr lang="en-US" dirty="0">
+                <a:solidFill>
+                  <a:schemeClr val="accent4">
+                    <a:lumMod val="50000"/>
+                  </a:schemeClr>
+                </a:solidFill>
+                <a:hlinkClick r:id="rId2">
+                  <a:extLst>
+                    <a:ext uri="{A12FA001-AC4F-418D-AE19-62706E023703}">
+                      <ahyp:hlinkClr xmlns:ahyp="http://schemas.microsoft.com/office/drawing/2018/hyperlinkcolor" val="tx"/>
+                    </a:ext>
+                  </a:extLst>
+                </a:hlinkClick>
+              </a:rPr>
+              <a:t>@</a:t>
+            </a:r>
+            <a:r>
+              <a:rPr lang="en-US" dirty="0" err="1">
+                <a:solidFill>
+                  <a:schemeClr val="accent4">
+                    <a:lumMod val="50000"/>
+                  </a:schemeClr>
+                </a:solidFill>
+                <a:hlinkClick r:id="rId2">
+                  <a:extLst>
+                    <a:ext uri="{A12FA001-AC4F-418D-AE19-62706E023703}">
+                      <ahyp:hlinkClr xmlns:ahyp="http://schemas.microsoft.com/office/drawing/2018/hyperlinkcolor" val="tx"/>
+                    </a:ext>
+                  </a:extLst>
+                </a:hlinkClick>
+              </a:rPr>
+              <a:t>dbafromthecold</a:t>
+            </a:r>
+            <a:r>
+              <a:rPr lang="en-US" dirty="0"/>
+              <a:t>) excellent images so far, let’s customize what he’s already given us</a:t>
+            </a:r>
+            <a:br>
+              <a:rPr lang="en-US" dirty="0"/>
+            </a:br>
+            <a:r>
+              <a:rPr lang="en-US" dirty="0"/>
+              <a:t>(</a:t>
+            </a:r>
+            <a:r>
+              <a:rPr lang="en-US" dirty="0">
+                <a:solidFill>
+                  <a:schemeClr val="accent4">
+                    <a:lumMod val="50000"/>
+                  </a:schemeClr>
+                </a:solidFill>
+                <a:hlinkClick r:id="rId3">
+                  <a:extLst>
+                    <a:ext uri="{A12FA001-AC4F-418D-AE19-62706E023703}">
+                      <ahyp:hlinkClr xmlns:ahyp="http://schemas.microsoft.com/office/drawing/2018/hyperlinkcolor" val="tx"/>
+                    </a:ext>
+                  </a:extLst>
+                </a:hlinkClick>
+              </a:rPr>
+              <a:t>https://dbafromthecold.com/2017/02/08/sql-container-from-dockerfile/</a:t>
+            </a:r>
+            <a:r>
+              <a:rPr lang="en-US" dirty="0">
+                <a:solidFill>
+                  <a:schemeClr val="accent4">
+                    <a:lumMod val="50000"/>
+                  </a:schemeClr>
+                </a:solidFill>
+              </a:rPr>
+              <a:t>)</a:t>
+            </a:r>
+            <a:endParaRPr lang="en-US" dirty="0"/>
+          </a:p>
+          <a:p>
+            <a:endParaRPr lang="en-US" dirty="0"/>
+          </a:p>
+          <a:p>
+            <a:endParaRPr lang="en-US" dirty="0"/>
+          </a:p>
+        </p:txBody>
+      </p:sp>
+    </p:spTree>
+    <p:extLst>
+      <p:ext uri="{BB962C8B-B14F-4D97-AF65-F5344CB8AC3E}">
+        <p14:creationId xmlns:p14="http://schemas.microsoft.com/office/powerpoint/2010/main" val="3780615902"/>
+      </p:ext>
+    </p:extLst>
+  </p:cSld>
+  <p:clrMapOvr>
+    <a:masterClrMapping/>
+  </p:clrMapOvr>
+  <mc:AlternateContent xmlns:mc="http://schemas.openxmlformats.org/markup-compatibility/2006" xmlns:p14="http://schemas.microsoft.com/office/powerpoint/2010/main">
+    <mc:Choice Requires="p14">
+      <p:transition p14:dur="400">
+        <p14:reveal/>
+      </p:transition>
+    </mc:Choice>
+    <mc:Fallback xmlns="">
+      <p:transition>
+        <p:fade/>
+      </p:transition>
+    </mc:Fallback>
+  </mc:AlternateContent>
+</p:sld>
+</file>
+
+<file path=ppt/slides/slide17.xml><?xml version="1.0" encoding="utf-8"?>
+<p:sld xmlns:a="http://schemas.openxmlformats.org/drawingml/2006/main" xmlns:r="http://schemas.openxmlformats.org/officeDocument/2006/relationships" xmlns:p="http://schemas.openxmlformats.org/presentationml/2006/main">
+  <p:cSld>
+    <p:spTree>
+      <p:nvGrpSpPr>
+        <p:cNvPr id="1" name=""/>
+        <p:cNvGrpSpPr/>
+        <p:nvPr/>
+      </p:nvGrpSpPr>
+      <p:grpSpPr>
+        <a:xfrm>
+          <a:off x="0" y="0"/>
+          <a:ext cx="0" cy="0"/>
+          <a:chOff x="0" y="0"/>
+          <a:chExt cx="0" cy="0"/>
+        </a:xfrm>
+      </p:grpSpPr>
+      <p:sp>
+        <p:nvSpPr>
+          <p:cNvPr id="2" name="Title 1">
+            <a:extLst>
+              <a:ext uri="{FF2B5EF4-FFF2-40B4-BE49-F238E27FC236}">
+                <a16:creationId xmlns:a16="http://schemas.microsoft.com/office/drawing/2014/main" id="{ABD92BB2-ADCB-482C-8F28-C87FA1BF877A}"/>
+              </a:ext>
+            </a:extLst>
+          </p:cNvPr>
+          <p:cNvSpPr>
+            <a:spLocks noGrp="1"/>
+          </p:cNvSpPr>
+          <p:nvPr>
+            <p:ph type="title"/>
+          </p:nvPr>
+        </p:nvSpPr>
+        <p:spPr/>
+        <p:txBody>
+          <a:bodyPr/>
+          <a:lstStyle/>
+          <a:p>
+            <a:r>
+              <a:rPr lang="en-US" dirty="0"/>
+              <a:t>Demo #3 – Custom Image with a </a:t>
+            </a:r>
+            <a:r>
+              <a:rPr lang="en-US" dirty="0" err="1"/>
+              <a:t>Dockerfile</a:t>
+            </a:r>
+            <a:endParaRPr lang="en-US" dirty="0"/>
+          </a:p>
+        </p:txBody>
+      </p:sp>
+      <p:sp>
+        <p:nvSpPr>
+          <p:cNvPr id="3" name="Content Placeholder 2">
+            <a:extLst>
+              <a:ext uri="{FF2B5EF4-FFF2-40B4-BE49-F238E27FC236}">
+                <a16:creationId xmlns:a16="http://schemas.microsoft.com/office/drawing/2014/main" id="{A2EE9269-5599-4B91-8D38-4421B91D2A0E}"/>
+              </a:ext>
+            </a:extLst>
+          </p:cNvPr>
+          <p:cNvSpPr>
+            <a:spLocks noGrp="1"/>
+          </p:cNvSpPr>
+          <p:nvPr>
+            <p:ph idx="1"/>
+          </p:nvPr>
+        </p:nvSpPr>
+        <p:spPr/>
+        <p:txBody>
+          <a:bodyPr/>
+          <a:lstStyle/>
+          <a:p>
+            <a:endParaRPr lang="en-US" dirty="0"/>
+          </a:p>
+        </p:txBody>
+      </p:sp>
+    </p:spTree>
+    <p:extLst>
+      <p:ext uri="{BB962C8B-B14F-4D97-AF65-F5344CB8AC3E}">
+        <p14:creationId xmlns:p14="http://schemas.microsoft.com/office/powerpoint/2010/main" val="3729349792"/>
+      </p:ext>
+    </p:extLst>
+  </p:cSld>
+  <p:clrMapOvr>
+    <a:masterClrMapping/>
+  </p:clrMapOvr>
+  <mc:AlternateContent xmlns:mc="http://schemas.openxmlformats.org/markup-compatibility/2006" xmlns:p14="http://schemas.microsoft.com/office/powerpoint/2010/main">
+    <mc:Choice Requires="p14">
+      <p:transition p14:dur="400">
+        <p14:reveal/>
+      </p:transition>
+    </mc:Choice>
+    <mc:Fallback xmlns="">
+      <p:transition>
+        <p:fade/>
+      </p:transition>
+    </mc:Fallback>
+  </mc:AlternateContent>
+</p:sld>
+</file>
+
+<file path=ppt/slides/slide18.xml><?xml version="1.0" encoding="utf-8"?>
+<p:sld xmlns:a="http://schemas.openxmlformats.org/drawingml/2006/main" xmlns:r="http://schemas.openxmlformats.org/officeDocument/2006/relationships" xmlns:p="http://schemas.openxmlformats.org/presentationml/2006/main" show="0">
+  <p:cSld>
+    <p:spTree>
+      <p:nvGrpSpPr>
+        <p:cNvPr id="1" name=""/>
+        <p:cNvGrpSpPr/>
+        <p:nvPr/>
+      </p:nvGrpSpPr>
+      <p:grpSpPr>
+        <a:xfrm>
+          <a:off x="0" y="0"/>
+          <a:ext cx="0" cy="0"/>
+          <a:chOff x="0" y="0"/>
+          <a:chExt cx="0" cy="0"/>
+        </a:xfrm>
+      </p:grpSpPr>
+      <p:sp>
+        <p:nvSpPr>
+          <p:cNvPr id="2" name="Title 1">
+            <a:extLst>
+              <a:ext uri="{FF2B5EF4-FFF2-40B4-BE49-F238E27FC236}">
                 <a16:creationId xmlns:a16="http://schemas.microsoft.com/office/drawing/2014/main" id="{5808EFFC-C8DD-41AC-B234-B11E7903D761}"/>
               </a:ext>
             </a:extLst>
@@ -15704,13 +16255,13 @@
   <p:clrMapOvr>
     <a:masterClrMapping/>
   </p:clrMapOvr>
-  <mc:AlternateContent xmlns:mc="http://schemas.openxmlformats.org/markup-compatibility/2006" xmlns:p14="http://schemas.microsoft.com/office/powerpoint/2010/main">
-    <mc:Choice Requires="p14">
+  <mc:AlternateContent xmlns:mc="http://schemas.openxmlformats.org/markup-compatibility/2006">
+    <mc:Choice xmlns:p14="http://schemas.microsoft.com/office/powerpoint/2010/main" Requires="p14">
       <p:transition p14:dur="400">
         <p14:reveal/>
       </p:transition>
     </mc:Choice>
-    <mc:Fallback xmlns="">
+    <mc:Fallback>
       <p:transition>
         <p:fade/>
       </p:transition>
@@ -15719,7 +16270,7 @@
 </p:sld>
 </file>
 
-<file path=ppt/slides/slide16.xml><?xml version="1.0" encoding="utf-8"?>
+<file path=ppt/slides/slide19.xml><?xml version="1.0" encoding="utf-8"?>
 <p:sld xmlns:a="http://schemas.openxmlformats.org/drawingml/2006/main" xmlns:r="http://schemas.openxmlformats.org/officeDocument/2006/relationships" xmlns:p="http://schemas.openxmlformats.org/presentationml/2006/main">
   <p:cSld>
     <p:spTree>

</xml_diff>

<commit_message>
Fixed image name for Demo3
</commit_message>
<xml_diff>
--- a/Developing for SQL Server with Docker.pptx
+++ b/Developing for SQL Server with Docker.pptx
@@ -226,7 +226,7 @@
           <a:p>
             <a:fld id="{1C146976-FE24-468C-9E36-42E55C1289BE}" type="datetimeFigureOut">
               <a:rPr lang="en-US" smtClean="0"/>
-              <a:t>2/28/2020</a:t>
+              <a:t>3/1/2020</a:t>
             </a:fld>
             <a:endParaRPr lang="en-US"/>
           </a:p>
@@ -776,23 +776,6 @@
               <a:t>Go over the tag after the colon and that those are important. Demo leaving the tag off and the Docker engine doesn’t know what to do with it</a:t>
             </a:r>
           </a:p>
-          <a:p>
-            <a:pPr marL="228600" indent="-228600">
-              <a:buAutoNum type="arabicPeriod"/>
-            </a:pPr>
-            <a:r>
-              <a:rPr lang="en-US" dirty="0"/>
-              <a:t>Also bring up Andrew </a:t>
-            </a:r>
-            <a:r>
-              <a:rPr lang="en-US" dirty="0" err="1"/>
-              <a:t>Pruski’s</a:t>
-            </a:r>
-            <a:r>
-              <a:rPr lang="en-US" dirty="0"/>
-              <a:t> blog series on containers and how none of this is possible without that series</a:t>
-            </a:r>
-          </a:p>
         </p:txBody>
       </p:sp>
       <p:sp>
@@ -875,7 +858,10 @@
           <a:bodyPr/>
           <a:lstStyle/>
           <a:p>
-            <a:endParaRPr lang="en-US" dirty="0"/>
+            <a:r>
+              <a:rPr lang="en-US" dirty="0"/>
+              <a:t>Show the Settings screen between running Linux Containers and Windows Containers</a:t>
+            </a:r>
           </a:p>
         </p:txBody>
       </p:sp>
@@ -896,6 +882,90 @@
           <a:p>
             <a:fld id="{B07B5B4F-0F75-48F2-BFB2-73D5ADCDF733}" type="slidenum">
               <a:rPr lang="en-US" smtClean="0"/>
+              <a:t>10</a:t>
+            </a:fld>
+            <a:endParaRPr lang="en-US"/>
+          </a:p>
+        </p:txBody>
+      </p:sp>
+    </p:spTree>
+    <p:extLst>
+      <p:ext uri="{BB962C8B-B14F-4D97-AF65-F5344CB8AC3E}">
+        <p14:creationId xmlns:p14="http://schemas.microsoft.com/office/powerpoint/2010/main" val="4085663867"/>
+      </p:ext>
+    </p:extLst>
+  </p:cSld>
+  <p:clrMapOvr>
+    <a:masterClrMapping/>
+  </p:clrMapOvr>
+</p:notes>
+</file>
+
+<file path=ppt/notesSlides/notesSlide5.xml><?xml version="1.0" encoding="utf-8"?>
+<p:notes xmlns:a="http://schemas.openxmlformats.org/drawingml/2006/main" xmlns:r="http://schemas.openxmlformats.org/officeDocument/2006/relationships" xmlns:p="http://schemas.openxmlformats.org/presentationml/2006/main">
+  <p:cSld>
+    <p:spTree>
+      <p:nvGrpSpPr>
+        <p:cNvPr id="1" name=""/>
+        <p:cNvGrpSpPr/>
+        <p:nvPr/>
+      </p:nvGrpSpPr>
+      <p:grpSpPr>
+        <a:xfrm>
+          <a:off x="0" y="0"/>
+          <a:ext cx="0" cy="0"/>
+          <a:chOff x="0" y="0"/>
+          <a:chExt cx="0" cy="0"/>
+        </a:xfrm>
+      </p:grpSpPr>
+      <p:sp>
+        <p:nvSpPr>
+          <p:cNvPr id="2" name="Slide Image Placeholder 1"/>
+          <p:cNvSpPr>
+            <a:spLocks noGrp="1" noRot="1" noChangeAspect="1"/>
+          </p:cNvSpPr>
+          <p:nvPr>
+            <p:ph type="sldImg"/>
+          </p:nvPr>
+        </p:nvSpPr>
+        <p:spPr/>
+      </p:sp>
+      <p:sp>
+        <p:nvSpPr>
+          <p:cNvPr id="3" name="Notes Placeholder 2"/>
+          <p:cNvSpPr>
+            <a:spLocks noGrp="1"/>
+          </p:cNvSpPr>
+          <p:nvPr>
+            <p:ph type="body" idx="1"/>
+          </p:nvPr>
+        </p:nvSpPr>
+        <p:spPr/>
+        <p:txBody>
+          <a:bodyPr/>
+          <a:lstStyle/>
+          <a:p>
+            <a:endParaRPr lang="en-US" dirty="0"/>
+          </a:p>
+        </p:txBody>
+      </p:sp>
+      <p:sp>
+        <p:nvSpPr>
+          <p:cNvPr id="4" name="Slide Number Placeholder 3"/>
+          <p:cNvSpPr>
+            <a:spLocks noGrp="1"/>
+          </p:cNvSpPr>
+          <p:nvPr>
+            <p:ph type="sldNum" sz="quarter" idx="5"/>
+          </p:nvPr>
+        </p:nvSpPr>
+        <p:spPr/>
+        <p:txBody>
+          <a:bodyPr/>
+          <a:lstStyle/>
+          <a:p>
+            <a:fld id="{B07B5B4F-0F75-48F2-BFB2-73D5ADCDF733}" type="slidenum">
+              <a:rPr lang="en-US" smtClean="0"/>
               <a:t>12</a:t>
             </a:fld>
             <a:endParaRPr lang="en-US"/>
@@ -915,7 +985,7 @@
 </p:notes>
 </file>
 
-<file path=ppt/notesSlides/notesSlide5.xml><?xml version="1.0" encoding="utf-8"?>
+<file path=ppt/notesSlides/notesSlide6.xml><?xml version="1.0" encoding="utf-8"?>
 <p:notes xmlns:a="http://schemas.openxmlformats.org/drawingml/2006/main" xmlns:r="http://schemas.openxmlformats.org/officeDocument/2006/relationships" xmlns:p="http://schemas.openxmlformats.org/presentationml/2006/main">
   <p:cSld>
     <p:spTree>
@@ -1646,7 +1716,7 @@
             <a:fld id="{1E700B27-DE4C-4B9E-BB11-B9027034A00F}" type="datetimeFigureOut">
               <a:rPr lang="en-US" smtClean="0"/>
               <a:pPr/>
-              <a:t>2/28/2020</a:t>
+              <a:t>3/1/2020</a:t>
             </a:fld>
             <a:endParaRPr lang="en-US" dirty="0"/>
           </a:p>
@@ -2774,7 +2844,7 @@
           <a:p>
             <a:fld id="{C40F4739-9812-4A9F-890D-2AD6BA5F6EE8}" type="datetimeFigureOut">
               <a:rPr lang="en-US" smtClean="0"/>
-              <a:t>2/28/2020</a:t>
+              <a:t>3/1/2020</a:t>
             </a:fld>
             <a:endParaRPr lang="en-US" dirty="0"/>
           </a:p>
@@ -3793,7 +3863,7 @@
           <a:p>
             <a:fld id="{18845AC5-A3F8-44AA-BA8F-596CDCC976D3}" type="datetimeFigureOut">
               <a:rPr lang="en-US" smtClean="0"/>
-              <a:t>2/28/2020</a:t>
+              <a:t>3/1/2020</a:t>
             </a:fld>
             <a:endParaRPr lang="en-US" dirty="0"/>
           </a:p>
@@ -4971,7 +5041,7 @@
           <a:p>
             <a:fld id="{C873B183-A821-4095-A363-9EC968635539}" type="datetimeFigureOut">
               <a:rPr lang="en-US" smtClean="0"/>
-              <a:t>2/28/2020</a:t>
+              <a:t>3/1/2020</a:t>
             </a:fld>
             <a:endParaRPr lang="en-US" dirty="0"/>
           </a:p>
@@ -6040,7 +6110,7 @@
           <a:p>
             <a:fld id="{174D01B4-0AA5-45E6-B2E6-5FA4078AEBCF}" type="datetimeFigureOut">
               <a:rPr lang="en-US" smtClean="0"/>
-              <a:t>2/28/2020</a:t>
+              <a:t>3/1/2020</a:t>
             </a:fld>
             <a:endParaRPr lang="en-US" dirty="0"/>
           </a:p>
@@ -6694,7 +6764,7 @@
           <a:p>
             <a:fld id="{4147335C-0450-40D7-8612-B3203BED4F28}" type="datetimeFigureOut">
               <a:rPr lang="en-US" smtClean="0"/>
-              <a:t>2/28/2020</a:t>
+              <a:t>3/1/2020</a:t>
             </a:fld>
             <a:endParaRPr lang="en-US" dirty="0"/>
           </a:p>
@@ -7549,7 +7619,7 @@
           <a:p>
             <a:fld id="{D246A105-2A1C-4284-B4EA-07CF89B1A393}" type="datetimeFigureOut">
               <a:rPr lang="en-US" smtClean="0"/>
-              <a:t>2/28/2020</a:t>
+              <a:t>3/1/2020</a:t>
             </a:fld>
             <a:endParaRPr lang="en-US" dirty="0"/>
           </a:p>
@@ -7732,7 +7802,7 @@
           <a:p>
             <a:fld id="{80DBE609-F3F2-45E6-BD6A-E03A8C86C1AE}" type="datetimeFigureOut">
               <a:rPr lang="en-US" smtClean="0"/>
-              <a:t>2/28/2020</a:t>
+              <a:t>3/1/2020</a:t>
             </a:fld>
             <a:endParaRPr lang="en-US" dirty="0"/>
           </a:p>
@@ -8738,7 +8808,7 @@
           <a:p>
             <a:fld id="{7A24AD68-089C-4467-A8F3-EA2BBCA6B44E}" type="datetimeFigureOut">
               <a:rPr lang="en-US" smtClean="0"/>
-              <a:t>2/28/2020</a:t>
+              <a:t>3/1/2020</a:t>
             </a:fld>
             <a:endParaRPr lang="en-US" dirty="0"/>
           </a:p>
@@ -8952,7 +9022,7 @@
           <a:p>
             <a:fld id="{75C51FCE-E4BB-4680-8E50-3C0E348D2609}" type="datetimeFigureOut">
               <a:rPr lang="en-US" smtClean="0"/>
-              <a:t>2/28/2020</a:t>
+              <a:t>3/1/2020</a:t>
             </a:fld>
             <a:endParaRPr lang="en-US" dirty="0"/>
           </a:p>
@@ -10022,7 +10092,7 @@
           <a:p>
             <a:fld id="{8AAA073D-A903-47F8-8D16-77642FB0DF1F}" type="datetimeFigureOut">
               <a:rPr lang="en-US" smtClean="0"/>
-              <a:t>2/28/2020</a:t>
+              <a:t>3/1/2020</a:t>
             </a:fld>
             <a:endParaRPr lang="en-US" dirty="0"/>
           </a:p>
@@ -10302,7 +10372,7 @@
           <a:p>
             <a:fld id="{AB91FA40-626B-4CA1-85D0-7A9016E395BA}" type="datetimeFigureOut">
               <a:rPr lang="en-US" smtClean="0"/>
-              <a:t>2/28/2020</a:t>
+              <a:t>3/1/2020</a:t>
             </a:fld>
             <a:endParaRPr lang="en-US" dirty="0"/>
           </a:p>
@@ -10692,7 +10762,7 @@
           <a:p>
             <a:fld id="{C3F425EA-B9DC-48A7-991E-9A82573B1B21}" type="datetimeFigureOut">
               <a:rPr lang="en-US" smtClean="0"/>
-              <a:t>2/28/2020</a:t>
+              <a:t>3/1/2020</a:t>
             </a:fld>
             <a:endParaRPr lang="en-US" dirty="0"/>
           </a:p>
@@ -10818,7 +10888,7 @@
           <a:p>
             <a:fld id="{66CB97F8-6CEB-469B-AFCC-889F2A2B1D5A}" type="datetimeFigureOut">
               <a:rPr lang="en-US" smtClean="0"/>
-              <a:t>2/28/2020</a:t>
+              <a:t>3/1/2020</a:t>
             </a:fld>
             <a:endParaRPr lang="en-US" dirty="0"/>
           </a:p>
@@ -10921,7 +10991,7 @@
           <a:p>
             <a:fld id="{8FA9179F-009E-4FA5-B091-7EBB82A185BD}" type="datetimeFigureOut">
               <a:rPr lang="en-US" smtClean="0"/>
-              <a:t>2/28/2020</a:t>
+              <a:t>3/1/2020</a:t>
             </a:fld>
             <a:endParaRPr lang="en-US" dirty="0"/>
           </a:p>
@@ -12038,7 +12108,7 @@
           <a:p>
             <a:fld id="{8E665CEB-0076-4E37-B880-BCEA9784DE0A}" type="datetimeFigureOut">
               <a:rPr lang="en-US" smtClean="0"/>
-              <a:t>2/28/2020</a:t>
+              <a:t>3/1/2020</a:t>
             </a:fld>
             <a:endParaRPr lang="en-US" dirty="0"/>
           </a:p>
@@ -13179,7 +13249,7 @@
           <a:p>
             <a:fld id="{A6149E5E-3896-4118-99A7-7B85668F1C5E}" type="datetimeFigureOut">
               <a:rPr lang="en-US" smtClean="0"/>
-              <a:t>2/28/2020</a:t>
+              <a:t>3/1/2020</a:t>
             </a:fld>
             <a:endParaRPr lang="en-US" dirty="0"/>
           </a:p>
@@ -14215,7 +14285,7 @@
           <a:p>
             <a:fld id="{7E0D914D-B099-4142-A885-11F276715148}" type="datetimeFigureOut">
               <a:rPr lang="en-US" smtClean="0"/>
-              <a:t>2/28/2020</a:t>
+              <a:t>3/1/2020</a:t>
             </a:fld>
             <a:endParaRPr lang="en-US" dirty="0"/>
           </a:p>
@@ -14926,13 +14996,48 @@
         </p:nvSpPr>
         <p:spPr/>
         <p:txBody>
-          <a:bodyPr/>
+          <a:bodyPr>
+            <a:normAutofit/>
+          </a:bodyPr>
           <a:lstStyle/>
           <a:p>
             <a:r>
               <a:rPr lang="en-US" dirty="0"/>
               <a:t>In order to start mounting a volume into our Containers, we need to “Right-Click -&gt; Settings” the Docker Desktop app tray icon:</a:t>
             </a:r>
+          </a:p>
+          <a:p>
+            <a:endParaRPr lang="en-US" dirty="0"/>
+          </a:p>
+          <a:p>
+            <a:endParaRPr lang="en-US" dirty="0"/>
+          </a:p>
+          <a:p>
+            <a:endParaRPr lang="en-US" dirty="0"/>
+          </a:p>
+          <a:p>
+            <a:endParaRPr lang="en-US" dirty="0"/>
+          </a:p>
+          <a:p>
+            <a:endParaRPr lang="en-US" dirty="0"/>
+          </a:p>
+          <a:p>
+            <a:endParaRPr lang="en-US" dirty="0"/>
+          </a:p>
+          <a:p>
+            <a:endParaRPr lang="en-US" dirty="0"/>
+          </a:p>
+          <a:p>
+            <a:pPr marL="0" indent="0">
+              <a:buNone/>
+            </a:pPr>
+            <a:endParaRPr lang="en-US" dirty="0"/>
+          </a:p>
+          <a:p>
+            <a:endParaRPr lang="en-US" dirty="0"/>
+          </a:p>
+          <a:p>
+            <a:endParaRPr lang="en-US" dirty="0"/>
           </a:p>
           <a:p>
             <a:endParaRPr lang="en-US" dirty="0"/>
@@ -14954,7 +15059,7 @@
           <p:nvPr/>
         </p:nvPicPr>
         <p:blipFill>
-          <a:blip r:embed="rId2"/>
+          <a:blip r:embed="rId3"/>
           <a:stretch>
             <a:fillRect/>
           </a:stretch>
@@ -14969,6 +15074,41 @@
           </a:prstGeom>
         </p:spPr>
       </p:pic>
+      <p:sp>
+        <p:nvSpPr>
+          <p:cNvPr id="6" name="TextBox 5">
+            <a:extLst>
+              <a:ext uri="{FF2B5EF4-FFF2-40B4-BE49-F238E27FC236}">
+                <a16:creationId xmlns:a16="http://schemas.microsoft.com/office/drawing/2014/main" id="{B9B85574-F3D0-499E-A6F7-64A940AC03EC}"/>
+              </a:ext>
+            </a:extLst>
+          </p:cNvPr>
+          <p:cNvSpPr txBox="1"/>
+          <p:nvPr/>
+        </p:nvSpPr>
+        <p:spPr>
+          <a:xfrm>
+            <a:off x="1546659" y="6224418"/>
+            <a:ext cx="7914781" cy="369332"/>
+          </a:xfrm>
+          <a:prstGeom prst="rect">
+            <a:avLst/>
+          </a:prstGeom>
+          <a:noFill/>
+        </p:spPr>
+        <p:txBody>
+          <a:bodyPr wrap="square" rtlCol="0">
+            <a:spAutoFit/>
+          </a:bodyPr>
+          <a:lstStyle/>
+          <a:p>
+            <a:r>
+              <a:rPr lang="en-US" dirty="0"/>
+              <a:t>Note: This only applies when running Linux Containers</a:t>
+            </a:r>
+          </a:p>
+        </p:txBody>
+      </p:sp>
     </p:spTree>
     <p:extLst>
       <p:ext uri="{BB962C8B-B14F-4D97-AF65-F5344CB8AC3E}">
@@ -15034,7 +15174,7 @@
           <a:p>
             <a:r>
               <a:rPr lang="en-US" dirty="0"/>
-              <a:t>Bind Mount vs Named Volume?</a:t>
+              <a:t>Bind Mount vs Named Volume</a:t>
             </a:r>
           </a:p>
         </p:txBody>
@@ -15412,10 +15552,16 @@
             </a:r>
           </a:p>
           <a:p>
+            <a:endParaRPr lang="en-US" dirty="0"/>
+          </a:p>
+          <a:p>
             <a:r>
               <a:rPr lang="en-US" dirty="0"/>
               <a:t>Copy files to there</a:t>
             </a:r>
+          </a:p>
+          <a:p>
+            <a:endParaRPr lang="en-US" dirty="0"/>
           </a:p>
           <a:p>
             <a:r>
@@ -16216,8 +16362,18 @@
             </a:r>
             <a:r>
               <a:rPr lang="en-US" dirty="0"/>
-              <a:t> based on Image </a:t>
-            </a:r>
+              <a:t> based on Image</a:t>
+            </a:r>
+            <a:br>
+              <a:rPr lang="en-US" dirty="0">
+                <a:solidFill>
+                  <a:schemeClr val="accent4">
+                    <a:lumMod val="50000"/>
+                  </a:schemeClr>
+                </a:solidFill>
+                <a:latin typeface="Consolas" panose="020B0609020204030204" pitchFamily="49" charset="0"/>
+              </a:rPr>
+            </a:br>
             <a:r>
               <a:rPr lang="en-US" dirty="0" err="1">
                 <a:solidFill>
@@ -16227,7 +16383,7 @@
                 </a:solidFill>
                 <a:latin typeface="Consolas" panose="020B0609020204030204" pitchFamily="49" charset="0"/>
               </a:rPr>
-              <a:t>dbafromthecold</a:t>
+              <a:t>microsoft</a:t>
             </a:r>
             <a:r>
               <a:rPr lang="en-US" dirty="0">
@@ -16238,8 +16394,29 @@
                 </a:solidFill>
                 <a:latin typeface="Consolas" panose="020B0609020204030204" pitchFamily="49" charset="0"/>
               </a:rPr>
-              <a:t>/sqlserver2014dev:sp2</a:t>
-            </a:r>
+              <a:t>/mssql-server-windows-developer</a:t>
+            </a:r>
+            <a:r>
+              <a:rPr lang="en-US">
+                <a:solidFill>
+                  <a:schemeClr val="accent4">
+                    <a:lumMod val="50000"/>
+                  </a:schemeClr>
+                </a:solidFill>
+                <a:latin typeface="Consolas" panose="020B0609020204030204" pitchFamily="49" charset="0"/>
+              </a:rPr>
+              <a:t>:2017-latest</a:t>
+            </a:r>
+          </a:p>
+          <a:p>
+            <a:endParaRPr lang="en-US" dirty="0">
+              <a:solidFill>
+                <a:schemeClr val="accent4">
+                  <a:lumMod val="50000"/>
+                </a:schemeClr>
+              </a:solidFill>
+              <a:latin typeface="Consolas" panose="020B0609020204030204" pitchFamily="49" charset="0"/>
+            </a:endParaRPr>
           </a:p>
           <a:p>
             <a:r>

</xml_diff>

<commit_message>
Added slide with contact info
</commit_message>
<xml_diff>
--- a/Developing for SQL Server with Docker.pptx
+++ b/Developing for SQL Server with Docker.pptx
@@ -5,7 +5,7 @@
     <p:sldMasterId id="2147483648" r:id="rId1"/>
   </p:sldMasterIdLst>
   <p:notesMasterIdLst>
-    <p:notesMasterId r:id="rId21"/>
+    <p:notesMasterId r:id="rId22"/>
   </p:notesMasterIdLst>
   <p:sldIdLst>
     <p:sldId id="256" r:id="rId2"/>
@@ -26,7 +26,8 @@
     <p:sldId id="274" r:id="rId17"/>
     <p:sldId id="276" r:id="rId18"/>
     <p:sldId id="275" r:id="rId19"/>
-    <p:sldId id="269" r:id="rId20"/>
+    <p:sldId id="277" r:id="rId20"/>
+    <p:sldId id="269" r:id="rId21"/>
   </p:sldIdLst>
   <p:sldSz cx="12192000" cy="6858000"/>
   <p:notesSz cx="6858000" cy="9144000"/>
@@ -226,7 +227,7 @@
           <a:p>
             <a:fld id="{1C146976-FE24-468C-9E36-42E55C1289BE}" type="datetimeFigureOut">
               <a:rPr lang="en-US" smtClean="0"/>
-              <a:t>3/1/2020</a:t>
+              <a:t>3/2/2020</a:t>
             </a:fld>
             <a:endParaRPr lang="en-US"/>
           </a:p>
@@ -1716,7 +1717,7 @@
             <a:fld id="{1E700B27-DE4C-4B9E-BB11-B9027034A00F}" type="datetimeFigureOut">
               <a:rPr lang="en-US" smtClean="0"/>
               <a:pPr/>
-              <a:t>3/1/2020</a:t>
+              <a:t>3/2/2020</a:t>
             </a:fld>
             <a:endParaRPr lang="en-US" dirty="0"/>
           </a:p>
@@ -2844,7 +2845,7 @@
           <a:p>
             <a:fld id="{C40F4739-9812-4A9F-890D-2AD6BA5F6EE8}" type="datetimeFigureOut">
               <a:rPr lang="en-US" smtClean="0"/>
-              <a:t>3/1/2020</a:t>
+              <a:t>3/2/2020</a:t>
             </a:fld>
             <a:endParaRPr lang="en-US" dirty="0"/>
           </a:p>
@@ -3863,7 +3864,7 @@
           <a:p>
             <a:fld id="{18845AC5-A3F8-44AA-BA8F-596CDCC976D3}" type="datetimeFigureOut">
               <a:rPr lang="en-US" smtClean="0"/>
-              <a:t>3/1/2020</a:t>
+              <a:t>3/2/2020</a:t>
             </a:fld>
             <a:endParaRPr lang="en-US" dirty="0"/>
           </a:p>
@@ -5041,7 +5042,7 @@
           <a:p>
             <a:fld id="{C873B183-A821-4095-A363-9EC968635539}" type="datetimeFigureOut">
               <a:rPr lang="en-US" smtClean="0"/>
-              <a:t>3/1/2020</a:t>
+              <a:t>3/2/2020</a:t>
             </a:fld>
             <a:endParaRPr lang="en-US" dirty="0"/>
           </a:p>
@@ -6110,7 +6111,7 @@
           <a:p>
             <a:fld id="{174D01B4-0AA5-45E6-B2E6-5FA4078AEBCF}" type="datetimeFigureOut">
               <a:rPr lang="en-US" smtClean="0"/>
-              <a:t>3/1/2020</a:t>
+              <a:t>3/2/2020</a:t>
             </a:fld>
             <a:endParaRPr lang="en-US" dirty="0"/>
           </a:p>
@@ -6764,7 +6765,7 @@
           <a:p>
             <a:fld id="{4147335C-0450-40D7-8612-B3203BED4F28}" type="datetimeFigureOut">
               <a:rPr lang="en-US" smtClean="0"/>
-              <a:t>3/1/2020</a:t>
+              <a:t>3/2/2020</a:t>
             </a:fld>
             <a:endParaRPr lang="en-US" dirty="0"/>
           </a:p>
@@ -7619,7 +7620,7 @@
           <a:p>
             <a:fld id="{D246A105-2A1C-4284-B4EA-07CF89B1A393}" type="datetimeFigureOut">
               <a:rPr lang="en-US" smtClean="0"/>
-              <a:t>3/1/2020</a:t>
+              <a:t>3/2/2020</a:t>
             </a:fld>
             <a:endParaRPr lang="en-US" dirty="0"/>
           </a:p>
@@ -7802,7 +7803,7 @@
           <a:p>
             <a:fld id="{80DBE609-F3F2-45E6-BD6A-E03A8C86C1AE}" type="datetimeFigureOut">
               <a:rPr lang="en-US" smtClean="0"/>
-              <a:t>3/1/2020</a:t>
+              <a:t>3/2/2020</a:t>
             </a:fld>
             <a:endParaRPr lang="en-US" dirty="0"/>
           </a:p>
@@ -8808,7 +8809,7 @@
           <a:p>
             <a:fld id="{7A24AD68-089C-4467-A8F3-EA2BBCA6B44E}" type="datetimeFigureOut">
               <a:rPr lang="en-US" smtClean="0"/>
-              <a:t>3/1/2020</a:t>
+              <a:t>3/2/2020</a:t>
             </a:fld>
             <a:endParaRPr lang="en-US" dirty="0"/>
           </a:p>
@@ -9022,7 +9023,7 @@
           <a:p>
             <a:fld id="{75C51FCE-E4BB-4680-8E50-3C0E348D2609}" type="datetimeFigureOut">
               <a:rPr lang="en-US" smtClean="0"/>
-              <a:t>3/1/2020</a:t>
+              <a:t>3/2/2020</a:t>
             </a:fld>
             <a:endParaRPr lang="en-US" dirty="0"/>
           </a:p>
@@ -10092,7 +10093,7 @@
           <a:p>
             <a:fld id="{8AAA073D-A903-47F8-8D16-77642FB0DF1F}" type="datetimeFigureOut">
               <a:rPr lang="en-US" smtClean="0"/>
-              <a:t>3/1/2020</a:t>
+              <a:t>3/2/2020</a:t>
             </a:fld>
             <a:endParaRPr lang="en-US" dirty="0"/>
           </a:p>
@@ -10372,7 +10373,7 @@
           <a:p>
             <a:fld id="{AB91FA40-626B-4CA1-85D0-7A9016E395BA}" type="datetimeFigureOut">
               <a:rPr lang="en-US" smtClean="0"/>
-              <a:t>3/1/2020</a:t>
+              <a:t>3/2/2020</a:t>
             </a:fld>
             <a:endParaRPr lang="en-US" dirty="0"/>
           </a:p>
@@ -10762,7 +10763,7 @@
           <a:p>
             <a:fld id="{C3F425EA-B9DC-48A7-991E-9A82573B1B21}" type="datetimeFigureOut">
               <a:rPr lang="en-US" smtClean="0"/>
-              <a:t>3/1/2020</a:t>
+              <a:t>3/2/2020</a:t>
             </a:fld>
             <a:endParaRPr lang="en-US" dirty="0"/>
           </a:p>
@@ -10888,7 +10889,7 @@
           <a:p>
             <a:fld id="{66CB97F8-6CEB-469B-AFCC-889F2A2B1D5A}" type="datetimeFigureOut">
               <a:rPr lang="en-US" smtClean="0"/>
-              <a:t>3/1/2020</a:t>
+              <a:t>3/2/2020</a:t>
             </a:fld>
             <a:endParaRPr lang="en-US" dirty="0"/>
           </a:p>
@@ -10991,7 +10992,7 @@
           <a:p>
             <a:fld id="{8FA9179F-009E-4FA5-B091-7EBB82A185BD}" type="datetimeFigureOut">
               <a:rPr lang="en-US" smtClean="0"/>
-              <a:t>3/1/2020</a:t>
+              <a:t>3/2/2020</a:t>
             </a:fld>
             <a:endParaRPr lang="en-US" dirty="0"/>
           </a:p>
@@ -12108,7 +12109,7 @@
           <a:p>
             <a:fld id="{8E665CEB-0076-4E37-B880-BCEA9784DE0A}" type="datetimeFigureOut">
               <a:rPr lang="en-US" smtClean="0"/>
-              <a:t>3/1/2020</a:t>
+              <a:t>3/2/2020</a:t>
             </a:fld>
             <a:endParaRPr lang="en-US" dirty="0"/>
           </a:p>
@@ -13249,7 +13250,7 @@
           <a:p>
             <a:fld id="{A6149E5E-3896-4118-99A7-7B85668F1C5E}" type="datetimeFigureOut">
               <a:rPr lang="en-US" smtClean="0"/>
-              <a:t>3/1/2020</a:t>
+              <a:t>3/2/2020</a:t>
             </a:fld>
             <a:endParaRPr lang="en-US" dirty="0"/>
           </a:p>
@@ -14285,7 +14286,7 @@
           <a:p>
             <a:fld id="{7E0D914D-B099-4142-A885-11F276715148}" type="datetimeFigureOut">
               <a:rPr lang="en-US" smtClean="0"/>
-              <a:t>3/1/2020</a:t>
+              <a:t>3/2/2020</a:t>
             </a:fld>
             <a:endParaRPr lang="en-US" dirty="0"/>
           </a:p>
@@ -16473,7 +16474,7 @@
           <p:cNvPr id="2" name="Title 1">
             <a:extLst>
               <a:ext uri="{FF2B5EF4-FFF2-40B4-BE49-F238E27FC236}">
-                <a16:creationId xmlns:a16="http://schemas.microsoft.com/office/drawing/2014/main" id="{13E6CBA8-911E-4136-91A5-63371D4405EE}"/>
+                <a16:creationId xmlns:a16="http://schemas.microsoft.com/office/drawing/2014/main" id="{8BD49DC6-3927-4ED2-9577-B9FB5646763B}"/>
               </a:ext>
             </a:extLst>
           </p:cNvPr>
@@ -16491,7 +16492,7 @@
           <a:p>
             <a:r>
               <a:rPr lang="en-US" dirty="0"/>
-              <a:t>Credits and Acknowledgements</a:t>
+              <a:t>Questions</a:t>
             </a:r>
           </a:p>
         </p:txBody>
@@ -16501,7 +16502,7 @@
           <p:cNvPr id="3" name="Content Placeholder 2">
             <a:extLst>
               <a:ext uri="{FF2B5EF4-FFF2-40B4-BE49-F238E27FC236}">
-                <a16:creationId xmlns:a16="http://schemas.microsoft.com/office/drawing/2014/main" id="{5113F458-C263-43C1-92B3-83695D56AFEF}"/>
+                <a16:creationId xmlns:a16="http://schemas.microsoft.com/office/drawing/2014/main" id="{37D4A816-78D7-4251-97EB-AF4FC0026990}"/>
               </a:ext>
             </a:extLst>
           </p:cNvPr>
@@ -16519,42 +16520,12 @@
           <a:p>
             <a:r>
               <a:rPr lang="en-US" dirty="0"/>
-              <a:t>None of this presentation would be possible without two key sources:</a:t>
-            </a:r>
-          </a:p>
-          <a:p>
-            <a:pPr>
-              <a:buFont typeface="+mj-lt"/>
-              <a:buAutoNum type="arabicPeriod"/>
-            </a:pPr>
-            <a:r>
-              <a:rPr lang="en-US" dirty="0"/>
-              <a:t>Catherine Wilhelmsen (@</a:t>
-            </a:r>
-            <a:r>
-              <a:rPr lang="en-US" dirty="0" err="1"/>
-              <a:t>catherinew</a:t>
-            </a:r>
-            <a:r>
-              <a:rPr lang="en-US" dirty="0"/>
-              <a:t>)</a:t>
-            </a:r>
-          </a:p>
-          <a:p>
-            <a:pPr lvl="1"/>
-            <a:r>
-              <a:rPr lang="en-US" dirty="0"/>
-              <a:t>Her article on Docker is a great way to get started in a short amount of time</a:t>
-            </a:r>
-            <a:br>
-              <a:rPr lang="en-US" dirty="0"/>
-            </a:br>
+              <a:t>E-mail: </a:t>
+            </a:r>
             <a:r>
               <a:rPr lang="en-US" dirty="0">
                 <a:solidFill>
-                  <a:schemeClr val="accent4">
-                    <a:lumMod val="75000"/>
-                  </a:schemeClr>
+                  <a:srgbClr val="0070C0"/>
                 </a:solidFill>
                 <a:hlinkClick r:id="rId2">
                   <a:extLst>
@@ -16564,51 +16535,25 @@
                   </a:extLst>
                 </a:hlinkClick>
               </a:rPr>
-              <a:t>https://www.cathrinewilhelmsen.net/2018/12/02/sql-server-2019-docker-container/</a:t>
+              <a:t>ilanham@gmail.com</a:t>
             </a:r>
             <a:endParaRPr lang="en-US" dirty="0">
               <a:solidFill>
-                <a:schemeClr val="accent4">
-                  <a:lumMod val="75000"/>
-                </a:schemeClr>
+                <a:srgbClr val="0070C0"/>
               </a:solidFill>
             </a:endParaRPr>
           </a:p>
           <a:p>
-            <a:pPr lvl="1"/>
-            <a:endParaRPr lang="en-US" dirty="0"/>
-          </a:p>
-          <a:p>
-            <a:pPr>
-              <a:buFont typeface="+mj-lt"/>
-              <a:buAutoNum type="arabicPeriod"/>
-            </a:pPr>
+            <a:endParaRPr lang="en-US" dirty="0">
+              <a:solidFill>
+                <a:srgbClr val="0070C0"/>
+              </a:solidFill>
+            </a:endParaRPr>
+          </a:p>
+          <a:p>
             <a:r>
               <a:rPr lang="en-US" dirty="0"/>
-              <a:t>Andrew </a:t>
-            </a:r>
-            <a:r>
-              <a:rPr lang="en-US" dirty="0" err="1"/>
-              <a:t>Pruski</a:t>
-            </a:r>
-            <a:r>
-              <a:rPr lang="en-US" dirty="0"/>
-              <a:t> (@</a:t>
-            </a:r>
-            <a:r>
-              <a:rPr lang="en-US" dirty="0" err="1"/>
-              <a:t>dbafromthecold</a:t>
-            </a:r>
-            <a:r>
-              <a:rPr lang="en-US" dirty="0"/>
-              <a:t>)</a:t>
-            </a:r>
-          </a:p>
-          <a:p>
-            <a:pPr lvl="1"/>
-            <a:r>
-              <a:rPr lang="en-US" dirty="0"/>
-              <a:t>His container series is phenomenal</a:t>
+              <a:t>A copy of this presentation is on GitHub:</a:t>
             </a:r>
             <a:br>
               <a:rPr lang="en-US" dirty="0"/>
@@ -16616,9 +16561,7 @@
             <a:r>
               <a:rPr lang="en-US" dirty="0">
                 <a:solidFill>
-                  <a:schemeClr val="accent4">
-                    <a:lumMod val="75000"/>
-                  </a:schemeClr>
+                  <a:srgbClr val="0070C0"/>
                 </a:solidFill>
                 <a:hlinkClick r:id="rId3">
                   <a:extLst>
@@ -16628,20 +16571,15 @@
                   </a:extLst>
                 </a:hlinkClick>
               </a:rPr>
-              <a:t>https://dbafromthecold.com/2017/03/15/summary-of-my-container-series/</a:t>
+              <a:t>https://github.com/ilanham/Presentations</a:t>
             </a:r>
             <a:endParaRPr lang="en-US" dirty="0">
               <a:solidFill>
-                <a:schemeClr val="accent4">
-                  <a:lumMod val="75000"/>
-                </a:schemeClr>
+                <a:srgbClr val="0070C0"/>
               </a:solidFill>
             </a:endParaRPr>
           </a:p>
           <a:p>
-            <a:pPr marL="457200" lvl="1" indent="0">
-              <a:buNone/>
-            </a:pPr>
             <a:endParaRPr lang="en-US" dirty="0"/>
           </a:p>
         </p:txBody>
@@ -16649,7 +16587,7 @@
     </p:spTree>
     <p:extLst>
       <p:ext uri="{BB962C8B-B14F-4D97-AF65-F5344CB8AC3E}">
-        <p14:creationId xmlns:p14="http://schemas.microsoft.com/office/powerpoint/2010/main" val="655056839"/>
+        <p14:creationId xmlns:p14="http://schemas.microsoft.com/office/powerpoint/2010/main" val="793635217"/>
       </p:ext>
     </p:extLst>
   </p:cSld>
@@ -16798,6 +16736,226 @@
     <p:extLst>
       <p:ext uri="{BB962C8B-B14F-4D97-AF65-F5344CB8AC3E}">
         <p14:creationId xmlns:p14="http://schemas.microsoft.com/office/powerpoint/2010/main" val="292541146"/>
+      </p:ext>
+    </p:extLst>
+  </p:cSld>
+  <p:clrMapOvr>
+    <a:masterClrMapping/>
+  </p:clrMapOvr>
+  <mc:AlternateContent xmlns:mc="http://schemas.openxmlformats.org/markup-compatibility/2006" xmlns:p14="http://schemas.microsoft.com/office/powerpoint/2010/main">
+    <mc:Choice Requires="p14">
+      <p:transition p14:dur="400">
+        <p14:reveal/>
+      </p:transition>
+    </mc:Choice>
+    <mc:Fallback xmlns="">
+      <p:transition>
+        <p:fade/>
+      </p:transition>
+    </mc:Fallback>
+  </mc:AlternateContent>
+</p:sld>
+</file>
+
+<file path=ppt/slides/slide20.xml><?xml version="1.0" encoding="utf-8"?>
+<p:sld xmlns:a="http://schemas.openxmlformats.org/drawingml/2006/main" xmlns:r="http://schemas.openxmlformats.org/officeDocument/2006/relationships" xmlns:p="http://schemas.openxmlformats.org/presentationml/2006/main">
+  <p:cSld>
+    <p:spTree>
+      <p:nvGrpSpPr>
+        <p:cNvPr id="1" name=""/>
+        <p:cNvGrpSpPr/>
+        <p:nvPr/>
+      </p:nvGrpSpPr>
+      <p:grpSpPr>
+        <a:xfrm>
+          <a:off x="0" y="0"/>
+          <a:ext cx="0" cy="0"/>
+          <a:chOff x="0" y="0"/>
+          <a:chExt cx="0" cy="0"/>
+        </a:xfrm>
+      </p:grpSpPr>
+      <p:sp>
+        <p:nvSpPr>
+          <p:cNvPr id="2" name="Title 1">
+            <a:extLst>
+              <a:ext uri="{FF2B5EF4-FFF2-40B4-BE49-F238E27FC236}">
+                <a16:creationId xmlns:a16="http://schemas.microsoft.com/office/drawing/2014/main" id="{13E6CBA8-911E-4136-91A5-63371D4405EE}"/>
+              </a:ext>
+            </a:extLst>
+          </p:cNvPr>
+          <p:cNvSpPr>
+            <a:spLocks noGrp="1"/>
+          </p:cNvSpPr>
+          <p:nvPr>
+            <p:ph type="title"/>
+          </p:nvPr>
+        </p:nvSpPr>
+        <p:spPr/>
+        <p:txBody>
+          <a:bodyPr/>
+          <a:lstStyle/>
+          <a:p>
+            <a:r>
+              <a:rPr lang="en-US" dirty="0"/>
+              <a:t>Credits and Acknowledgements</a:t>
+            </a:r>
+          </a:p>
+        </p:txBody>
+      </p:sp>
+      <p:sp>
+        <p:nvSpPr>
+          <p:cNvPr id="3" name="Content Placeholder 2">
+            <a:extLst>
+              <a:ext uri="{FF2B5EF4-FFF2-40B4-BE49-F238E27FC236}">
+                <a16:creationId xmlns:a16="http://schemas.microsoft.com/office/drawing/2014/main" id="{5113F458-C263-43C1-92B3-83695D56AFEF}"/>
+              </a:ext>
+            </a:extLst>
+          </p:cNvPr>
+          <p:cNvSpPr>
+            <a:spLocks noGrp="1"/>
+          </p:cNvSpPr>
+          <p:nvPr>
+            <p:ph idx="1"/>
+          </p:nvPr>
+        </p:nvSpPr>
+        <p:spPr/>
+        <p:txBody>
+          <a:bodyPr/>
+          <a:lstStyle/>
+          <a:p>
+            <a:r>
+              <a:rPr lang="en-US" dirty="0"/>
+              <a:t>None of this presentation would be possible without two key sources:</a:t>
+            </a:r>
+          </a:p>
+          <a:p>
+            <a:pPr>
+              <a:buFont typeface="+mj-lt"/>
+              <a:buAutoNum type="arabicPeriod"/>
+            </a:pPr>
+            <a:r>
+              <a:rPr lang="en-US" dirty="0"/>
+              <a:t>Catherine Wilhelmsen (@</a:t>
+            </a:r>
+            <a:r>
+              <a:rPr lang="en-US" dirty="0" err="1"/>
+              <a:t>catherinew</a:t>
+            </a:r>
+            <a:r>
+              <a:rPr lang="en-US" dirty="0"/>
+              <a:t>)</a:t>
+            </a:r>
+          </a:p>
+          <a:p>
+            <a:pPr lvl="1"/>
+            <a:r>
+              <a:rPr lang="en-US" dirty="0"/>
+              <a:t>Her article on Docker is a great way to get started in a short amount of time</a:t>
+            </a:r>
+            <a:br>
+              <a:rPr lang="en-US" dirty="0"/>
+            </a:br>
+            <a:r>
+              <a:rPr lang="en-US" dirty="0">
+                <a:solidFill>
+                  <a:schemeClr val="accent4">
+                    <a:lumMod val="75000"/>
+                  </a:schemeClr>
+                </a:solidFill>
+                <a:hlinkClick r:id="rId2">
+                  <a:extLst>
+                    <a:ext uri="{A12FA001-AC4F-418D-AE19-62706E023703}">
+                      <ahyp:hlinkClr xmlns:ahyp="http://schemas.microsoft.com/office/drawing/2018/hyperlinkcolor" val="tx"/>
+                    </a:ext>
+                  </a:extLst>
+                </a:hlinkClick>
+              </a:rPr>
+              <a:t>https://www.cathrinewilhelmsen.net/2018/12/02/sql-server-2019-docker-container/</a:t>
+            </a:r>
+            <a:endParaRPr lang="en-US" dirty="0">
+              <a:solidFill>
+                <a:schemeClr val="accent4">
+                  <a:lumMod val="75000"/>
+                </a:schemeClr>
+              </a:solidFill>
+            </a:endParaRPr>
+          </a:p>
+          <a:p>
+            <a:pPr lvl="1"/>
+            <a:endParaRPr lang="en-US" dirty="0"/>
+          </a:p>
+          <a:p>
+            <a:pPr>
+              <a:buFont typeface="+mj-lt"/>
+              <a:buAutoNum type="arabicPeriod"/>
+            </a:pPr>
+            <a:r>
+              <a:rPr lang="en-US" dirty="0"/>
+              <a:t>Andrew </a:t>
+            </a:r>
+            <a:r>
+              <a:rPr lang="en-US" dirty="0" err="1"/>
+              <a:t>Pruski</a:t>
+            </a:r>
+            <a:r>
+              <a:rPr lang="en-US" dirty="0"/>
+              <a:t> (@</a:t>
+            </a:r>
+            <a:r>
+              <a:rPr lang="en-US" dirty="0" err="1"/>
+              <a:t>dbafromthecold</a:t>
+            </a:r>
+            <a:r>
+              <a:rPr lang="en-US" dirty="0"/>
+              <a:t>)</a:t>
+            </a:r>
+          </a:p>
+          <a:p>
+            <a:pPr lvl="1"/>
+            <a:r>
+              <a:rPr lang="en-US" dirty="0"/>
+              <a:t>His container series is phenomenal</a:t>
+            </a:r>
+            <a:br>
+              <a:rPr lang="en-US" dirty="0"/>
+            </a:br>
+            <a:r>
+              <a:rPr lang="en-US" dirty="0">
+                <a:solidFill>
+                  <a:schemeClr val="accent4">
+                    <a:lumMod val="75000"/>
+                  </a:schemeClr>
+                </a:solidFill>
+                <a:hlinkClick r:id="rId3">
+                  <a:extLst>
+                    <a:ext uri="{A12FA001-AC4F-418D-AE19-62706E023703}">
+                      <ahyp:hlinkClr xmlns:ahyp="http://schemas.microsoft.com/office/drawing/2018/hyperlinkcolor" val="tx"/>
+                    </a:ext>
+                  </a:extLst>
+                </a:hlinkClick>
+              </a:rPr>
+              <a:t>https://dbafromthecold.com/2017/03/15/summary-of-my-container-series/</a:t>
+            </a:r>
+            <a:endParaRPr lang="en-US" dirty="0">
+              <a:solidFill>
+                <a:schemeClr val="accent4">
+                  <a:lumMod val="75000"/>
+                </a:schemeClr>
+              </a:solidFill>
+            </a:endParaRPr>
+          </a:p>
+          <a:p>
+            <a:pPr marL="457200" lvl="1" indent="0">
+              <a:buNone/>
+            </a:pPr>
+            <a:endParaRPr lang="en-US" dirty="0"/>
+          </a:p>
+        </p:txBody>
+      </p:sp>
+    </p:spTree>
+    <p:extLst>
+      <p:ext uri="{BB962C8B-B14F-4D97-AF65-F5344CB8AC3E}">
+        <p14:creationId xmlns:p14="http://schemas.microsoft.com/office/powerpoint/2010/main" val="655056839"/>
       </p:ext>
     </p:extLst>
   </p:cSld>

</xml_diff>

<commit_message>
Added spekaer notes to most slides
</commit_message>
<xml_diff>
--- a/Developing for SQL Server with Docker.pptx
+++ b/Developing for SQL Server with Docker.pptx
@@ -24,8 +24,8 @@
     <p:sldId id="263" r:id="rId15"/>
     <p:sldId id="267" r:id="rId16"/>
     <p:sldId id="274" r:id="rId17"/>
-    <p:sldId id="276" r:id="rId18"/>
-    <p:sldId id="275" r:id="rId19"/>
+    <p:sldId id="275" r:id="rId18"/>
+    <p:sldId id="276" r:id="rId19"/>
     <p:sldId id="277" r:id="rId20"/>
     <p:sldId id="269" r:id="rId21"/>
   </p:sldIdLst>
@@ -227,7 +227,7 @@
           <a:p>
             <a:fld id="{1C146976-FE24-468C-9E36-42E55C1289BE}" type="datetimeFigureOut">
               <a:rPr lang="en-US" smtClean="0"/>
-              <a:t>3/3/2020</a:t>
+              <a:t>3/4/2020</a:t>
             </a:fld>
             <a:endParaRPr lang="en-US"/>
           </a:p>
@@ -538,30 +538,9 @@
           <a:bodyPr/>
           <a:lstStyle/>
           <a:p>
-            <a:pPr marL="228600" indent="-228600">
-              <a:buAutoNum type="arabicPeriod"/>
-            </a:pPr>
             <a:r>
               <a:rPr lang="en-US" dirty="0"/>
-              <a:t>Make a point to note you can have multiple copies of the same process running on the same OS. No need to virtualize the operating system for each container</a:t>
-            </a:r>
-          </a:p>
-          <a:p>
-            <a:pPr marL="228600" indent="-228600">
-              <a:buAutoNum type="arabicPeriod"/>
-            </a:pPr>
-            <a:r>
-              <a:rPr lang="en-US" dirty="0"/>
-              <a:t>You save all of the virtualized idle CPU when not virtualizing an OS. Also saving mostly on disk space</a:t>
-            </a:r>
-          </a:p>
-          <a:p>
-            <a:pPr marL="228600" indent="-228600">
-              <a:buAutoNum type="arabicPeriod"/>
-            </a:pPr>
-            <a:r>
-              <a:rPr lang="en-US" dirty="0"/>
-              <a:t>Also, no binaries installed on your Host OS, no registry entries for the other servers</a:t>
+              <a:t>Survey of attendees developing against SQL Server, then of those using VMs or local instance installs</a:t>
             </a:r>
           </a:p>
         </p:txBody>
@@ -583,16 +562,361 @@
           <a:p>
             <a:fld id="{B07B5B4F-0F75-48F2-BFB2-73D5ADCDF733}" type="slidenum">
               <a:rPr lang="en-US" smtClean="0"/>
-              <a:t>3</a:t>
+              <a:t>1</a:t>
             </a:fld>
-            <a:endParaRPr lang="en-US" dirty="0"/>
+            <a:endParaRPr lang="en-US"/>
           </a:p>
         </p:txBody>
       </p:sp>
     </p:spTree>
     <p:extLst>
       <p:ext uri="{BB962C8B-B14F-4D97-AF65-F5344CB8AC3E}">
-        <p14:creationId xmlns:p14="http://schemas.microsoft.com/office/powerpoint/2010/main" val="2149954942"/>
+        <p14:creationId xmlns:p14="http://schemas.microsoft.com/office/powerpoint/2010/main" val="4171152702"/>
+      </p:ext>
+    </p:extLst>
+  </p:cSld>
+  <p:clrMapOvr>
+    <a:masterClrMapping/>
+  </p:clrMapOvr>
+</p:notes>
+</file>
+
+<file path=ppt/notesSlides/notesSlide10.xml><?xml version="1.0" encoding="utf-8"?>
+<p:notes xmlns:a="http://schemas.openxmlformats.org/drawingml/2006/main" xmlns:r="http://schemas.openxmlformats.org/officeDocument/2006/relationships" xmlns:p="http://schemas.openxmlformats.org/presentationml/2006/main">
+  <p:cSld>
+    <p:spTree>
+      <p:nvGrpSpPr>
+        <p:cNvPr id="1" name=""/>
+        <p:cNvGrpSpPr/>
+        <p:nvPr/>
+      </p:nvGrpSpPr>
+      <p:grpSpPr>
+        <a:xfrm>
+          <a:off x="0" y="0"/>
+          <a:ext cx="0" cy="0"/>
+          <a:chOff x="0" y="0"/>
+          <a:chExt cx="0" cy="0"/>
+        </a:xfrm>
+      </p:grpSpPr>
+      <p:sp>
+        <p:nvSpPr>
+          <p:cNvPr id="2" name="Slide Image Placeholder 1"/>
+          <p:cNvSpPr>
+            <a:spLocks noGrp="1" noRot="1" noChangeAspect="1"/>
+          </p:cNvSpPr>
+          <p:nvPr>
+            <p:ph type="sldImg"/>
+          </p:nvPr>
+        </p:nvSpPr>
+        <p:spPr/>
+      </p:sp>
+      <p:sp>
+        <p:nvSpPr>
+          <p:cNvPr id="3" name="Notes Placeholder 2"/>
+          <p:cNvSpPr>
+            <a:spLocks noGrp="1"/>
+          </p:cNvSpPr>
+          <p:nvPr>
+            <p:ph type="body" idx="1"/>
+          </p:nvPr>
+        </p:nvSpPr>
+        <p:spPr/>
+        <p:txBody>
+          <a:bodyPr/>
+          <a:lstStyle/>
+          <a:p>
+            <a:r>
+              <a:rPr lang="en-US" dirty="0"/>
+              <a:t>The next slide covers it, but start the explanation that Bind Mounts are necessary when using Linux Containers on Windows hosts</a:t>
+            </a:r>
+          </a:p>
+        </p:txBody>
+      </p:sp>
+      <p:sp>
+        <p:nvSpPr>
+          <p:cNvPr id="4" name="Slide Number Placeholder 3"/>
+          <p:cNvSpPr>
+            <a:spLocks noGrp="1"/>
+          </p:cNvSpPr>
+          <p:nvPr>
+            <p:ph type="sldNum" sz="quarter" idx="5"/>
+          </p:nvPr>
+        </p:nvSpPr>
+        <p:spPr/>
+        <p:txBody>
+          <a:bodyPr/>
+          <a:lstStyle/>
+          <a:p>
+            <a:fld id="{B07B5B4F-0F75-48F2-BFB2-73D5ADCDF733}" type="slidenum">
+              <a:rPr lang="en-US" smtClean="0"/>
+              <a:t>10</a:t>
+            </a:fld>
+            <a:endParaRPr lang="en-US"/>
+          </a:p>
+        </p:txBody>
+      </p:sp>
+    </p:spTree>
+    <p:extLst>
+      <p:ext uri="{BB962C8B-B14F-4D97-AF65-F5344CB8AC3E}">
+        <p14:creationId xmlns:p14="http://schemas.microsoft.com/office/powerpoint/2010/main" val="4085663867"/>
+      </p:ext>
+    </p:extLst>
+  </p:cSld>
+  <p:clrMapOvr>
+    <a:masterClrMapping/>
+  </p:clrMapOvr>
+</p:notes>
+</file>
+
+<file path=ppt/notesSlides/notesSlide11.xml><?xml version="1.0" encoding="utf-8"?>
+<p:notes xmlns:a="http://schemas.openxmlformats.org/drawingml/2006/main" xmlns:r="http://schemas.openxmlformats.org/officeDocument/2006/relationships" xmlns:p="http://schemas.openxmlformats.org/presentationml/2006/main">
+  <p:cSld>
+    <p:spTree>
+      <p:nvGrpSpPr>
+        <p:cNvPr id="1" name=""/>
+        <p:cNvGrpSpPr/>
+        <p:nvPr/>
+      </p:nvGrpSpPr>
+      <p:grpSpPr>
+        <a:xfrm>
+          <a:off x="0" y="0"/>
+          <a:ext cx="0" cy="0"/>
+          <a:chOff x="0" y="0"/>
+          <a:chExt cx="0" cy="0"/>
+        </a:xfrm>
+      </p:grpSpPr>
+      <p:sp>
+        <p:nvSpPr>
+          <p:cNvPr id="2" name="Slide Image Placeholder 1"/>
+          <p:cNvSpPr>
+            <a:spLocks noGrp="1" noRot="1" noChangeAspect="1"/>
+          </p:cNvSpPr>
+          <p:nvPr>
+            <p:ph type="sldImg"/>
+          </p:nvPr>
+        </p:nvSpPr>
+        <p:spPr/>
+      </p:sp>
+      <p:sp>
+        <p:nvSpPr>
+          <p:cNvPr id="3" name="Notes Placeholder 2"/>
+          <p:cNvSpPr>
+            <a:spLocks noGrp="1"/>
+          </p:cNvSpPr>
+          <p:nvPr>
+            <p:ph type="body" idx="1"/>
+          </p:nvPr>
+        </p:nvSpPr>
+        <p:spPr/>
+        <p:txBody>
+          <a:bodyPr/>
+          <a:lstStyle/>
+          <a:p>
+            <a:r>
+              <a:rPr lang="en-US" dirty="0"/>
+              <a:t>Go to the path of the named volume after creating</a:t>
+            </a:r>
+          </a:p>
+        </p:txBody>
+      </p:sp>
+      <p:sp>
+        <p:nvSpPr>
+          <p:cNvPr id="4" name="Slide Number Placeholder 3"/>
+          <p:cNvSpPr>
+            <a:spLocks noGrp="1"/>
+          </p:cNvSpPr>
+          <p:nvPr>
+            <p:ph type="sldNum" sz="quarter" idx="5"/>
+          </p:nvPr>
+        </p:nvSpPr>
+        <p:spPr/>
+        <p:txBody>
+          <a:bodyPr/>
+          <a:lstStyle/>
+          <a:p>
+            <a:fld id="{B07B5B4F-0F75-48F2-BFB2-73D5ADCDF733}" type="slidenum">
+              <a:rPr lang="en-US" smtClean="0"/>
+              <a:t>12</a:t>
+            </a:fld>
+            <a:endParaRPr lang="en-US"/>
+          </a:p>
+        </p:txBody>
+      </p:sp>
+    </p:spTree>
+    <p:extLst>
+      <p:ext uri="{BB962C8B-B14F-4D97-AF65-F5344CB8AC3E}">
+        <p14:creationId xmlns:p14="http://schemas.microsoft.com/office/powerpoint/2010/main" val="3062470410"/>
+      </p:ext>
+    </p:extLst>
+  </p:cSld>
+  <p:clrMapOvr>
+    <a:masterClrMapping/>
+  </p:clrMapOvr>
+</p:notes>
+</file>
+
+<file path=ppt/notesSlides/notesSlide12.xml><?xml version="1.0" encoding="utf-8"?>
+<p:notes xmlns:a="http://schemas.openxmlformats.org/drawingml/2006/main" xmlns:r="http://schemas.openxmlformats.org/officeDocument/2006/relationships" xmlns:p="http://schemas.openxmlformats.org/presentationml/2006/main">
+  <p:cSld>
+    <p:spTree>
+      <p:nvGrpSpPr>
+        <p:cNvPr id="1" name=""/>
+        <p:cNvGrpSpPr/>
+        <p:nvPr/>
+      </p:nvGrpSpPr>
+      <p:grpSpPr>
+        <a:xfrm>
+          <a:off x="0" y="0"/>
+          <a:ext cx="0" cy="0"/>
+          <a:chOff x="0" y="0"/>
+          <a:chExt cx="0" cy="0"/>
+        </a:xfrm>
+      </p:grpSpPr>
+      <p:sp>
+        <p:nvSpPr>
+          <p:cNvPr id="2" name="Slide Image Placeholder 1"/>
+          <p:cNvSpPr>
+            <a:spLocks noGrp="1" noRot="1" noChangeAspect="1"/>
+          </p:cNvSpPr>
+          <p:nvPr>
+            <p:ph type="sldImg"/>
+          </p:nvPr>
+        </p:nvSpPr>
+        <p:spPr/>
+      </p:sp>
+      <p:sp>
+        <p:nvSpPr>
+          <p:cNvPr id="3" name="Notes Placeholder 2"/>
+          <p:cNvSpPr>
+            <a:spLocks noGrp="1"/>
+          </p:cNvSpPr>
+          <p:nvPr>
+            <p:ph type="body" idx="1"/>
+          </p:nvPr>
+        </p:nvSpPr>
+        <p:spPr/>
+        <p:txBody>
+          <a:bodyPr/>
+          <a:lstStyle/>
+          <a:p>
+            <a:r>
+              <a:rPr lang="en-US" dirty="0"/>
+              <a:t>Note that option 1 is the only customization available if the image doesn’t have environment variables exposed/documented</a:t>
+            </a:r>
+          </a:p>
+        </p:txBody>
+      </p:sp>
+      <p:sp>
+        <p:nvSpPr>
+          <p:cNvPr id="4" name="Slide Number Placeholder 3"/>
+          <p:cNvSpPr>
+            <a:spLocks noGrp="1"/>
+          </p:cNvSpPr>
+          <p:nvPr>
+            <p:ph type="sldNum" sz="quarter" idx="5"/>
+          </p:nvPr>
+        </p:nvSpPr>
+        <p:spPr/>
+        <p:txBody>
+          <a:bodyPr/>
+          <a:lstStyle/>
+          <a:p>
+            <a:fld id="{B07B5B4F-0F75-48F2-BFB2-73D5ADCDF733}" type="slidenum">
+              <a:rPr lang="en-US" smtClean="0"/>
+              <a:t>14</a:t>
+            </a:fld>
+            <a:endParaRPr lang="en-US"/>
+          </a:p>
+        </p:txBody>
+      </p:sp>
+    </p:spTree>
+    <p:extLst>
+      <p:ext uri="{BB962C8B-B14F-4D97-AF65-F5344CB8AC3E}">
+        <p14:creationId xmlns:p14="http://schemas.microsoft.com/office/powerpoint/2010/main" val="1130096044"/>
+      </p:ext>
+    </p:extLst>
+  </p:cSld>
+  <p:clrMapOvr>
+    <a:masterClrMapping/>
+  </p:clrMapOvr>
+</p:notes>
+</file>
+
+<file path=ppt/notesSlides/notesSlide13.xml><?xml version="1.0" encoding="utf-8"?>
+<p:notes xmlns:a="http://schemas.openxmlformats.org/drawingml/2006/main" xmlns:r="http://schemas.openxmlformats.org/officeDocument/2006/relationships" xmlns:p="http://schemas.openxmlformats.org/presentationml/2006/main">
+  <p:cSld>
+    <p:spTree>
+      <p:nvGrpSpPr>
+        <p:cNvPr id="1" name=""/>
+        <p:cNvGrpSpPr/>
+        <p:nvPr/>
+      </p:nvGrpSpPr>
+      <p:grpSpPr>
+        <a:xfrm>
+          <a:off x="0" y="0"/>
+          <a:ext cx="0" cy="0"/>
+          <a:chOff x="0" y="0"/>
+          <a:chExt cx="0" cy="0"/>
+        </a:xfrm>
+      </p:grpSpPr>
+      <p:sp>
+        <p:nvSpPr>
+          <p:cNvPr id="2" name="Slide Image Placeholder 1"/>
+          <p:cNvSpPr>
+            <a:spLocks noGrp="1" noRot="1" noChangeAspect="1"/>
+          </p:cNvSpPr>
+          <p:nvPr>
+            <p:ph type="sldImg"/>
+          </p:nvPr>
+        </p:nvSpPr>
+        <p:spPr/>
+      </p:sp>
+      <p:sp>
+        <p:nvSpPr>
+          <p:cNvPr id="3" name="Notes Placeholder 2"/>
+          <p:cNvSpPr>
+            <a:spLocks noGrp="1"/>
+          </p:cNvSpPr>
+          <p:nvPr>
+            <p:ph type="body" idx="1"/>
+          </p:nvPr>
+        </p:nvSpPr>
+        <p:spPr/>
+        <p:txBody>
+          <a:bodyPr/>
+          <a:lstStyle/>
+          <a:p>
+            <a:endParaRPr lang="en-US" dirty="0"/>
+          </a:p>
+        </p:txBody>
+      </p:sp>
+      <p:sp>
+        <p:nvSpPr>
+          <p:cNvPr id="4" name="Slide Number Placeholder 3"/>
+          <p:cNvSpPr>
+            <a:spLocks noGrp="1"/>
+          </p:cNvSpPr>
+          <p:nvPr>
+            <p:ph type="sldNum" sz="quarter" idx="5"/>
+          </p:nvPr>
+        </p:nvSpPr>
+        <p:spPr/>
+        <p:txBody>
+          <a:bodyPr/>
+          <a:lstStyle/>
+          <a:p>
+            <a:fld id="{B07B5B4F-0F75-48F2-BFB2-73D5ADCDF733}" type="slidenum">
+              <a:rPr lang="en-US" smtClean="0"/>
+              <a:t>16</a:t>
+            </a:fld>
+            <a:endParaRPr lang="en-US"/>
+          </a:p>
+        </p:txBody>
+      </p:sp>
+    </p:spTree>
+    <p:extLst>
+      <p:ext uri="{BB962C8B-B14F-4D97-AF65-F5344CB8AC3E}">
+        <p14:creationId xmlns:p14="http://schemas.microsoft.com/office/powerpoint/2010/main" val="3561534009"/>
       </p:ext>
     </p:extLst>
   </p:cSld>
@@ -648,50 +972,12 @@
           <a:p>
             <a:r>
               <a:rPr lang="en-US" dirty="0"/>
-              <a:t>Points to bring up:</a:t>
-            </a:r>
-          </a:p>
-          <a:p>
-            <a:r>
+              <a:t>The set of software products is multiple items: an API, (sometimes) a Virtual Machine, and a set of file-system changes. The Containers are defined as code, and makes reproducibility much easier than “Install Steps with VM setup”.</a:t>
+            </a:r>
+            <a:br>
               <a:rPr lang="en-US" dirty="0"/>
-              <a:t>- How large a VM is</a:t>
-            </a:r>
-          </a:p>
-          <a:p>
-            <a:r>
-              <a:rPr lang="en-US" dirty="0"/>
-              <a:t>- How much memory it takes</a:t>
-            </a:r>
-          </a:p>
-          <a:p>
-            <a:r>
-              <a:rPr lang="en-US" dirty="0"/>
-              <a:t>- All of the OS-setup jazz</a:t>
-            </a:r>
-          </a:p>
-          <a:p>
-            <a:r>
-              <a:rPr lang="en-US" dirty="0"/>
-              <a:t>  vs.</a:t>
-            </a:r>
-          </a:p>
-          <a:p>
-            <a:r>
-              <a:rPr lang="en-US" dirty="0"/>
-              <a:t>- Containers are on the same host OS</a:t>
-            </a:r>
-          </a:p>
-          <a:p>
-            <a:r>
-              <a:rPr lang="en-US" dirty="0"/>
-              <a:t>- They run in their own space</a:t>
-            </a:r>
-          </a:p>
-          <a:p>
-            <a:r>
-              <a:rPr lang="en-US" dirty="0"/>
-              <a:t>- They take less space than a VM</a:t>
-            </a:r>
+            </a:br>
+            <a:endParaRPr lang="en-US" dirty="0"/>
           </a:p>
         </p:txBody>
       </p:sp>
@@ -712,7 +998,7 @@
           <a:p>
             <a:fld id="{B07B5B4F-0F75-48F2-BFB2-73D5ADCDF733}" type="slidenum">
               <a:rPr lang="en-US" smtClean="0"/>
-              <a:t>4</a:t>
+              <a:t>2</a:t>
             </a:fld>
             <a:endParaRPr lang="en-US"/>
           </a:p>
@@ -721,7 +1007,7 @@
     </p:spTree>
     <p:extLst>
       <p:ext uri="{BB962C8B-B14F-4D97-AF65-F5344CB8AC3E}">
-        <p14:creationId xmlns:p14="http://schemas.microsoft.com/office/powerpoint/2010/main" val="2431813795"/>
+        <p14:creationId xmlns:p14="http://schemas.microsoft.com/office/powerpoint/2010/main" val="3922093597"/>
       </p:ext>
     </p:extLst>
   </p:cSld>
@@ -775,9 +1061,48 @@
           <a:bodyPr/>
           <a:lstStyle/>
           <a:p>
+            <a:pPr marL="228600" indent="-228600">
+              <a:buAutoNum type="arabicPeriod"/>
+            </a:pPr>
             <a:r>
               <a:rPr lang="en-US" dirty="0"/>
-              <a:t>You can run your own Registry too, handy if you want to distribute your own Docker Images at some point</a:t>
+              <a:t>Make a point to note you can have multiple copies of the same process running on the same OS. No need to virtualize the operating system for each container</a:t>
+            </a:r>
+          </a:p>
+          <a:p>
+            <a:pPr marL="228600" indent="-228600">
+              <a:buAutoNum type="arabicPeriod"/>
+            </a:pPr>
+            <a:r>
+              <a:rPr lang="en-US" dirty="0"/>
+              <a:t>You save all of the virtualized idle CPU when not virtualizing an OS. Also saving mostly on disk space</a:t>
+            </a:r>
+          </a:p>
+          <a:p>
+            <a:pPr marL="228600" indent="-228600">
+              <a:buAutoNum type="arabicPeriod"/>
+            </a:pPr>
+            <a:r>
+              <a:rPr lang="en-US" dirty="0"/>
+              <a:t>Also, no binaries installed on your Host OS, no registry entries for the other servers</a:t>
+            </a:r>
+          </a:p>
+          <a:p>
+            <a:pPr marL="228600" indent="-228600">
+              <a:buAutoNum type="arabicPeriod"/>
+            </a:pPr>
+            <a:r>
+              <a:rPr lang="en-US" dirty="0"/>
+              <a:t>Last point, Linux Containers on Windows host uses a Virtual Machine</a:t>
+            </a:r>
+          </a:p>
+          <a:p>
+            <a:pPr marL="228600" indent="-228600">
+              <a:buAutoNum type="arabicPeriod"/>
+            </a:pPr>
+            <a:r>
+              <a:rPr lang="en-US" dirty="0"/>
+              <a:t>Open Hyper-V Manager to show the Linux VM for Docker</a:t>
             </a:r>
           </a:p>
         </p:txBody>
@@ -799,16 +1124,16 @@
           <a:p>
             <a:fld id="{B07B5B4F-0F75-48F2-BFB2-73D5ADCDF733}" type="slidenum">
               <a:rPr lang="en-US" smtClean="0"/>
-              <a:t>6</a:t>
+              <a:t>3</a:t>
             </a:fld>
-            <a:endParaRPr lang="en-US"/>
+            <a:endParaRPr lang="en-US" dirty="0"/>
           </a:p>
         </p:txBody>
       </p:sp>
     </p:spTree>
     <p:extLst>
       <p:ext uri="{BB962C8B-B14F-4D97-AF65-F5344CB8AC3E}">
-        <p14:creationId xmlns:p14="http://schemas.microsoft.com/office/powerpoint/2010/main" val="508300639"/>
+        <p14:creationId xmlns:p14="http://schemas.microsoft.com/office/powerpoint/2010/main" val="2149954942"/>
       </p:ext>
     </p:extLst>
   </p:cSld>
@@ -862,48 +1187,72 @@
           <a:bodyPr/>
           <a:lstStyle/>
           <a:p>
-            <a:pPr marL="228600" indent="-228600">
-              <a:buAutoNum type="arabicPeriod"/>
+            <a:r>
+              <a:rPr lang="en-US" dirty="0"/>
+              <a:t>Points to bring up:</a:t>
+            </a:r>
+          </a:p>
+          <a:p>
+            <a:r>
+              <a:rPr lang="en-US" dirty="0"/>
+              <a:t>- How large a VM is</a:t>
+            </a:r>
+          </a:p>
+          <a:p>
+            <a:r>
+              <a:rPr lang="en-US" dirty="0"/>
+              <a:t>- How much memory it takes</a:t>
+            </a:r>
+          </a:p>
+          <a:p>
+            <a:r>
+              <a:rPr lang="en-US" dirty="0"/>
+              <a:t>- All of the OS-setup jazz</a:t>
+            </a:r>
+          </a:p>
+          <a:p>
+            <a:r>
+              <a:rPr lang="en-US" dirty="0"/>
+              <a:t>  vs.</a:t>
+            </a:r>
+          </a:p>
+          <a:p>
+            <a:r>
+              <a:rPr lang="en-US" dirty="0"/>
+              <a:t>- Containers are on the same host OS</a:t>
+            </a:r>
+          </a:p>
+          <a:p>
+            <a:r>
+              <a:rPr lang="en-US" dirty="0"/>
+              <a:t>- They run in their own space</a:t>
+            </a:r>
+          </a:p>
+          <a:p>
+            <a:pPr marL="0" indent="0">
+              <a:buFontTx/>
+              <a:buNone/>
             </a:pPr>
             <a:r>
               <a:rPr lang="en-US" dirty="0"/>
-              <a:t>Mention –it instead of –d to run interactively in the CLI</a:t>
-            </a:r>
-          </a:p>
-          <a:p>
-            <a:pPr marL="228600" indent="-228600">
-              <a:buAutoNum type="arabicPeriod"/>
+              <a:t>- They take less space than a VM</a:t>
+            </a:r>
+          </a:p>
+          <a:p>
+            <a:pPr marL="171450" indent="-171450">
+              <a:buFontTx/>
+              <a:buChar char="-"/>
             </a:pPr>
+            <a:endParaRPr lang="en-US" dirty="0"/>
+          </a:p>
+          <a:p>
+            <a:pPr marL="0" indent="0">
+              <a:buFontTx/>
+              <a:buNone/>
+            </a:pPr>
             <a:r>
               <a:rPr lang="en-US" dirty="0"/>
-              <a:t>If you don’t give the Container a name, you get a hex string</a:t>
-            </a:r>
-          </a:p>
-          <a:p>
-            <a:pPr marL="228600" indent="-228600">
-              <a:buAutoNum type="arabicPeriod"/>
-            </a:pPr>
-            <a:r>
-              <a:rPr lang="en-US" dirty="0"/>
-              <a:t>-e will change for each container you run, i.e. SQL Server environment variables != Postgres environment variables</a:t>
-            </a:r>
-          </a:p>
-          <a:p>
-            <a:pPr marL="228600" indent="-228600">
-              <a:buAutoNum type="arabicPeriod"/>
-            </a:pPr>
-            <a:r>
-              <a:rPr lang="en-US" dirty="0"/>
-              <a:t>-v is either mounting a named volume or using a bind mount. Be clear that we’ll cover in a bit, but that topic is the key to persisting data with Containers</a:t>
-            </a:r>
-          </a:p>
-          <a:p>
-            <a:pPr marL="228600" indent="-228600">
-              <a:buAutoNum type="arabicPeriod"/>
-            </a:pPr>
-            <a:r>
-              <a:rPr lang="en-US" dirty="0"/>
-              <a:t>Go over the tag after the colon and that those are important. Demo leaving the tag off and the Docker engine doesn’t know what to do with it</a:t>
+              <a:t>Differencing Disks can help with space savings, but trying to do Windows Updates with them is a nightmare after a while</a:t>
             </a:r>
           </a:p>
         </p:txBody>
@@ -925,16 +1274,16 @@
           <a:p>
             <a:fld id="{B07B5B4F-0F75-48F2-BFB2-73D5ADCDF733}" type="slidenum">
               <a:rPr lang="en-US" smtClean="0"/>
-              <a:t>7</a:t>
+              <a:t>4</a:t>
             </a:fld>
-            <a:endParaRPr lang="en-US" dirty="0"/>
+            <a:endParaRPr lang="en-US"/>
           </a:p>
         </p:txBody>
       </p:sp>
     </p:spTree>
     <p:extLst>
       <p:ext uri="{BB962C8B-B14F-4D97-AF65-F5344CB8AC3E}">
-        <p14:creationId xmlns:p14="http://schemas.microsoft.com/office/powerpoint/2010/main" val="3561112940"/>
+        <p14:creationId xmlns:p14="http://schemas.microsoft.com/office/powerpoint/2010/main" val="2431813795"/>
       </p:ext>
     </p:extLst>
   </p:cSld>
@@ -988,7 +1337,10 @@
           <a:bodyPr/>
           <a:lstStyle/>
           <a:p>
-            <a:endParaRPr lang="en-US" dirty="0"/>
+            <a:r>
+              <a:rPr lang="en-US" dirty="0"/>
+              <a:t>Bring up that the newest Edge release allows install on Windows 10 Home using WSL2 (https://docs.docker.com/docker-for-windows/edge-release-notes/#docker-desktop-community-2220)</a:t>
+            </a:r>
           </a:p>
         </p:txBody>
       </p:sp>
@@ -1009,7 +1361,7 @@
           <a:p>
             <a:fld id="{B07B5B4F-0F75-48F2-BFB2-73D5ADCDF733}" type="slidenum">
               <a:rPr lang="en-US" smtClean="0"/>
-              <a:t>10</a:t>
+              <a:t>5</a:t>
             </a:fld>
             <a:endParaRPr lang="en-US"/>
           </a:p>
@@ -1018,7 +1370,7 @@
     </p:spTree>
     <p:extLst>
       <p:ext uri="{BB962C8B-B14F-4D97-AF65-F5344CB8AC3E}">
-        <p14:creationId xmlns:p14="http://schemas.microsoft.com/office/powerpoint/2010/main" val="4085663867"/>
+        <p14:creationId xmlns:p14="http://schemas.microsoft.com/office/powerpoint/2010/main" val="4270058192"/>
       </p:ext>
     </p:extLst>
   </p:cSld>
@@ -1072,7 +1424,10 @@
           <a:bodyPr/>
           <a:lstStyle/>
           <a:p>
-            <a:endParaRPr lang="en-US" dirty="0"/>
+            <a:r>
+              <a:rPr lang="en-US" dirty="0"/>
+              <a:t>You can run your own Registry too, handy if you want to distribute your own Docker Images at some point. Once you’re at the next slide, demo the pull command.</a:t>
+            </a:r>
           </a:p>
         </p:txBody>
       </p:sp>
@@ -1093,7 +1448,7 @@
           <a:p>
             <a:fld id="{B07B5B4F-0F75-48F2-BFB2-73D5ADCDF733}" type="slidenum">
               <a:rPr lang="en-US" smtClean="0"/>
-              <a:t>12</a:t>
+              <a:t>6</a:t>
             </a:fld>
             <a:endParaRPr lang="en-US"/>
           </a:p>
@@ -1102,7 +1457,7 @@
     </p:spTree>
     <p:extLst>
       <p:ext uri="{BB962C8B-B14F-4D97-AF65-F5344CB8AC3E}">
-        <p14:creationId xmlns:p14="http://schemas.microsoft.com/office/powerpoint/2010/main" val="3062470410"/>
+        <p14:creationId xmlns:p14="http://schemas.microsoft.com/office/powerpoint/2010/main" val="508300639"/>
       </p:ext>
     </p:extLst>
   </p:cSld>
@@ -1156,7 +1511,49 @@
           <a:bodyPr/>
           <a:lstStyle/>
           <a:p>
-            <a:endParaRPr lang="en-US" dirty="0"/>
+            <a:pPr marL="228600" indent="-228600">
+              <a:buAutoNum type="arabicPeriod"/>
+            </a:pPr>
+            <a:r>
+              <a:rPr lang="en-US" dirty="0"/>
+              <a:t>Mention –it instead of –d to run interactively in the CLI</a:t>
+            </a:r>
+          </a:p>
+          <a:p>
+            <a:pPr marL="228600" indent="-228600">
+              <a:buAutoNum type="arabicPeriod"/>
+            </a:pPr>
+            <a:r>
+              <a:rPr lang="en-US" dirty="0"/>
+              <a:t>If you don’t give the Container a name, you get a hex string</a:t>
+            </a:r>
+          </a:p>
+          <a:p>
+            <a:pPr marL="228600" indent="-228600">
+              <a:buAutoNum type="arabicPeriod"/>
+            </a:pPr>
+            <a:r>
+              <a:rPr lang="en-US" dirty="0"/>
+              <a:t>-e will change for each container you run, i.e. SQL Server environment variables != Postgres environment variables</a:t>
+            </a:r>
+          </a:p>
+          <a:p>
+            <a:pPr marL="228600" indent="-228600">
+              <a:buAutoNum type="arabicPeriod"/>
+            </a:pPr>
+            <a:r>
+              <a:rPr lang="en-US" dirty="0"/>
+              <a:t>-v is either mounting a named volume or using a bind mount. Be clear that we’ll cover in a bit, but that topic is the key to persisting data with Containers</a:t>
+            </a:r>
+          </a:p>
+          <a:p>
+            <a:pPr marL="228600" indent="-228600">
+              <a:buAutoNum type="arabicPeriod"/>
+            </a:pPr>
+            <a:r>
+              <a:rPr lang="en-US" dirty="0"/>
+              <a:t>Go over the tag after the colon and that those are important. Demo leaving the tag off and the Docker engine doesn’t know what to do with it</a:t>
+            </a:r>
           </a:p>
         </p:txBody>
       </p:sp>
@@ -1177,16 +1574,190 @@
           <a:p>
             <a:fld id="{B07B5B4F-0F75-48F2-BFB2-73D5ADCDF733}" type="slidenum">
               <a:rPr lang="en-US" smtClean="0"/>
-              <a:t>14</a:t>
+              <a:t>7</a:t>
             </a:fld>
-            <a:endParaRPr lang="en-US"/>
+            <a:endParaRPr lang="en-US" dirty="0"/>
           </a:p>
         </p:txBody>
       </p:sp>
     </p:spTree>
     <p:extLst>
       <p:ext uri="{BB962C8B-B14F-4D97-AF65-F5344CB8AC3E}">
-        <p14:creationId xmlns:p14="http://schemas.microsoft.com/office/powerpoint/2010/main" val="1130096044"/>
+        <p14:creationId xmlns:p14="http://schemas.microsoft.com/office/powerpoint/2010/main" val="3561112940"/>
+      </p:ext>
+    </p:extLst>
+  </p:cSld>
+  <p:clrMapOvr>
+    <a:masterClrMapping/>
+  </p:clrMapOvr>
+</p:notes>
+</file>
+
+<file path=ppt/notesSlides/notesSlide8.xml><?xml version="1.0" encoding="utf-8"?>
+<p:notes xmlns:a="http://schemas.openxmlformats.org/drawingml/2006/main" xmlns:r="http://schemas.openxmlformats.org/officeDocument/2006/relationships" xmlns:p="http://schemas.openxmlformats.org/presentationml/2006/main">
+  <p:cSld>
+    <p:spTree>
+      <p:nvGrpSpPr>
+        <p:cNvPr id="1" name=""/>
+        <p:cNvGrpSpPr/>
+        <p:nvPr/>
+      </p:nvGrpSpPr>
+      <p:grpSpPr>
+        <a:xfrm>
+          <a:off x="0" y="0"/>
+          <a:ext cx="0" cy="0"/>
+          <a:chOff x="0" y="0"/>
+          <a:chExt cx="0" cy="0"/>
+        </a:xfrm>
+      </p:grpSpPr>
+      <p:sp>
+        <p:nvSpPr>
+          <p:cNvPr id="2" name="Slide Image Placeholder 1"/>
+          <p:cNvSpPr>
+            <a:spLocks noGrp="1" noRot="1" noChangeAspect="1"/>
+          </p:cNvSpPr>
+          <p:nvPr>
+            <p:ph type="sldImg"/>
+          </p:nvPr>
+        </p:nvSpPr>
+        <p:spPr/>
+      </p:sp>
+      <p:sp>
+        <p:nvSpPr>
+          <p:cNvPr id="3" name="Notes Placeholder 2"/>
+          <p:cNvSpPr>
+            <a:spLocks noGrp="1"/>
+          </p:cNvSpPr>
+          <p:nvPr>
+            <p:ph type="body" idx="1"/>
+          </p:nvPr>
+        </p:nvSpPr>
+        <p:spPr/>
+        <p:txBody>
+          <a:bodyPr/>
+          <a:lstStyle/>
+          <a:p>
+            <a:r>
+              <a:rPr lang="en-US" dirty="0"/>
+              <a:t>When done, switch to Linux Containers for the Settings field</a:t>
+            </a:r>
+          </a:p>
+        </p:txBody>
+      </p:sp>
+      <p:sp>
+        <p:nvSpPr>
+          <p:cNvPr id="4" name="Slide Number Placeholder 3"/>
+          <p:cNvSpPr>
+            <a:spLocks noGrp="1"/>
+          </p:cNvSpPr>
+          <p:nvPr>
+            <p:ph type="sldNum" sz="quarter" idx="5"/>
+          </p:nvPr>
+        </p:nvSpPr>
+        <p:spPr/>
+        <p:txBody>
+          <a:bodyPr/>
+          <a:lstStyle/>
+          <a:p>
+            <a:fld id="{B07B5B4F-0F75-48F2-BFB2-73D5ADCDF733}" type="slidenum">
+              <a:rPr lang="en-US" smtClean="0"/>
+              <a:t>8</a:t>
+            </a:fld>
+            <a:endParaRPr lang="en-US"/>
+          </a:p>
+        </p:txBody>
+      </p:sp>
+    </p:spTree>
+    <p:extLst>
+      <p:ext uri="{BB962C8B-B14F-4D97-AF65-F5344CB8AC3E}">
+        <p14:creationId xmlns:p14="http://schemas.microsoft.com/office/powerpoint/2010/main" val="88449640"/>
+      </p:ext>
+    </p:extLst>
+  </p:cSld>
+  <p:clrMapOvr>
+    <a:masterClrMapping/>
+  </p:clrMapOvr>
+</p:notes>
+</file>
+
+<file path=ppt/notesSlides/notesSlide9.xml><?xml version="1.0" encoding="utf-8"?>
+<p:notes xmlns:a="http://schemas.openxmlformats.org/drawingml/2006/main" xmlns:r="http://schemas.openxmlformats.org/officeDocument/2006/relationships" xmlns:p="http://schemas.openxmlformats.org/presentationml/2006/main">
+  <p:cSld>
+    <p:spTree>
+      <p:nvGrpSpPr>
+        <p:cNvPr id="1" name=""/>
+        <p:cNvGrpSpPr/>
+        <p:nvPr/>
+      </p:nvGrpSpPr>
+      <p:grpSpPr>
+        <a:xfrm>
+          <a:off x="0" y="0"/>
+          <a:ext cx="0" cy="0"/>
+          <a:chOff x="0" y="0"/>
+          <a:chExt cx="0" cy="0"/>
+        </a:xfrm>
+      </p:grpSpPr>
+      <p:sp>
+        <p:nvSpPr>
+          <p:cNvPr id="2" name="Slide Image Placeholder 1"/>
+          <p:cNvSpPr>
+            <a:spLocks noGrp="1" noRot="1" noChangeAspect="1"/>
+          </p:cNvSpPr>
+          <p:nvPr>
+            <p:ph type="sldImg"/>
+          </p:nvPr>
+        </p:nvSpPr>
+        <p:spPr/>
+      </p:sp>
+      <p:sp>
+        <p:nvSpPr>
+          <p:cNvPr id="3" name="Notes Placeholder 2"/>
+          <p:cNvSpPr>
+            <a:spLocks noGrp="1"/>
+          </p:cNvSpPr>
+          <p:nvPr>
+            <p:ph type="body" idx="1"/>
+          </p:nvPr>
+        </p:nvSpPr>
+        <p:spPr/>
+        <p:txBody>
+          <a:bodyPr/>
+          <a:lstStyle/>
+          <a:p>
+            <a:r>
+              <a:rPr lang="en-US" dirty="0"/>
+              <a:t>If I delete a VM, the VHDX files are still there. But if I store files local to the container filesystem and the container is remove, then my data is gone.</a:t>
+            </a:r>
+          </a:p>
+        </p:txBody>
+      </p:sp>
+      <p:sp>
+        <p:nvSpPr>
+          <p:cNvPr id="4" name="Slide Number Placeholder 3"/>
+          <p:cNvSpPr>
+            <a:spLocks noGrp="1"/>
+          </p:cNvSpPr>
+          <p:nvPr>
+            <p:ph type="sldNum" sz="quarter" idx="5"/>
+          </p:nvPr>
+        </p:nvSpPr>
+        <p:spPr/>
+        <p:txBody>
+          <a:bodyPr/>
+          <a:lstStyle/>
+          <a:p>
+            <a:fld id="{B07B5B4F-0F75-48F2-BFB2-73D5ADCDF733}" type="slidenum">
+              <a:rPr lang="en-US" smtClean="0"/>
+              <a:t>9</a:t>
+            </a:fld>
+            <a:endParaRPr lang="en-US"/>
+          </a:p>
+        </p:txBody>
+      </p:sp>
+    </p:spTree>
+    <p:extLst>
+      <p:ext uri="{BB962C8B-B14F-4D97-AF65-F5344CB8AC3E}">
+        <p14:creationId xmlns:p14="http://schemas.microsoft.com/office/powerpoint/2010/main" val="4196283783"/>
       </p:ext>
     </p:extLst>
   </p:cSld>
@@ -1842,7 +2413,7 @@
           <a:p>
             <a:fld id="{97FA3E9C-B4A3-4F6D-A843-DF2E8FBAA2FF}" type="datetime1">
               <a:rPr lang="en-US" smtClean="0"/>
-              <a:t>3/3/2020</a:t>
+              <a:t>3/4/2020</a:t>
             </a:fld>
             <a:endParaRPr lang="en-US" dirty="0"/>
           </a:p>
@@ -2970,7 +3541,7 @@
           <a:p>
             <a:fld id="{1CACC866-0373-41CD-AA2C-7037F2A7F7A5}" type="datetime1">
               <a:rPr lang="en-US" smtClean="0"/>
-              <a:t>3/3/2020</a:t>
+              <a:t>3/4/2020</a:t>
             </a:fld>
             <a:endParaRPr lang="en-US" dirty="0"/>
           </a:p>
@@ -3989,7 +4560,7 @@
           <a:p>
             <a:fld id="{50ABD906-8833-48F0-B5BD-8D3994FDADE4}" type="datetime1">
               <a:rPr lang="en-US" smtClean="0"/>
-              <a:t>3/3/2020</a:t>
+              <a:t>3/4/2020</a:t>
             </a:fld>
             <a:endParaRPr lang="en-US" dirty="0"/>
           </a:p>
@@ -5167,7 +5738,7 @@
           <a:p>
             <a:fld id="{E6A570C1-EE13-4044-AA84-CDFE7378A1D2}" type="datetime1">
               <a:rPr lang="en-US" smtClean="0"/>
-              <a:t>3/3/2020</a:t>
+              <a:t>3/4/2020</a:t>
             </a:fld>
             <a:endParaRPr lang="en-US" dirty="0"/>
           </a:p>
@@ -6236,7 +6807,7 @@
           <a:p>
             <a:fld id="{84F947C5-98DB-479F-8983-A8F77B354E5A}" type="datetime1">
               <a:rPr lang="en-US" smtClean="0"/>
-              <a:t>3/3/2020</a:t>
+              <a:t>3/4/2020</a:t>
             </a:fld>
             <a:endParaRPr lang="en-US" dirty="0"/>
           </a:p>
@@ -6890,7 +7461,7 @@
           <a:p>
             <a:fld id="{9FEFD5D5-ED9A-4748-B4FE-F5434CF437BD}" type="datetime1">
               <a:rPr lang="en-US" smtClean="0"/>
-              <a:t>3/3/2020</a:t>
+              <a:t>3/4/2020</a:t>
             </a:fld>
             <a:endParaRPr lang="en-US" dirty="0"/>
           </a:p>
@@ -7745,7 +8316,7 @@
           <a:p>
             <a:fld id="{E4551F79-0306-48E3-B1F7-0B32923463A4}" type="datetime1">
               <a:rPr lang="en-US" smtClean="0"/>
-              <a:t>3/3/2020</a:t>
+              <a:t>3/4/2020</a:t>
             </a:fld>
             <a:endParaRPr lang="en-US" dirty="0"/>
           </a:p>
@@ -7928,7 +8499,7 @@
           <a:p>
             <a:fld id="{A3285C5A-4C6F-4268-99BE-F4BD869EF850}" type="datetime1">
               <a:rPr lang="en-US" smtClean="0"/>
-              <a:t>3/3/2020</a:t>
+              <a:t>3/4/2020</a:t>
             </a:fld>
             <a:endParaRPr lang="en-US" dirty="0"/>
           </a:p>
@@ -8934,7 +9505,7 @@
           <a:p>
             <a:fld id="{3E2F7789-C7F6-4120-8DF0-A6D4E0F66E1E}" type="datetime1">
               <a:rPr lang="en-US" smtClean="0"/>
-              <a:t>3/3/2020</a:t>
+              <a:t>3/4/2020</a:t>
             </a:fld>
             <a:endParaRPr lang="en-US" dirty="0"/>
           </a:p>
@@ -9148,7 +9719,7 @@
           <a:p>
             <a:fld id="{4E5EED18-AAF6-44F4-B61F-983FE41D43E3}" type="datetime1">
               <a:rPr lang="en-US" smtClean="0"/>
-              <a:t>3/3/2020</a:t>
+              <a:t>3/4/2020</a:t>
             </a:fld>
             <a:endParaRPr lang="en-US" dirty="0"/>
           </a:p>
@@ -10218,7 +10789,7 @@
           <a:p>
             <a:fld id="{D34D7B4D-0234-4D64-A7B4-D08157DE1D68}" type="datetime1">
               <a:rPr lang="en-US" smtClean="0"/>
-              <a:t>3/3/2020</a:t>
+              <a:t>3/4/2020</a:t>
             </a:fld>
             <a:endParaRPr lang="en-US" dirty="0"/>
           </a:p>
@@ -10498,7 +11069,7 @@
           <a:p>
             <a:fld id="{E4C535E3-89CC-4061-B545-FEDAADEB42EE}" type="datetime1">
               <a:rPr lang="en-US" smtClean="0"/>
-              <a:t>3/3/2020</a:t>
+              <a:t>3/4/2020</a:t>
             </a:fld>
             <a:endParaRPr lang="en-US" dirty="0"/>
           </a:p>
@@ -10888,7 +11459,7 @@
           <a:p>
             <a:fld id="{F6F4B317-E18A-4B66-876F-F9AA7030FF7B}" type="datetime1">
               <a:rPr lang="en-US" smtClean="0"/>
-              <a:t>3/3/2020</a:t>
+              <a:t>3/4/2020</a:t>
             </a:fld>
             <a:endParaRPr lang="en-US" dirty="0"/>
           </a:p>
@@ -11014,7 +11585,7 @@
           <a:p>
             <a:fld id="{49FE5CA9-61DB-4EE1-9336-235C324AD9EA}" type="datetime1">
               <a:rPr lang="en-US" smtClean="0"/>
-              <a:t>3/3/2020</a:t>
+              <a:t>3/4/2020</a:t>
             </a:fld>
             <a:endParaRPr lang="en-US" dirty="0"/>
           </a:p>
@@ -11117,7 +11688,7 @@
           <a:p>
             <a:fld id="{C2CAFA7A-4024-4A0E-8651-6B80E99EE048}" type="datetime1">
               <a:rPr lang="en-US" smtClean="0"/>
-              <a:t>3/3/2020</a:t>
+              <a:t>3/4/2020</a:t>
             </a:fld>
             <a:endParaRPr lang="en-US" dirty="0"/>
           </a:p>
@@ -12234,7 +12805,7 @@
           <a:p>
             <a:fld id="{863570F3-3F9D-4F9B-BEBB-2707177129F3}" type="datetime1">
               <a:rPr lang="en-US" smtClean="0"/>
-              <a:t>3/3/2020</a:t>
+              <a:t>3/4/2020</a:t>
             </a:fld>
             <a:endParaRPr lang="en-US" dirty="0"/>
           </a:p>
@@ -13375,7 +13946,7 @@
           <a:p>
             <a:fld id="{5F2FCAD8-B3D2-4843-8CC5-345FC9ED90CE}" type="datetime1">
               <a:rPr lang="en-US" smtClean="0"/>
-              <a:t>3/3/2020</a:t>
+              <a:t>3/4/2020</a:t>
             </a:fld>
             <a:endParaRPr lang="en-US" dirty="0"/>
           </a:p>
@@ -14411,7 +14982,7 @@
           <a:p>
             <a:fld id="{F3B6E06B-41A4-413D-AB61-5124A3CAF8D9}" type="datetime1">
               <a:rPr lang="en-US" smtClean="0"/>
-              <a:t>3/3/2020</a:t>
+              <a:t>3/4/2020</a:t>
             </a:fld>
             <a:endParaRPr lang="en-US" dirty="0"/>
           </a:p>
@@ -15763,7 +16334,7 @@
           <a:p>
             <a:r>
               <a:rPr lang="en-US" dirty="0"/>
-              <a:t>Copy files to there</a:t>
+              <a:t>Copy files into the local path</a:t>
             </a:r>
           </a:p>
           <a:p>
@@ -15772,7 +16343,7 @@
           <a:p>
             <a:r>
               <a:rPr lang="en-US" dirty="0"/>
-              <a:t>See the changes in the container process</a:t>
+              <a:t>Show the new files visible to the container</a:t>
             </a:r>
           </a:p>
         </p:txBody>
@@ -16155,7 +16726,7 @@
             <a:pPr lvl="1"/>
             <a:r>
               <a:rPr lang="en-US" dirty="0"/>
-              <a:t>Are usually downloaded from Docker Hub (but not always)</a:t>
+              <a:t>Often downloaded from Docker Hub</a:t>
             </a:r>
           </a:p>
           <a:p>
@@ -16188,7 +16759,7 @@
           <a:p>
             <a:r>
               <a:rPr lang="en-US" dirty="0"/>
-              <a:t>If you want to customize a Docker Image, you would use another Image and add your customizations on top by building another Image</a:t>
+              <a:t>If you want to customize a Docker Image, you specify a source Image, then add your customizations on top</a:t>
             </a:r>
           </a:p>
         </p:txBody>
@@ -16325,15 +16896,9 @@
             <a:endParaRPr lang="en-US" dirty="0"/>
           </a:p>
           <a:p>
-            <a:endParaRPr lang="en-US" dirty="0"/>
-          </a:p>
-          <a:p>
-            <a:r>
-              <a:rPr lang="en-US" dirty="0"/>
-              <a:t>Instead of writing our own from scratch…</a:t>
-            </a:r>
-          </a:p>
-          <a:p>
+            <a:pPr marL="0" indent="0">
+              <a:buNone/>
+            </a:pPr>
             <a:endParaRPr lang="en-US" dirty="0"/>
           </a:p>
           <a:p>
@@ -16348,51 +16913,6 @@
             <a:r>
               <a:rPr lang="en-US" dirty="0"/>
               <a:t> (</a:t>
-            </a:r>
-            <a:r>
-              <a:rPr lang="en-US" dirty="0">
-                <a:solidFill>
-                  <a:schemeClr val="accent4">
-                    <a:lumMod val="50000"/>
-                  </a:schemeClr>
-                </a:solidFill>
-                <a:hlinkClick r:id="rId2">
-                  <a:extLst>
-                    <a:ext uri="{A12FA001-AC4F-418D-AE19-62706E023703}">
-                      <ahyp:hlinkClr xmlns:ahyp="http://schemas.microsoft.com/office/drawing/2018/hyperlinkcolor" val="tx"/>
-                    </a:ext>
-                  </a:extLst>
-                </a:hlinkClick>
-              </a:rPr>
-              <a:t>@</a:t>
-            </a:r>
-            <a:r>
-              <a:rPr lang="en-US" dirty="0" err="1">
-                <a:solidFill>
-                  <a:schemeClr val="accent4">
-                    <a:lumMod val="50000"/>
-                  </a:schemeClr>
-                </a:solidFill>
-                <a:hlinkClick r:id="rId2">
-                  <a:extLst>
-                    <a:ext uri="{A12FA001-AC4F-418D-AE19-62706E023703}">
-                      <ahyp:hlinkClr xmlns:ahyp="http://schemas.microsoft.com/office/drawing/2018/hyperlinkcolor" val="tx"/>
-                    </a:ext>
-                  </a:extLst>
-                </a:hlinkClick>
-              </a:rPr>
-              <a:t>dbafromthecold</a:t>
-            </a:r>
-            <a:r>
-              <a:rPr lang="en-US" dirty="0"/>
-              <a:t>) excellent images so far, let’s customize what he’s already given us</a:t>
-            </a:r>
-            <a:br>
-              <a:rPr lang="en-US" dirty="0"/>
-            </a:br>
-            <a:r>
-              <a:rPr lang="en-US" dirty="0"/>
-              <a:t>(</a:t>
             </a:r>
             <a:r>
               <a:rPr lang="en-US" dirty="0">
@@ -16409,19 +16929,38 @@
                   </a:extLst>
                 </a:hlinkClick>
               </a:rPr>
-              <a:t>https://dbafromthecold.com/2017/02/08/sql-container-from-dockerfile/</a:t>
-            </a:r>
-            <a:r>
-              <a:rPr lang="en-US" dirty="0">
+              <a:t>@</a:t>
+            </a:r>
+            <a:r>
+              <a:rPr lang="en-US" dirty="0" err="1">
                 <a:solidFill>
                   <a:schemeClr val="accent4">
                     <a:lumMod val="50000"/>
                   </a:schemeClr>
                 </a:solidFill>
+                <a:hlinkClick r:id="rId3">
+                  <a:extLst>
+                    <a:ext uri="{A12FA001-AC4F-418D-AE19-62706E023703}">
+                      <ahyp:hlinkClr xmlns:ahyp="http://schemas.microsoft.com/office/drawing/2018/hyperlinkcolor" val="tx"/>
+                    </a:ext>
+                  </a:extLst>
+                </a:hlinkClick>
               </a:rPr>
-              <a:t>)</a:t>
-            </a:r>
+              <a:t>dbafromthecold</a:t>
+            </a:r>
+            <a:r>
+              <a:rPr lang="en-US" dirty="0"/>
+              <a:t>) excellent images so far, but I couldn’t find the environment variables to customize</a:t>
+            </a:r>
+          </a:p>
+          <a:p>
             <a:endParaRPr lang="en-US" dirty="0"/>
+          </a:p>
+          <a:p>
+            <a:r>
+              <a:rPr lang="en-US" dirty="0"/>
+              <a:t>We’ll need to use an official Microsoft image which has some environment variables exposed</a:t>
+            </a:r>
           </a:p>
           <a:p>
             <a:endParaRPr lang="en-US" dirty="0"/>
@@ -16508,7 +17047,7 @@
           <p:cNvPr id="2" name="Title 1">
             <a:extLst>
               <a:ext uri="{FF2B5EF4-FFF2-40B4-BE49-F238E27FC236}">
-                <a16:creationId xmlns:a16="http://schemas.microsoft.com/office/drawing/2014/main" id="{04A0CDF6-C775-4D6D-B330-7093E827830E}"/>
+                <a16:creationId xmlns:a16="http://schemas.microsoft.com/office/drawing/2014/main" id="{ABD92BB2-ADCB-482C-8F28-C87FA1BF877A}"/>
               </a:ext>
             </a:extLst>
           </p:cNvPr>
@@ -16526,8 +17065,13 @@
           <a:p>
             <a:r>
               <a:rPr lang="en-US" dirty="0"/>
-              <a:t>Container and Image Recap</a:t>
-            </a:r>
+              <a:t>Demo #3 – Custom Image with a </a:t>
+            </a:r>
+            <a:r>
+              <a:rPr lang="en-US" dirty="0" err="1"/>
+              <a:t>Dockerfile</a:t>
+            </a:r>
+            <a:endParaRPr lang="en-US" dirty="0"/>
           </a:p>
         </p:txBody>
       </p:sp>
@@ -16536,7 +17080,7 @@
           <p:cNvPr id="3" name="Content Placeholder 2">
             <a:extLst>
               <a:ext uri="{FF2B5EF4-FFF2-40B4-BE49-F238E27FC236}">
-                <a16:creationId xmlns:a16="http://schemas.microsoft.com/office/drawing/2014/main" id="{985C7EDA-BEA4-4120-A36E-B96160AED6FA}"/>
+                <a16:creationId xmlns:a16="http://schemas.microsoft.com/office/drawing/2014/main" id="{A2EE9269-5599-4B91-8D38-4421B91D2A0E}"/>
               </a:ext>
             </a:extLst>
           </p:cNvPr>
@@ -16554,31 +17098,64 @@
           <a:p>
             <a:r>
               <a:rPr lang="en-US" dirty="0"/>
-              <a:t>A Container is a way to isolate processes on the OS</a:t>
-            </a:r>
-          </a:p>
-          <a:p>
-            <a:endParaRPr lang="en-US" dirty="0"/>
-          </a:p>
-          <a:p>
-            <a:r>
-              <a:rPr lang="en-US" dirty="0"/>
-              <a:t>It’s a runtime instance of an Image</a:t>
-            </a:r>
-          </a:p>
-          <a:p>
-            <a:endParaRPr lang="en-US" dirty="0"/>
-          </a:p>
-          <a:p>
-            <a:r>
-              <a:rPr lang="en-US" dirty="0"/>
-              <a:t>Image are immutable, and built with a </a:t>
+              <a:t>We’ll create a </a:t>
             </a:r>
             <a:r>
               <a:rPr lang="en-US" dirty="0" err="1"/>
               <a:t>Dockerfile</a:t>
             </a:r>
-            <a:endParaRPr lang="en-US" dirty="0"/>
+            <a:r>
+              <a:rPr lang="en-US" dirty="0"/>
+              <a:t> based on Image</a:t>
+            </a:r>
+            <a:br>
+              <a:rPr lang="en-US" dirty="0">
+                <a:solidFill>
+                  <a:schemeClr val="accent4">
+                    <a:lumMod val="50000"/>
+                  </a:schemeClr>
+                </a:solidFill>
+                <a:latin typeface="Consolas" panose="020B0609020204030204" pitchFamily="49" charset="0"/>
+              </a:rPr>
+            </a:br>
+            <a:r>
+              <a:rPr lang="en-US" dirty="0" err="1">
+                <a:solidFill>
+                  <a:schemeClr val="accent4">
+                    <a:lumMod val="50000"/>
+                  </a:schemeClr>
+                </a:solidFill>
+                <a:latin typeface="Consolas" panose="020B0609020204030204" pitchFamily="49" charset="0"/>
+              </a:rPr>
+              <a:t>microsoft</a:t>
+            </a:r>
+            <a:r>
+              <a:rPr lang="en-US" dirty="0">
+                <a:solidFill>
+                  <a:schemeClr val="accent4">
+                    <a:lumMod val="50000"/>
+                  </a:schemeClr>
+                </a:solidFill>
+                <a:latin typeface="Consolas" panose="020B0609020204030204" pitchFamily="49" charset="0"/>
+              </a:rPr>
+              <a:t>/mssql-server-windows-developer:2017-latest</a:t>
+            </a:r>
+          </a:p>
+          <a:p>
+            <a:endParaRPr lang="en-US" dirty="0">
+              <a:solidFill>
+                <a:schemeClr val="accent4">
+                  <a:lumMod val="50000"/>
+                </a:schemeClr>
+              </a:solidFill>
+              <a:latin typeface="Consolas" panose="020B0609020204030204" pitchFamily="49" charset="0"/>
+            </a:endParaRPr>
+          </a:p>
+          <a:p>
+            <a:r>
+              <a:rPr lang="en-US" dirty="0"/>
+              <a:t>We’ll attach a few databases at Container Instance runtime so we don’t need to do so manually</a:t>
+            </a:r>
           </a:p>
         </p:txBody>
       </p:sp>
@@ -16587,7 +17164,7 @@
           <p:cNvPr id="4" name="Slide Number Placeholder 3">
             <a:extLst>
               <a:ext uri="{FF2B5EF4-FFF2-40B4-BE49-F238E27FC236}">
-                <a16:creationId xmlns:a16="http://schemas.microsoft.com/office/drawing/2014/main" id="{3F777FD2-A9E4-4B85-A316-9A5135D01693}"/>
+                <a16:creationId xmlns:a16="http://schemas.microsoft.com/office/drawing/2014/main" id="{3C5D415E-616C-47F6-A861-4268D1FA1EC9}"/>
               </a:ext>
             </a:extLst>
           </p:cNvPr>
@@ -16615,7 +17192,7 @@
     </p:spTree>
     <p:extLst>
       <p:ext uri="{BB962C8B-B14F-4D97-AF65-F5344CB8AC3E}">
-        <p14:creationId xmlns:p14="http://schemas.microsoft.com/office/powerpoint/2010/main" val="2001675331"/>
+        <p14:creationId xmlns:p14="http://schemas.microsoft.com/office/powerpoint/2010/main" val="3729349792"/>
       </p:ext>
     </p:extLst>
   </p:cSld>
@@ -16659,7 +17236,7 @@
           <p:cNvPr id="2" name="Title 1">
             <a:extLst>
               <a:ext uri="{FF2B5EF4-FFF2-40B4-BE49-F238E27FC236}">
-                <a16:creationId xmlns:a16="http://schemas.microsoft.com/office/drawing/2014/main" id="{ABD92BB2-ADCB-482C-8F28-C87FA1BF877A}"/>
+                <a16:creationId xmlns:a16="http://schemas.microsoft.com/office/drawing/2014/main" id="{04A0CDF6-C775-4D6D-B330-7093E827830E}"/>
               </a:ext>
             </a:extLst>
           </p:cNvPr>
@@ -16677,13 +17254,8 @@
           <a:p>
             <a:r>
               <a:rPr lang="en-US" dirty="0"/>
-              <a:t>Demo #3 – Custom Image with a </a:t>
-            </a:r>
-            <a:r>
-              <a:rPr lang="en-US" dirty="0" err="1"/>
-              <a:t>Dockerfile</a:t>
-            </a:r>
-            <a:endParaRPr lang="en-US" dirty="0"/>
+              <a:t>Container and Image Recap</a:t>
+            </a:r>
           </a:p>
         </p:txBody>
       </p:sp>
@@ -16692,7 +17264,7 @@
           <p:cNvPr id="3" name="Content Placeholder 2">
             <a:extLst>
               <a:ext uri="{FF2B5EF4-FFF2-40B4-BE49-F238E27FC236}">
-                <a16:creationId xmlns:a16="http://schemas.microsoft.com/office/drawing/2014/main" id="{A2EE9269-5599-4B91-8D38-4421B91D2A0E}"/>
+                <a16:creationId xmlns:a16="http://schemas.microsoft.com/office/drawing/2014/main" id="{985C7EDA-BEA4-4120-A36E-B96160AED6FA}"/>
               </a:ext>
             </a:extLst>
           </p:cNvPr>
@@ -16710,75 +17282,31 @@
           <a:p>
             <a:r>
               <a:rPr lang="en-US" dirty="0"/>
-              <a:t>We’ll create a </a:t>
+              <a:t>A Container is a way to isolate processes on the OS</a:t>
+            </a:r>
+          </a:p>
+          <a:p>
+            <a:endParaRPr lang="en-US" dirty="0"/>
+          </a:p>
+          <a:p>
+            <a:r>
+              <a:rPr lang="en-US" dirty="0"/>
+              <a:t>It’s a runtime instance of an Image</a:t>
+            </a:r>
+          </a:p>
+          <a:p>
+            <a:endParaRPr lang="en-US" dirty="0"/>
+          </a:p>
+          <a:p>
+            <a:r>
+              <a:rPr lang="en-US" dirty="0"/>
+              <a:t>Image are immutable, and built with a </a:t>
             </a:r>
             <a:r>
               <a:rPr lang="en-US" dirty="0" err="1"/>
               <a:t>Dockerfile</a:t>
             </a:r>
-            <a:r>
-              <a:rPr lang="en-US" dirty="0"/>
-              <a:t> based on Image</a:t>
-            </a:r>
-            <a:br>
-              <a:rPr lang="en-US" dirty="0">
-                <a:solidFill>
-                  <a:schemeClr val="accent4">
-                    <a:lumMod val="50000"/>
-                  </a:schemeClr>
-                </a:solidFill>
-                <a:latin typeface="Consolas" panose="020B0609020204030204" pitchFamily="49" charset="0"/>
-              </a:rPr>
-            </a:br>
-            <a:r>
-              <a:rPr lang="en-US" dirty="0" err="1">
-                <a:solidFill>
-                  <a:schemeClr val="accent4">
-                    <a:lumMod val="50000"/>
-                  </a:schemeClr>
-                </a:solidFill>
-                <a:latin typeface="Consolas" panose="020B0609020204030204" pitchFamily="49" charset="0"/>
-              </a:rPr>
-              <a:t>microsoft</a:t>
-            </a:r>
-            <a:r>
-              <a:rPr lang="en-US" dirty="0">
-                <a:solidFill>
-                  <a:schemeClr val="accent4">
-                    <a:lumMod val="50000"/>
-                  </a:schemeClr>
-                </a:solidFill>
-                <a:latin typeface="Consolas" panose="020B0609020204030204" pitchFamily="49" charset="0"/>
-              </a:rPr>
-              <a:t>/mssql-server-windows-developer</a:t>
-            </a:r>
-            <a:r>
-              <a:rPr lang="en-US">
-                <a:solidFill>
-                  <a:schemeClr val="accent4">
-                    <a:lumMod val="50000"/>
-                  </a:schemeClr>
-                </a:solidFill>
-                <a:latin typeface="Consolas" panose="020B0609020204030204" pitchFamily="49" charset="0"/>
-              </a:rPr>
-              <a:t>:2017-latest</a:t>
-            </a:r>
-          </a:p>
-          <a:p>
-            <a:endParaRPr lang="en-US" dirty="0">
-              <a:solidFill>
-                <a:schemeClr val="accent4">
-                  <a:lumMod val="50000"/>
-                </a:schemeClr>
-              </a:solidFill>
-              <a:latin typeface="Consolas" panose="020B0609020204030204" pitchFamily="49" charset="0"/>
-            </a:endParaRPr>
-          </a:p>
-          <a:p>
-            <a:r>
-              <a:rPr lang="en-US" dirty="0"/>
-              <a:t>We’ll attach a few databases at Container Instance runtime so we don’t need to do so manually</a:t>
-            </a:r>
+            <a:endParaRPr lang="en-US" dirty="0"/>
           </a:p>
         </p:txBody>
       </p:sp>
@@ -16787,7 +17315,7 @@
           <p:cNvPr id="4" name="Slide Number Placeholder 3">
             <a:extLst>
               <a:ext uri="{FF2B5EF4-FFF2-40B4-BE49-F238E27FC236}">
-                <a16:creationId xmlns:a16="http://schemas.microsoft.com/office/drawing/2014/main" id="{3C5D415E-616C-47F6-A861-4268D1FA1EC9}"/>
+                <a16:creationId xmlns:a16="http://schemas.microsoft.com/office/drawing/2014/main" id="{3F777FD2-A9E4-4B85-A316-9A5135D01693}"/>
               </a:ext>
             </a:extLst>
           </p:cNvPr>
@@ -16815,7 +17343,7 @@
     </p:spTree>
     <p:extLst>
       <p:ext uri="{BB962C8B-B14F-4D97-AF65-F5344CB8AC3E}">
-        <p14:creationId xmlns:p14="http://schemas.microsoft.com/office/powerpoint/2010/main" val="3729349792"/>
+        <p14:creationId xmlns:p14="http://schemas.microsoft.com/office/powerpoint/2010/main" val="2001675331"/>
       </p:ext>
     </p:extLst>
   </p:cSld>
@@ -17096,14 +17624,11 @@
               <a:rPr lang="en-US" sz="2400" dirty="0"/>
               <a:t>A set of software products that provide OS-level virtualization and process isolation</a:t>
             </a:r>
-            <a:r>
-              <a:rPr lang="en-US" sz="2400" baseline="40000" dirty="0">
-                <a:solidFill>
-                  <a:srgbClr val="ACD433"/>
-                </a:solidFill>
-              </a:rPr>
-              <a:t>1</a:t>
-            </a:r>
+            <a:endParaRPr lang="en-US" sz="2400" baseline="40000" dirty="0">
+              <a:solidFill>
+                <a:srgbClr val="ACD433"/>
+              </a:solidFill>
+            </a:endParaRPr>
           </a:p>
           <a:p>
             <a:endParaRPr lang="en-US" sz="2400" dirty="0"/>
@@ -19350,7 +19875,7 @@
                 <a:solidFill>
                   <a:srgbClr val="00B0F0"/>
                 </a:solidFill>
-                <a:hlinkClick r:id="rId2">
+                <a:hlinkClick r:id="rId3">
                   <a:extLst>
                     <a:ext uri="{A12FA001-AC4F-418D-AE19-62706E023703}">
                       <ahyp:hlinkClr xmlns:ahyp="http://schemas.microsoft.com/office/drawing/2018/hyperlinkcolor" val="tx"/>
@@ -19383,7 +19908,7 @@
                 <a:solidFill>
                   <a:srgbClr val="00B0F0"/>
                 </a:solidFill>
-                <a:hlinkClick r:id="rId3">
+                <a:hlinkClick r:id="rId4">
                   <a:extLst>
                     <a:ext uri="{A12FA001-AC4F-418D-AE19-62706E023703}">
                       <ahyp:hlinkClr xmlns:ahyp="http://schemas.microsoft.com/office/drawing/2018/hyperlinkcolor" val="tx"/>
@@ -19432,7 +19957,7 @@
                 <a:solidFill>
                   <a:srgbClr val="00B0F0"/>
                 </a:solidFill>
-                <a:hlinkClick r:id="rId4">
+                <a:hlinkClick r:id="rId5">
                   <a:extLst>
                     <a:ext uri="{A12FA001-AC4F-418D-AE19-62706E023703}">
                       <ahyp:hlinkClr xmlns:ahyp="http://schemas.microsoft.com/office/drawing/2018/hyperlinkcolor" val="tx"/>
@@ -19566,7 +20091,12 @@
             <p:ph idx="1"/>
           </p:nvPr>
         </p:nvSpPr>
-        <p:spPr/>
+        <p:spPr>
+          <a:xfrm>
+            <a:off x="1154955" y="2603499"/>
+            <a:ext cx="8761412" cy="4034367"/>
+          </a:xfrm>
+        </p:spPr>
         <p:txBody>
           <a:bodyPr>
             <a:normAutofit/>
@@ -19654,6 +20184,10 @@
               <a:rPr lang="en-US" dirty="0"/>
               <a:t>)</a:t>
             </a:r>
+            <a:br>
+              <a:rPr lang="en-US" dirty="0"/>
+            </a:br>
+            <a:endParaRPr lang="en-US" dirty="0"/>
           </a:p>
           <a:p>
             <a:endParaRPr lang="en-US" dirty="0"/>

</xml_diff>